<commit_message>
updated documentation for 0.0.2
</commit_message>
<xml_diff>
--- a/inst/example/slides.pptx
+++ b/inst/example/slides.pptx
@@ -10,38 +10,6 @@
     <p:sldId id="258" r:id="rId10"/>
     <p:sldId id="259" r:id="rId11"/>
     <p:sldId id="260" r:id="rId12"/>
-    <p:sldId id="261" r:id="rId13"/>
-    <p:sldId id="262" r:id="rId14"/>
-    <p:sldId id="263" r:id="rId15"/>
-    <p:sldId id="264" r:id="rId16"/>
-    <p:sldId id="265" r:id="rId17"/>
-    <p:sldId id="266" r:id="rId18"/>
-    <p:sldId id="267" r:id="rId19"/>
-    <p:sldId id="268" r:id="rId20"/>
-    <p:sldId id="269" r:id="rId21"/>
-    <p:sldId id="270" r:id="rId22"/>
-    <p:sldId id="271" r:id="rId23"/>
-    <p:sldId id="272" r:id="rId24"/>
-    <p:sldId id="273" r:id="rId25"/>
-    <p:sldId id="274" r:id="rId26"/>
-    <p:sldId id="275" r:id="rId27"/>
-    <p:sldId id="276" r:id="rId28"/>
-    <p:sldId id="277" r:id="rId29"/>
-    <p:sldId id="278" r:id="rId30"/>
-    <p:sldId id="279" r:id="rId31"/>
-    <p:sldId id="280" r:id="rId32"/>
-    <p:sldId id="281" r:id="rId33"/>
-    <p:sldId id="282" r:id="rId34"/>
-    <p:sldId id="283" r:id="rId35"/>
-    <p:sldId id="284" r:id="rId36"/>
-    <p:sldId id="285" r:id="rId37"/>
-    <p:sldId id="286" r:id="rId38"/>
-    <p:sldId id="287" r:id="rId39"/>
-    <p:sldId id="288" r:id="rId40"/>
-    <p:sldId id="289" r:id="rId41"/>
-    <p:sldId id="290" r:id="rId42"/>
-    <p:sldId id="291" r:id="rId43"/>
-    <p:sldId id="292" r:id="rId44"/>
   </p:sldIdLst>
   <p:sldSz cx="9144000" cy="6858000" type="screen4x3"/>
   <p:notesSz cx="6858000" cy="9144000"/>
@@ -2252,517 +2220,7 @@
       </p:grpSpPr>
       <p:pic xmlns:a="http://schemas.openxmlformats.org/drawingml/2006/main" xmlns:r="http://schemas.openxmlformats.org/officeDocument/2006/relationships" xmlns:p="http://schemas.openxmlformats.org/presentationml/2006/main">
         <p:nvPicPr>
-          <p:cNvPr id="2" name=""/>
-          <p:cNvPicPr>
-            <a:picLocks noGrp="1"/>
-          </p:cNvPicPr>
-          <p:nvPr>
-            <p:ph/>
-          </p:nvPr>
-        </p:nvPicPr>
-        <p:blipFill>
-          <a:blip cstate="print" r:embed="rId2"/>
-          <a:stretch>
-            <a:fillRect/>
-          </a:stretch>
-        </p:blipFill>
-        <p:spPr>
-          <a:xfrm>
-            <a:off x="0" y="0"/>
-            <a:ext cx="9144000" cy="6858000"/>
-          </a:xfrm>
-          <a:prstGeom prst="rect">
-            <a:avLst/>
-          </a:prstGeom>
-        </p:spPr>
-      </p:pic>
-    </p:spTree>
-  </p:cSld>
-  <p:clrMapOvr>
-    <a:masterClrMapping/>
-  </p:clrMapOvr>
-</p:sld>
-</file>
-
-<file path=ppt/slides/slide10.xml><?xml version="1.0" encoding="utf-8"?>
-<p:sld xmlns:a="http://schemas.openxmlformats.org/drawingml/2006/main" xmlns:r="http://schemas.openxmlformats.org/officeDocument/2006/relationships" xmlns:p="http://schemas.openxmlformats.org/presentationml/2006/main">
-  <p:cSld>
-    <p:spTree>
-      <p:nvGrpSpPr>
-        <p:cNvPr id="1" name=""/>
-        <p:cNvGrpSpPr/>
-        <p:nvPr/>
-      </p:nvGrpSpPr>
-      <p:grpSpPr>
-        <a:xfrm>
-          <a:off x="0" y="0"/>
-          <a:ext cx="0" cy="0"/>
-          <a:chOff x="0" y="0"/>
-          <a:chExt cx="0" cy="0"/>
-        </a:xfrm>
-      </p:grpSpPr>
-      <p:pic xmlns:a="http://schemas.openxmlformats.org/drawingml/2006/main" xmlns:r="http://schemas.openxmlformats.org/officeDocument/2006/relationships" xmlns:p="http://schemas.openxmlformats.org/presentationml/2006/main">
-        <p:nvPicPr>
-          <p:cNvPr id="2" name=""/>
-          <p:cNvPicPr>
-            <a:picLocks noGrp="1"/>
-          </p:cNvPicPr>
-          <p:nvPr>
-            <p:ph/>
-          </p:nvPr>
-        </p:nvPicPr>
-        <p:blipFill>
-          <a:blip cstate="print" r:embed="rId2"/>
-          <a:stretch>
-            <a:fillRect/>
-          </a:stretch>
-        </p:blipFill>
-        <p:spPr>
-          <a:xfrm>
-            <a:off x="0" y="0"/>
-            <a:ext cx="9144000" cy="6858000"/>
-          </a:xfrm>
-          <a:prstGeom prst="rect">
-            <a:avLst/>
-          </a:prstGeom>
-        </p:spPr>
-      </p:pic>
-    </p:spTree>
-  </p:cSld>
-  <p:clrMapOvr>
-    <a:masterClrMapping/>
-  </p:clrMapOvr>
-</p:sld>
-</file>
-
-<file path=ppt/slides/slide11.xml><?xml version="1.0" encoding="utf-8"?>
-<p:sld xmlns:a="http://schemas.openxmlformats.org/drawingml/2006/main" xmlns:r="http://schemas.openxmlformats.org/officeDocument/2006/relationships" xmlns:p="http://schemas.openxmlformats.org/presentationml/2006/main">
-  <p:cSld>
-    <p:spTree>
-      <p:nvGrpSpPr>
-        <p:cNvPr id="1" name=""/>
-        <p:cNvGrpSpPr/>
-        <p:nvPr/>
-      </p:nvGrpSpPr>
-      <p:grpSpPr>
-        <a:xfrm>
-          <a:off x="0" y="0"/>
-          <a:ext cx="0" cy="0"/>
-          <a:chOff x="0" y="0"/>
-          <a:chExt cx="0" cy="0"/>
-        </a:xfrm>
-      </p:grpSpPr>
-      <p:pic xmlns:a="http://schemas.openxmlformats.org/drawingml/2006/main" xmlns:r="http://schemas.openxmlformats.org/officeDocument/2006/relationships" xmlns:p="http://schemas.openxmlformats.org/presentationml/2006/main">
-        <p:nvPicPr>
-          <p:cNvPr id="2" name=""/>
-          <p:cNvPicPr>
-            <a:picLocks noGrp="1"/>
-          </p:cNvPicPr>
-          <p:nvPr>
-            <p:ph/>
-          </p:nvPr>
-        </p:nvPicPr>
-        <p:blipFill>
-          <a:blip cstate="print" r:embed="rId2"/>
-          <a:stretch>
-            <a:fillRect/>
-          </a:stretch>
-        </p:blipFill>
-        <p:spPr>
-          <a:xfrm>
-            <a:off x="0" y="0"/>
-            <a:ext cx="9144000" cy="6858000"/>
-          </a:xfrm>
-          <a:prstGeom prst="rect">
-            <a:avLst/>
-          </a:prstGeom>
-        </p:spPr>
-      </p:pic>
-    </p:spTree>
-  </p:cSld>
-  <p:clrMapOvr>
-    <a:masterClrMapping/>
-  </p:clrMapOvr>
-</p:sld>
-</file>
-
-<file path=ppt/slides/slide12.xml><?xml version="1.0" encoding="utf-8"?>
-<p:sld xmlns:a="http://schemas.openxmlformats.org/drawingml/2006/main" xmlns:r="http://schemas.openxmlformats.org/officeDocument/2006/relationships" xmlns:p="http://schemas.openxmlformats.org/presentationml/2006/main">
-  <p:cSld>
-    <p:spTree>
-      <p:nvGrpSpPr>
-        <p:cNvPr id="1" name=""/>
-        <p:cNvGrpSpPr/>
-        <p:nvPr/>
-      </p:nvGrpSpPr>
-      <p:grpSpPr>
-        <a:xfrm>
-          <a:off x="0" y="0"/>
-          <a:ext cx="0" cy="0"/>
-          <a:chOff x="0" y="0"/>
-          <a:chExt cx="0" cy="0"/>
-        </a:xfrm>
-      </p:grpSpPr>
-      <p:pic xmlns:a="http://schemas.openxmlformats.org/drawingml/2006/main" xmlns:r="http://schemas.openxmlformats.org/officeDocument/2006/relationships" xmlns:p="http://schemas.openxmlformats.org/presentationml/2006/main">
-        <p:nvPicPr>
-          <p:cNvPr id="2" name=""/>
-          <p:cNvPicPr>
-            <a:picLocks noGrp="1"/>
-          </p:cNvPicPr>
-          <p:nvPr>
-            <p:ph/>
-          </p:nvPr>
-        </p:nvPicPr>
-        <p:blipFill>
-          <a:blip cstate="print" r:embed="rId2"/>
-          <a:stretch>
-            <a:fillRect/>
-          </a:stretch>
-        </p:blipFill>
-        <p:spPr>
-          <a:xfrm>
-            <a:off x="0" y="0"/>
-            <a:ext cx="9144000" cy="6858000"/>
-          </a:xfrm>
-          <a:prstGeom prst="rect">
-            <a:avLst/>
-          </a:prstGeom>
-        </p:spPr>
-      </p:pic>
-    </p:spTree>
-  </p:cSld>
-  <p:clrMapOvr>
-    <a:masterClrMapping/>
-  </p:clrMapOvr>
-</p:sld>
-</file>
-
-<file path=ppt/slides/slide13.xml><?xml version="1.0" encoding="utf-8"?>
-<p:sld xmlns:a="http://schemas.openxmlformats.org/drawingml/2006/main" xmlns:r="http://schemas.openxmlformats.org/officeDocument/2006/relationships" xmlns:p="http://schemas.openxmlformats.org/presentationml/2006/main">
-  <p:cSld>
-    <p:spTree>
-      <p:nvGrpSpPr>
-        <p:cNvPr id="1" name=""/>
-        <p:cNvGrpSpPr/>
-        <p:nvPr/>
-      </p:nvGrpSpPr>
-      <p:grpSpPr>
-        <a:xfrm>
-          <a:off x="0" y="0"/>
-          <a:ext cx="0" cy="0"/>
-          <a:chOff x="0" y="0"/>
-          <a:chExt cx="0" cy="0"/>
-        </a:xfrm>
-      </p:grpSpPr>
-      <p:pic xmlns:a="http://schemas.openxmlformats.org/drawingml/2006/main" xmlns:r="http://schemas.openxmlformats.org/officeDocument/2006/relationships" xmlns:p="http://schemas.openxmlformats.org/presentationml/2006/main">
-        <p:nvPicPr>
-          <p:cNvPr id="2" name=""/>
-          <p:cNvPicPr>
-            <a:picLocks noGrp="1"/>
-          </p:cNvPicPr>
-          <p:nvPr>
-            <p:ph/>
-          </p:nvPr>
-        </p:nvPicPr>
-        <p:blipFill>
-          <a:blip cstate="print" r:embed="rId2"/>
-          <a:stretch>
-            <a:fillRect/>
-          </a:stretch>
-        </p:blipFill>
-        <p:spPr>
-          <a:xfrm>
-            <a:off x="0" y="0"/>
-            <a:ext cx="9144000" cy="6858000"/>
-          </a:xfrm>
-          <a:prstGeom prst="rect">
-            <a:avLst/>
-          </a:prstGeom>
-        </p:spPr>
-      </p:pic>
-    </p:spTree>
-  </p:cSld>
-  <p:clrMapOvr>
-    <a:masterClrMapping/>
-  </p:clrMapOvr>
-</p:sld>
-</file>
-
-<file path=ppt/slides/slide14.xml><?xml version="1.0" encoding="utf-8"?>
-<p:sld xmlns:a="http://schemas.openxmlformats.org/drawingml/2006/main" xmlns:r="http://schemas.openxmlformats.org/officeDocument/2006/relationships" xmlns:p="http://schemas.openxmlformats.org/presentationml/2006/main">
-  <p:cSld>
-    <p:spTree>
-      <p:nvGrpSpPr>
-        <p:cNvPr id="1" name=""/>
-        <p:cNvGrpSpPr/>
-        <p:nvPr/>
-      </p:nvGrpSpPr>
-      <p:grpSpPr>
-        <a:xfrm>
-          <a:off x="0" y="0"/>
-          <a:ext cx="0" cy="0"/>
-          <a:chOff x="0" y="0"/>
-          <a:chExt cx="0" cy="0"/>
-        </a:xfrm>
-      </p:grpSpPr>
-      <p:pic xmlns:a="http://schemas.openxmlformats.org/drawingml/2006/main" xmlns:r="http://schemas.openxmlformats.org/officeDocument/2006/relationships" xmlns:p="http://schemas.openxmlformats.org/presentationml/2006/main">
-        <p:nvPicPr>
-          <p:cNvPr id="2" name=""/>
-          <p:cNvPicPr>
-            <a:picLocks noGrp="1"/>
-          </p:cNvPicPr>
-          <p:nvPr>
-            <p:ph/>
-          </p:nvPr>
-        </p:nvPicPr>
-        <p:blipFill>
-          <a:blip cstate="print" r:embed="rId2"/>
-          <a:stretch>
-            <a:fillRect/>
-          </a:stretch>
-        </p:blipFill>
-        <p:spPr>
-          <a:xfrm>
-            <a:off x="0" y="0"/>
-            <a:ext cx="9144000" cy="6858000"/>
-          </a:xfrm>
-          <a:prstGeom prst="rect">
-            <a:avLst/>
-          </a:prstGeom>
-        </p:spPr>
-      </p:pic>
-    </p:spTree>
-  </p:cSld>
-  <p:clrMapOvr>
-    <a:masterClrMapping/>
-  </p:clrMapOvr>
-</p:sld>
-</file>
-
-<file path=ppt/slides/slide15.xml><?xml version="1.0" encoding="utf-8"?>
-<p:sld xmlns:a="http://schemas.openxmlformats.org/drawingml/2006/main" xmlns:r="http://schemas.openxmlformats.org/officeDocument/2006/relationships" xmlns:p="http://schemas.openxmlformats.org/presentationml/2006/main">
-  <p:cSld>
-    <p:spTree>
-      <p:nvGrpSpPr>
-        <p:cNvPr id="1" name=""/>
-        <p:cNvGrpSpPr/>
-        <p:nvPr/>
-      </p:nvGrpSpPr>
-      <p:grpSpPr>
-        <a:xfrm>
-          <a:off x="0" y="0"/>
-          <a:ext cx="0" cy="0"/>
-          <a:chOff x="0" y="0"/>
-          <a:chExt cx="0" cy="0"/>
-        </a:xfrm>
-      </p:grpSpPr>
-      <p:pic xmlns:a="http://schemas.openxmlformats.org/drawingml/2006/main" xmlns:r="http://schemas.openxmlformats.org/officeDocument/2006/relationships" xmlns:p="http://schemas.openxmlformats.org/presentationml/2006/main">
-        <p:nvPicPr>
-          <p:cNvPr id="2" name=""/>
-          <p:cNvPicPr>
-            <a:picLocks noGrp="1"/>
-          </p:cNvPicPr>
-          <p:nvPr>
-            <p:ph/>
-          </p:nvPr>
-        </p:nvPicPr>
-        <p:blipFill>
-          <a:blip cstate="print" r:embed="rId2"/>
-          <a:stretch>
-            <a:fillRect/>
-          </a:stretch>
-        </p:blipFill>
-        <p:spPr>
-          <a:xfrm>
-            <a:off x="0" y="0"/>
-            <a:ext cx="9144000" cy="6858000"/>
-          </a:xfrm>
-          <a:prstGeom prst="rect">
-            <a:avLst/>
-          </a:prstGeom>
-        </p:spPr>
-      </p:pic>
-    </p:spTree>
-  </p:cSld>
-  <p:clrMapOvr>
-    <a:masterClrMapping/>
-  </p:clrMapOvr>
-</p:sld>
-</file>
-
-<file path=ppt/slides/slide16.xml><?xml version="1.0" encoding="utf-8"?>
-<p:sld xmlns:a="http://schemas.openxmlformats.org/drawingml/2006/main" xmlns:r="http://schemas.openxmlformats.org/officeDocument/2006/relationships" xmlns:p="http://schemas.openxmlformats.org/presentationml/2006/main">
-  <p:cSld>
-    <p:spTree>
-      <p:nvGrpSpPr>
-        <p:cNvPr id="1" name=""/>
-        <p:cNvGrpSpPr/>
-        <p:nvPr/>
-      </p:nvGrpSpPr>
-      <p:grpSpPr>
-        <a:xfrm>
-          <a:off x="0" y="0"/>
-          <a:ext cx="0" cy="0"/>
-          <a:chOff x="0" y="0"/>
-          <a:chExt cx="0" cy="0"/>
-        </a:xfrm>
-      </p:grpSpPr>
-      <p:pic xmlns:a="http://schemas.openxmlformats.org/drawingml/2006/main" xmlns:r="http://schemas.openxmlformats.org/officeDocument/2006/relationships" xmlns:p="http://schemas.openxmlformats.org/presentationml/2006/main">
-        <p:nvPicPr>
-          <p:cNvPr id="2" name=""/>
-          <p:cNvPicPr>
-            <a:picLocks noGrp="1"/>
-          </p:cNvPicPr>
-          <p:nvPr>
-            <p:ph/>
-          </p:nvPr>
-        </p:nvPicPr>
-        <p:blipFill>
-          <a:blip cstate="print" r:embed="rId2"/>
-          <a:stretch>
-            <a:fillRect/>
-          </a:stretch>
-        </p:blipFill>
-        <p:spPr>
-          <a:xfrm>
-            <a:off x="0" y="0"/>
-            <a:ext cx="9144000" cy="6858000"/>
-          </a:xfrm>
-          <a:prstGeom prst="rect">
-            <a:avLst/>
-          </a:prstGeom>
-        </p:spPr>
-      </p:pic>
-    </p:spTree>
-  </p:cSld>
-  <p:clrMapOvr>
-    <a:masterClrMapping/>
-  </p:clrMapOvr>
-</p:sld>
-</file>
-
-<file path=ppt/slides/slide17.xml><?xml version="1.0" encoding="utf-8"?>
-<p:sld xmlns:a="http://schemas.openxmlformats.org/drawingml/2006/main" xmlns:r="http://schemas.openxmlformats.org/officeDocument/2006/relationships" xmlns:p="http://schemas.openxmlformats.org/presentationml/2006/main">
-  <p:cSld>
-    <p:spTree>
-      <p:nvGrpSpPr>
-        <p:cNvPr id="1" name=""/>
-        <p:cNvGrpSpPr/>
-        <p:nvPr/>
-      </p:nvGrpSpPr>
-      <p:grpSpPr>
-        <a:xfrm>
-          <a:off x="0" y="0"/>
-          <a:ext cx="0" cy="0"/>
-          <a:chOff x="0" y="0"/>
-          <a:chExt cx="0" cy="0"/>
-        </a:xfrm>
-      </p:grpSpPr>
-      <p:pic xmlns:a="http://schemas.openxmlformats.org/drawingml/2006/main" xmlns:r="http://schemas.openxmlformats.org/officeDocument/2006/relationships" xmlns:p="http://schemas.openxmlformats.org/presentationml/2006/main">
-        <p:nvPicPr>
-          <p:cNvPr id="2" name=""/>
-          <p:cNvPicPr>
-            <a:picLocks noGrp="1"/>
-          </p:cNvPicPr>
-          <p:nvPr>
-            <p:ph/>
-          </p:nvPr>
-        </p:nvPicPr>
-        <p:blipFill>
-          <a:blip cstate="print" r:embed="rId2"/>
-          <a:stretch>
-            <a:fillRect/>
-          </a:stretch>
-        </p:blipFill>
-        <p:spPr>
-          <a:xfrm>
-            <a:off x="0" y="0"/>
-            <a:ext cx="9144000" cy="6858000"/>
-          </a:xfrm>
-          <a:prstGeom prst="rect">
-            <a:avLst/>
-          </a:prstGeom>
-        </p:spPr>
-      </p:pic>
-    </p:spTree>
-  </p:cSld>
-  <p:clrMapOvr>
-    <a:masterClrMapping/>
-  </p:clrMapOvr>
-</p:sld>
-</file>
-
-<file path=ppt/slides/slide18.xml><?xml version="1.0" encoding="utf-8"?>
-<p:sld xmlns:a="http://schemas.openxmlformats.org/drawingml/2006/main" xmlns:r="http://schemas.openxmlformats.org/officeDocument/2006/relationships" xmlns:p="http://schemas.openxmlformats.org/presentationml/2006/main">
-  <p:cSld>
-    <p:spTree>
-      <p:nvGrpSpPr>
-        <p:cNvPr id="1" name=""/>
-        <p:cNvGrpSpPr/>
-        <p:nvPr/>
-      </p:nvGrpSpPr>
-      <p:grpSpPr>
-        <a:xfrm>
-          <a:off x="0" y="0"/>
-          <a:ext cx="0" cy="0"/>
-          <a:chOff x="0" y="0"/>
-          <a:chExt cx="0" cy="0"/>
-        </a:xfrm>
-      </p:grpSpPr>
-      <p:pic xmlns:a="http://schemas.openxmlformats.org/drawingml/2006/main" xmlns:r="http://schemas.openxmlformats.org/officeDocument/2006/relationships" xmlns:p="http://schemas.openxmlformats.org/presentationml/2006/main">
-        <p:nvPicPr>
-          <p:cNvPr id="2" name=""/>
-          <p:cNvPicPr>
-            <a:picLocks noGrp="1"/>
-          </p:cNvPicPr>
-          <p:nvPr>
-            <p:ph/>
-          </p:nvPr>
-        </p:nvPicPr>
-        <p:blipFill>
-          <a:blip cstate="print" r:embed="rId2"/>
-          <a:stretch>
-            <a:fillRect/>
-          </a:stretch>
-        </p:blipFill>
-        <p:spPr>
-          <a:xfrm>
-            <a:off x="0" y="0"/>
-            <a:ext cx="9144000" cy="6858000"/>
-          </a:xfrm>
-          <a:prstGeom prst="rect">
-            <a:avLst/>
-          </a:prstGeom>
-        </p:spPr>
-      </p:pic>
-    </p:spTree>
-  </p:cSld>
-  <p:clrMapOvr>
-    <a:masterClrMapping/>
-  </p:clrMapOvr>
-</p:sld>
-</file>
-
-<file path=ppt/slides/slide19.xml><?xml version="1.0" encoding="utf-8"?>
-<p:sld xmlns:a="http://schemas.openxmlformats.org/drawingml/2006/main" xmlns:r="http://schemas.openxmlformats.org/officeDocument/2006/relationships" xmlns:p="http://schemas.openxmlformats.org/presentationml/2006/main">
-  <p:cSld>
-    <p:spTree>
-      <p:nvGrpSpPr>
-        <p:cNvPr id="1" name=""/>
-        <p:cNvGrpSpPr/>
-        <p:nvPr/>
-      </p:nvGrpSpPr>
-      <p:grpSpPr>
-        <a:xfrm>
-          <a:off x="0" y="0"/>
-          <a:ext cx="0" cy="0"/>
-          <a:chOff x="0" y="0"/>
-          <a:chExt cx="0" cy="0"/>
-        </a:xfrm>
-      </p:grpSpPr>
-      <p:pic xmlns:a="http://schemas.openxmlformats.org/drawingml/2006/main" xmlns:r="http://schemas.openxmlformats.org/officeDocument/2006/relationships" xmlns:p="http://schemas.openxmlformats.org/presentationml/2006/main">
-        <p:nvPicPr>
-          <p:cNvPr id="2" name=""/>
+          <p:cNvPr id="2" name="" descr=""/>
           <p:cNvPicPr>
             <a:picLocks noGrp="1"/>
           </p:cNvPicPr>
@@ -2813,517 +2271,7 @@
       </p:grpSpPr>
       <p:pic xmlns:a="http://schemas.openxmlformats.org/drawingml/2006/main" xmlns:r="http://schemas.openxmlformats.org/officeDocument/2006/relationships" xmlns:p="http://schemas.openxmlformats.org/presentationml/2006/main">
         <p:nvPicPr>
-          <p:cNvPr id="2" name=""/>
-          <p:cNvPicPr>
-            <a:picLocks noGrp="1"/>
-          </p:cNvPicPr>
-          <p:nvPr>
-            <p:ph/>
-          </p:nvPr>
-        </p:nvPicPr>
-        <p:blipFill>
-          <a:blip cstate="print" r:embed="rId2"/>
-          <a:stretch>
-            <a:fillRect/>
-          </a:stretch>
-        </p:blipFill>
-        <p:spPr>
-          <a:xfrm>
-            <a:off x="0" y="0"/>
-            <a:ext cx="9144000" cy="6858000"/>
-          </a:xfrm>
-          <a:prstGeom prst="rect">
-            <a:avLst/>
-          </a:prstGeom>
-        </p:spPr>
-      </p:pic>
-    </p:spTree>
-  </p:cSld>
-  <p:clrMapOvr>
-    <a:masterClrMapping/>
-  </p:clrMapOvr>
-</p:sld>
-</file>
-
-<file path=ppt/slides/slide20.xml><?xml version="1.0" encoding="utf-8"?>
-<p:sld xmlns:a="http://schemas.openxmlformats.org/drawingml/2006/main" xmlns:r="http://schemas.openxmlformats.org/officeDocument/2006/relationships" xmlns:p="http://schemas.openxmlformats.org/presentationml/2006/main">
-  <p:cSld>
-    <p:spTree>
-      <p:nvGrpSpPr>
-        <p:cNvPr id="1" name=""/>
-        <p:cNvGrpSpPr/>
-        <p:nvPr/>
-      </p:nvGrpSpPr>
-      <p:grpSpPr>
-        <a:xfrm>
-          <a:off x="0" y="0"/>
-          <a:ext cx="0" cy="0"/>
-          <a:chOff x="0" y="0"/>
-          <a:chExt cx="0" cy="0"/>
-        </a:xfrm>
-      </p:grpSpPr>
-      <p:pic xmlns:a="http://schemas.openxmlformats.org/drawingml/2006/main" xmlns:r="http://schemas.openxmlformats.org/officeDocument/2006/relationships" xmlns:p="http://schemas.openxmlformats.org/presentationml/2006/main">
-        <p:nvPicPr>
-          <p:cNvPr id="2" name=""/>
-          <p:cNvPicPr>
-            <a:picLocks noGrp="1"/>
-          </p:cNvPicPr>
-          <p:nvPr>
-            <p:ph/>
-          </p:nvPr>
-        </p:nvPicPr>
-        <p:blipFill>
-          <a:blip cstate="print" r:embed="rId2"/>
-          <a:stretch>
-            <a:fillRect/>
-          </a:stretch>
-        </p:blipFill>
-        <p:spPr>
-          <a:xfrm>
-            <a:off x="0" y="0"/>
-            <a:ext cx="9144000" cy="6858000"/>
-          </a:xfrm>
-          <a:prstGeom prst="rect">
-            <a:avLst/>
-          </a:prstGeom>
-        </p:spPr>
-      </p:pic>
-    </p:spTree>
-  </p:cSld>
-  <p:clrMapOvr>
-    <a:masterClrMapping/>
-  </p:clrMapOvr>
-</p:sld>
-</file>
-
-<file path=ppt/slides/slide21.xml><?xml version="1.0" encoding="utf-8"?>
-<p:sld xmlns:a="http://schemas.openxmlformats.org/drawingml/2006/main" xmlns:r="http://schemas.openxmlformats.org/officeDocument/2006/relationships" xmlns:p="http://schemas.openxmlformats.org/presentationml/2006/main">
-  <p:cSld>
-    <p:spTree>
-      <p:nvGrpSpPr>
-        <p:cNvPr id="1" name=""/>
-        <p:cNvGrpSpPr/>
-        <p:nvPr/>
-      </p:nvGrpSpPr>
-      <p:grpSpPr>
-        <a:xfrm>
-          <a:off x="0" y="0"/>
-          <a:ext cx="0" cy="0"/>
-          <a:chOff x="0" y="0"/>
-          <a:chExt cx="0" cy="0"/>
-        </a:xfrm>
-      </p:grpSpPr>
-      <p:pic xmlns:a="http://schemas.openxmlformats.org/drawingml/2006/main" xmlns:r="http://schemas.openxmlformats.org/officeDocument/2006/relationships" xmlns:p="http://schemas.openxmlformats.org/presentationml/2006/main">
-        <p:nvPicPr>
-          <p:cNvPr id="2" name=""/>
-          <p:cNvPicPr>
-            <a:picLocks noGrp="1"/>
-          </p:cNvPicPr>
-          <p:nvPr>
-            <p:ph/>
-          </p:nvPr>
-        </p:nvPicPr>
-        <p:blipFill>
-          <a:blip cstate="print" r:embed="rId2"/>
-          <a:stretch>
-            <a:fillRect/>
-          </a:stretch>
-        </p:blipFill>
-        <p:spPr>
-          <a:xfrm>
-            <a:off x="0" y="0"/>
-            <a:ext cx="9144000" cy="6858000"/>
-          </a:xfrm>
-          <a:prstGeom prst="rect">
-            <a:avLst/>
-          </a:prstGeom>
-        </p:spPr>
-      </p:pic>
-    </p:spTree>
-  </p:cSld>
-  <p:clrMapOvr>
-    <a:masterClrMapping/>
-  </p:clrMapOvr>
-</p:sld>
-</file>
-
-<file path=ppt/slides/slide22.xml><?xml version="1.0" encoding="utf-8"?>
-<p:sld xmlns:a="http://schemas.openxmlformats.org/drawingml/2006/main" xmlns:r="http://schemas.openxmlformats.org/officeDocument/2006/relationships" xmlns:p="http://schemas.openxmlformats.org/presentationml/2006/main">
-  <p:cSld>
-    <p:spTree>
-      <p:nvGrpSpPr>
-        <p:cNvPr id="1" name=""/>
-        <p:cNvGrpSpPr/>
-        <p:nvPr/>
-      </p:nvGrpSpPr>
-      <p:grpSpPr>
-        <a:xfrm>
-          <a:off x="0" y="0"/>
-          <a:ext cx="0" cy="0"/>
-          <a:chOff x="0" y="0"/>
-          <a:chExt cx="0" cy="0"/>
-        </a:xfrm>
-      </p:grpSpPr>
-      <p:pic xmlns:a="http://schemas.openxmlformats.org/drawingml/2006/main" xmlns:r="http://schemas.openxmlformats.org/officeDocument/2006/relationships" xmlns:p="http://schemas.openxmlformats.org/presentationml/2006/main">
-        <p:nvPicPr>
-          <p:cNvPr id="2" name=""/>
-          <p:cNvPicPr>
-            <a:picLocks noGrp="1"/>
-          </p:cNvPicPr>
-          <p:nvPr>
-            <p:ph/>
-          </p:nvPr>
-        </p:nvPicPr>
-        <p:blipFill>
-          <a:blip cstate="print" r:embed="rId2"/>
-          <a:stretch>
-            <a:fillRect/>
-          </a:stretch>
-        </p:blipFill>
-        <p:spPr>
-          <a:xfrm>
-            <a:off x="0" y="0"/>
-            <a:ext cx="9144000" cy="6858000"/>
-          </a:xfrm>
-          <a:prstGeom prst="rect">
-            <a:avLst/>
-          </a:prstGeom>
-        </p:spPr>
-      </p:pic>
-    </p:spTree>
-  </p:cSld>
-  <p:clrMapOvr>
-    <a:masterClrMapping/>
-  </p:clrMapOvr>
-</p:sld>
-</file>
-
-<file path=ppt/slides/slide23.xml><?xml version="1.0" encoding="utf-8"?>
-<p:sld xmlns:a="http://schemas.openxmlformats.org/drawingml/2006/main" xmlns:r="http://schemas.openxmlformats.org/officeDocument/2006/relationships" xmlns:p="http://schemas.openxmlformats.org/presentationml/2006/main">
-  <p:cSld>
-    <p:spTree>
-      <p:nvGrpSpPr>
-        <p:cNvPr id="1" name=""/>
-        <p:cNvGrpSpPr/>
-        <p:nvPr/>
-      </p:nvGrpSpPr>
-      <p:grpSpPr>
-        <a:xfrm>
-          <a:off x="0" y="0"/>
-          <a:ext cx="0" cy="0"/>
-          <a:chOff x="0" y="0"/>
-          <a:chExt cx="0" cy="0"/>
-        </a:xfrm>
-      </p:grpSpPr>
-      <p:pic xmlns:a="http://schemas.openxmlformats.org/drawingml/2006/main" xmlns:r="http://schemas.openxmlformats.org/officeDocument/2006/relationships" xmlns:p="http://schemas.openxmlformats.org/presentationml/2006/main">
-        <p:nvPicPr>
-          <p:cNvPr id="2" name=""/>
-          <p:cNvPicPr>
-            <a:picLocks noGrp="1"/>
-          </p:cNvPicPr>
-          <p:nvPr>
-            <p:ph/>
-          </p:nvPr>
-        </p:nvPicPr>
-        <p:blipFill>
-          <a:blip cstate="print" r:embed="rId2"/>
-          <a:stretch>
-            <a:fillRect/>
-          </a:stretch>
-        </p:blipFill>
-        <p:spPr>
-          <a:xfrm>
-            <a:off x="0" y="0"/>
-            <a:ext cx="9144000" cy="6858000"/>
-          </a:xfrm>
-          <a:prstGeom prst="rect">
-            <a:avLst/>
-          </a:prstGeom>
-        </p:spPr>
-      </p:pic>
-    </p:spTree>
-  </p:cSld>
-  <p:clrMapOvr>
-    <a:masterClrMapping/>
-  </p:clrMapOvr>
-</p:sld>
-</file>
-
-<file path=ppt/slides/slide24.xml><?xml version="1.0" encoding="utf-8"?>
-<p:sld xmlns:a="http://schemas.openxmlformats.org/drawingml/2006/main" xmlns:r="http://schemas.openxmlformats.org/officeDocument/2006/relationships" xmlns:p="http://schemas.openxmlformats.org/presentationml/2006/main">
-  <p:cSld>
-    <p:spTree>
-      <p:nvGrpSpPr>
-        <p:cNvPr id="1" name=""/>
-        <p:cNvGrpSpPr/>
-        <p:nvPr/>
-      </p:nvGrpSpPr>
-      <p:grpSpPr>
-        <a:xfrm>
-          <a:off x="0" y="0"/>
-          <a:ext cx="0" cy="0"/>
-          <a:chOff x="0" y="0"/>
-          <a:chExt cx="0" cy="0"/>
-        </a:xfrm>
-      </p:grpSpPr>
-      <p:pic xmlns:a="http://schemas.openxmlformats.org/drawingml/2006/main" xmlns:r="http://schemas.openxmlformats.org/officeDocument/2006/relationships" xmlns:p="http://schemas.openxmlformats.org/presentationml/2006/main">
-        <p:nvPicPr>
-          <p:cNvPr id="2" name=""/>
-          <p:cNvPicPr>
-            <a:picLocks noGrp="1"/>
-          </p:cNvPicPr>
-          <p:nvPr>
-            <p:ph/>
-          </p:nvPr>
-        </p:nvPicPr>
-        <p:blipFill>
-          <a:blip cstate="print" r:embed="rId2"/>
-          <a:stretch>
-            <a:fillRect/>
-          </a:stretch>
-        </p:blipFill>
-        <p:spPr>
-          <a:xfrm>
-            <a:off x="0" y="0"/>
-            <a:ext cx="9144000" cy="6858000"/>
-          </a:xfrm>
-          <a:prstGeom prst="rect">
-            <a:avLst/>
-          </a:prstGeom>
-        </p:spPr>
-      </p:pic>
-    </p:spTree>
-  </p:cSld>
-  <p:clrMapOvr>
-    <a:masterClrMapping/>
-  </p:clrMapOvr>
-</p:sld>
-</file>
-
-<file path=ppt/slides/slide25.xml><?xml version="1.0" encoding="utf-8"?>
-<p:sld xmlns:a="http://schemas.openxmlformats.org/drawingml/2006/main" xmlns:r="http://schemas.openxmlformats.org/officeDocument/2006/relationships" xmlns:p="http://schemas.openxmlformats.org/presentationml/2006/main">
-  <p:cSld>
-    <p:spTree>
-      <p:nvGrpSpPr>
-        <p:cNvPr id="1" name=""/>
-        <p:cNvGrpSpPr/>
-        <p:nvPr/>
-      </p:nvGrpSpPr>
-      <p:grpSpPr>
-        <a:xfrm>
-          <a:off x="0" y="0"/>
-          <a:ext cx="0" cy="0"/>
-          <a:chOff x="0" y="0"/>
-          <a:chExt cx="0" cy="0"/>
-        </a:xfrm>
-      </p:grpSpPr>
-      <p:pic xmlns:a="http://schemas.openxmlformats.org/drawingml/2006/main" xmlns:r="http://schemas.openxmlformats.org/officeDocument/2006/relationships" xmlns:p="http://schemas.openxmlformats.org/presentationml/2006/main">
-        <p:nvPicPr>
-          <p:cNvPr id="2" name=""/>
-          <p:cNvPicPr>
-            <a:picLocks noGrp="1"/>
-          </p:cNvPicPr>
-          <p:nvPr>
-            <p:ph/>
-          </p:nvPr>
-        </p:nvPicPr>
-        <p:blipFill>
-          <a:blip cstate="print" r:embed="rId2"/>
-          <a:stretch>
-            <a:fillRect/>
-          </a:stretch>
-        </p:blipFill>
-        <p:spPr>
-          <a:xfrm>
-            <a:off x="0" y="0"/>
-            <a:ext cx="9144000" cy="6858000"/>
-          </a:xfrm>
-          <a:prstGeom prst="rect">
-            <a:avLst/>
-          </a:prstGeom>
-        </p:spPr>
-      </p:pic>
-    </p:spTree>
-  </p:cSld>
-  <p:clrMapOvr>
-    <a:masterClrMapping/>
-  </p:clrMapOvr>
-</p:sld>
-</file>
-
-<file path=ppt/slides/slide26.xml><?xml version="1.0" encoding="utf-8"?>
-<p:sld xmlns:a="http://schemas.openxmlformats.org/drawingml/2006/main" xmlns:r="http://schemas.openxmlformats.org/officeDocument/2006/relationships" xmlns:p="http://schemas.openxmlformats.org/presentationml/2006/main">
-  <p:cSld>
-    <p:spTree>
-      <p:nvGrpSpPr>
-        <p:cNvPr id="1" name=""/>
-        <p:cNvGrpSpPr/>
-        <p:nvPr/>
-      </p:nvGrpSpPr>
-      <p:grpSpPr>
-        <a:xfrm>
-          <a:off x="0" y="0"/>
-          <a:ext cx="0" cy="0"/>
-          <a:chOff x="0" y="0"/>
-          <a:chExt cx="0" cy="0"/>
-        </a:xfrm>
-      </p:grpSpPr>
-      <p:pic xmlns:a="http://schemas.openxmlformats.org/drawingml/2006/main" xmlns:r="http://schemas.openxmlformats.org/officeDocument/2006/relationships" xmlns:p="http://schemas.openxmlformats.org/presentationml/2006/main">
-        <p:nvPicPr>
-          <p:cNvPr id="2" name=""/>
-          <p:cNvPicPr>
-            <a:picLocks noGrp="1"/>
-          </p:cNvPicPr>
-          <p:nvPr>
-            <p:ph/>
-          </p:nvPr>
-        </p:nvPicPr>
-        <p:blipFill>
-          <a:blip cstate="print" r:embed="rId2"/>
-          <a:stretch>
-            <a:fillRect/>
-          </a:stretch>
-        </p:blipFill>
-        <p:spPr>
-          <a:xfrm>
-            <a:off x="0" y="0"/>
-            <a:ext cx="9144000" cy="6858000"/>
-          </a:xfrm>
-          <a:prstGeom prst="rect">
-            <a:avLst/>
-          </a:prstGeom>
-        </p:spPr>
-      </p:pic>
-    </p:spTree>
-  </p:cSld>
-  <p:clrMapOvr>
-    <a:masterClrMapping/>
-  </p:clrMapOvr>
-</p:sld>
-</file>
-
-<file path=ppt/slides/slide27.xml><?xml version="1.0" encoding="utf-8"?>
-<p:sld xmlns:a="http://schemas.openxmlformats.org/drawingml/2006/main" xmlns:r="http://schemas.openxmlformats.org/officeDocument/2006/relationships" xmlns:p="http://schemas.openxmlformats.org/presentationml/2006/main">
-  <p:cSld>
-    <p:spTree>
-      <p:nvGrpSpPr>
-        <p:cNvPr id="1" name=""/>
-        <p:cNvGrpSpPr/>
-        <p:nvPr/>
-      </p:nvGrpSpPr>
-      <p:grpSpPr>
-        <a:xfrm>
-          <a:off x="0" y="0"/>
-          <a:ext cx="0" cy="0"/>
-          <a:chOff x="0" y="0"/>
-          <a:chExt cx="0" cy="0"/>
-        </a:xfrm>
-      </p:grpSpPr>
-      <p:pic xmlns:a="http://schemas.openxmlformats.org/drawingml/2006/main" xmlns:r="http://schemas.openxmlformats.org/officeDocument/2006/relationships" xmlns:p="http://schemas.openxmlformats.org/presentationml/2006/main">
-        <p:nvPicPr>
-          <p:cNvPr id="2" name=""/>
-          <p:cNvPicPr>
-            <a:picLocks noGrp="1"/>
-          </p:cNvPicPr>
-          <p:nvPr>
-            <p:ph/>
-          </p:nvPr>
-        </p:nvPicPr>
-        <p:blipFill>
-          <a:blip cstate="print" r:embed="rId2"/>
-          <a:stretch>
-            <a:fillRect/>
-          </a:stretch>
-        </p:blipFill>
-        <p:spPr>
-          <a:xfrm>
-            <a:off x="0" y="0"/>
-            <a:ext cx="9144000" cy="6858000"/>
-          </a:xfrm>
-          <a:prstGeom prst="rect">
-            <a:avLst/>
-          </a:prstGeom>
-        </p:spPr>
-      </p:pic>
-    </p:spTree>
-  </p:cSld>
-  <p:clrMapOvr>
-    <a:masterClrMapping/>
-  </p:clrMapOvr>
-</p:sld>
-</file>
-
-<file path=ppt/slides/slide28.xml><?xml version="1.0" encoding="utf-8"?>
-<p:sld xmlns:a="http://schemas.openxmlformats.org/drawingml/2006/main" xmlns:r="http://schemas.openxmlformats.org/officeDocument/2006/relationships" xmlns:p="http://schemas.openxmlformats.org/presentationml/2006/main">
-  <p:cSld>
-    <p:spTree>
-      <p:nvGrpSpPr>
-        <p:cNvPr id="1" name=""/>
-        <p:cNvGrpSpPr/>
-        <p:nvPr/>
-      </p:nvGrpSpPr>
-      <p:grpSpPr>
-        <a:xfrm>
-          <a:off x="0" y="0"/>
-          <a:ext cx="0" cy="0"/>
-          <a:chOff x="0" y="0"/>
-          <a:chExt cx="0" cy="0"/>
-        </a:xfrm>
-      </p:grpSpPr>
-      <p:pic xmlns:a="http://schemas.openxmlformats.org/drawingml/2006/main" xmlns:r="http://schemas.openxmlformats.org/officeDocument/2006/relationships" xmlns:p="http://schemas.openxmlformats.org/presentationml/2006/main">
-        <p:nvPicPr>
-          <p:cNvPr id="2" name=""/>
-          <p:cNvPicPr>
-            <a:picLocks noGrp="1"/>
-          </p:cNvPicPr>
-          <p:nvPr>
-            <p:ph/>
-          </p:nvPr>
-        </p:nvPicPr>
-        <p:blipFill>
-          <a:blip cstate="print" r:embed="rId2"/>
-          <a:stretch>
-            <a:fillRect/>
-          </a:stretch>
-        </p:blipFill>
-        <p:spPr>
-          <a:xfrm>
-            <a:off x="0" y="0"/>
-            <a:ext cx="9144000" cy="6858000"/>
-          </a:xfrm>
-          <a:prstGeom prst="rect">
-            <a:avLst/>
-          </a:prstGeom>
-        </p:spPr>
-      </p:pic>
-    </p:spTree>
-  </p:cSld>
-  <p:clrMapOvr>
-    <a:masterClrMapping/>
-  </p:clrMapOvr>
-</p:sld>
-</file>
-
-<file path=ppt/slides/slide29.xml><?xml version="1.0" encoding="utf-8"?>
-<p:sld xmlns:a="http://schemas.openxmlformats.org/drawingml/2006/main" xmlns:r="http://schemas.openxmlformats.org/officeDocument/2006/relationships" xmlns:p="http://schemas.openxmlformats.org/presentationml/2006/main">
-  <p:cSld>
-    <p:spTree>
-      <p:nvGrpSpPr>
-        <p:cNvPr id="1" name=""/>
-        <p:cNvGrpSpPr/>
-        <p:nvPr/>
-      </p:nvGrpSpPr>
-      <p:grpSpPr>
-        <a:xfrm>
-          <a:off x="0" y="0"/>
-          <a:ext cx="0" cy="0"/>
-          <a:chOff x="0" y="0"/>
-          <a:chExt cx="0" cy="0"/>
-        </a:xfrm>
-      </p:grpSpPr>
-      <p:pic xmlns:a="http://schemas.openxmlformats.org/drawingml/2006/main" xmlns:r="http://schemas.openxmlformats.org/officeDocument/2006/relationships" xmlns:p="http://schemas.openxmlformats.org/presentationml/2006/main">
-        <p:nvPicPr>
-          <p:cNvPr id="2" name=""/>
+          <p:cNvPr id="2" name="" descr=""/>
           <p:cNvPicPr>
             <a:picLocks noGrp="1"/>
           </p:cNvPicPr>
@@ -3374,415 +2322,7 @@
       </p:grpSpPr>
       <p:pic xmlns:a="http://schemas.openxmlformats.org/drawingml/2006/main" xmlns:r="http://schemas.openxmlformats.org/officeDocument/2006/relationships" xmlns:p="http://schemas.openxmlformats.org/presentationml/2006/main">
         <p:nvPicPr>
-          <p:cNvPr id="2" name=""/>
-          <p:cNvPicPr>
-            <a:picLocks noGrp="1"/>
-          </p:cNvPicPr>
-          <p:nvPr>
-            <p:ph/>
-          </p:nvPr>
-        </p:nvPicPr>
-        <p:blipFill>
-          <a:blip cstate="print" r:embed="rId2"/>
-          <a:stretch>
-            <a:fillRect/>
-          </a:stretch>
-        </p:blipFill>
-        <p:spPr>
-          <a:xfrm>
-            <a:off x="0" y="0"/>
-            <a:ext cx="9144000" cy="6858000"/>
-          </a:xfrm>
-          <a:prstGeom prst="rect">
-            <a:avLst/>
-          </a:prstGeom>
-        </p:spPr>
-      </p:pic>
-    </p:spTree>
-  </p:cSld>
-  <p:clrMapOvr>
-    <a:masterClrMapping/>
-  </p:clrMapOvr>
-</p:sld>
-</file>
-
-<file path=ppt/slides/slide30.xml><?xml version="1.0" encoding="utf-8"?>
-<p:sld xmlns:a="http://schemas.openxmlformats.org/drawingml/2006/main" xmlns:r="http://schemas.openxmlformats.org/officeDocument/2006/relationships" xmlns:p="http://schemas.openxmlformats.org/presentationml/2006/main">
-  <p:cSld>
-    <p:spTree>
-      <p:nvGrpSpPr>
-        <p:cNvPr id="1" name=""/>
-        <p:cNvGrpSpPr/>
-        <p:nvPr/>
-      </p:nvGrpSpPr>
-      <p:grpSpPr>
-        <a:xfrm>
-          <a:off x="0" y="0"/>
-          <a:ext cx="0" cy="0"/>
-          <a:chOff x="0" y="0"/>
-          <a:chExt cx="0" cy="0"/>
-        </a:xfrm>
-      </p:grpSpPr>
-      <p:pic xmlns:a="http://schemas.openxmlformats.org/drawingml/2006/main" xmlns:r="http://schemas.openxmlformats.org/officeDocument/2006/relationships" xmlns:p="http://schemas.openxmlformats.org/presentationml/2006/main">
-        <p:nvPicPr>
-          <p:cNvPr id="2" name=""/>
-          <p:cNvPicPr>
-            <a:picLocks noGrp="1"/>
-          </p:cNvPicPr>
-          <p:nvPr>
-            <p:ph/>
-          </p:nvPr>
-        </p:nvPicPr>
-        <p:blipFill>
-          <a:blip cstate="print" r:embed="rId2"/>
-          <a:stretch>
-            <a:fillRect/>
-          </a:stretch>
-        </p:blipFill>
-        <p:spPr>
-          <a:xfrm>
-            <a:off x="0" y="0"/>
-            <a:ext cx="9144000" cy="6858000"/>
-          </a:xfrm>
-          <a:prstGeom prst="rect">
-            <a:avLst/>
-          </a:prstGeom>
-        </p:spPr>
-      </p:pic>
-    </p:spTree>
-  </p:cSld>
-  <p:clrMapOvr>
-    <a:masterClrMapping/>
-  </p:clrMapOvr>
-</p:sld>
-</file>
-
-<file path=ppt/slides/slide31.xml><?xml version="1.0" encoding="utf-8"?>
-<p:sld xmlns:a="http://schemas.openxmlformats.org/drawingml/2006/main" xmlns:r="http://schemas.openxmlformats.org/officeDocument/2006/relationships" xmlns:p="http://schemas.openxmlformats.org/presentationml/2006/main">
-  <p:cSld>
-    <p:spTree>
-      <p:nvGrpSpPr>
-        <p:cNvPr id="1" name=""/>
-        <p:cNvGrpSpPr/>
-        <p:nvPr/>
-      </p:nvGrpSpPr>
-      <p:grpSpPr>
-        <a:xfrm>
-          <a:off x="0" y="0"/>
-          <a:ext cx="0" cy="0"/>
-          <a:chOff x="0" y="0"/>
-          <a:chExt cx="0" cy="0"/>
-        </a:xfrm>
-      </p:grpSpPr>
-      <p:pic xmlns:a="http://schemas.openxmlformats.org/drawingml/2006/main" xmlns:r="http://schemas.openxmlformats.org/officeDocument/2006/relationships" xmlns:p="http://schemas.openxmlformats.org/presentationml/2006/main">
-        <p:nvPicPr>
-          <p:cNvPr id="2" name=""/>
-          <p:cNvPicPr>
-            <a:picLocks noGrp="1"/>
-          </p:cNvPicPr>
-          <p:nvPr>
-            <p:ph/>
-          </p:nvPr>
-        </p:nvPicPr>
-        <p:blipFill>
-          <a:blip cstate="print" r:embed="rId2"/>
-          <a:stretch>
-            <a:fillRect/>
-          </a:stretch>
-        </p:blipFill>
-        <p:spPr>
-          <a:xfrm>
-            <a:off x="0" y="0"/>
-            <a:ext cx="9144000" cy="6858000"/>
-          </a:xfrm>
-          <a:prstGeom prst="rect">
-            <a:avLst/>
-          </a:prstGeom>
-        </p:spPr>
-      </p:pic>
-    </p:spTree>
-  </p:cSld>
-  <p:clrMapOvr>
-    <a:masterClrMapping/>
-  </p:clrMapOvr>
-</p:sld>
-</file>
-
-<file path=ppt/slides/slide32.xml><?xml version="1.0" encoding="utf-8"?>
-<p:sld xmlns:a="http://schemas.openxmlformats.org/drawingml/2006/main" xmlns:r="http://schemas.openxmlformats.org/officeDocument/2006/relationships" xmlns:p="http://schemas.openxmlformats.org/presentationml/2006/main">
-  <p:cSld>
-    <p:spTree>
-      <p:nvGrpSpPr>
-        <p:cNvPr id="1" name=""/>
-        <p:cNvGrpSpPr/>
-        <p:nvPr/>
-      </p:nvGrpSpPr>
-      <p:grpSpPr>
-        <a:xfrm>
-          <a:off x="0" y="0"/>
-          <a:ext cx="0" cy="0"/>
-          <a:chOff x="0" y="0"/>
-          <a:chExt cx="0" cy="0"/>
-        </a:xfrm>
-      </p:grpSpPr>
-      <p:pic xmlns:a="http://schemas.openxmlformats.org/drawingml/2006/main" xmlns:r="http://schemas.openxmlformats.org/officeDocument/2006/relationships" xmlns:p="http://schemas.openxmlformats.org/presentationml/2006/main">
-        <p:nvPicPr>
-          <p:cNvPr id="2" name=""/>
-          <p:cNvPicPr>
-            <a:picLocks noGrp="1"/>
-          </p:cNvPicPr>
-          <p:nvPr>
-            <p:ph/>
-          </p:nvPr>
-        </p:nvPicPr>
-        <p:blipFill>
-          <a:blip cstate="print" r:embed="rId2"/>
-          <a:stretch>
-            <a:fillRect/>
-          </a:stretch>
-        </p:blipFill>
-        <p:spPr>
-          <a:xfrm>
-            <a:off x="0" y="0"/>
-            <a:ext cx="9144000" cy="6858000"/>
-          </a:xfrm>
-          <a:prstGeom prst="rect">
-            <a:avLst/>
-          </a:prstGeom>
-        </p:spPr>
-      </p:pic>
-    </p:spTree>
-  </p:cSld>
-  <p:clrMapOvr>
-    <a:masterClrMapping/>
-  </p:clrMapOvr>
-</p:sld>
-</file>
-
-<file path=ppt/slides/slide33.xml><?xml version="1.0" encoding="utf-8"?>
-<p:sld xmlns:a="http://schemas.openxmlformats.org/drawingml/2006/main" xmlns:r="http://schemas.openxmlformats.org/officeDocument/2006/relationships" xmlns:p="http://schemas.openxmlformats.org/presentationml/2006/main">
-  <p:cSld>
-    <p:spTree>
-      <p:nvGrpSpPr>
-        <p:cNvPr id="1" name=""/>
-        <p:cNvGrpSpPr/>
-        <p:nvPr/>
-      </p:nvGrpSpPr>
-      <p:grpSpPr>
-        <a:xfrm>
-          <a:off x="0" y="0"/>
-          <a:ext cx="0" cy="0"/>
-          <a:chOff x="0" y="0"/>
-          <a:chExt cx="0" cy="0"/>
-        </a:xfrm>
-      </p:grpSpPr>
-      <p:pic xmlns:a="http://schemas.openxmlformats.org/drawingml/2006/main" xmlns:r="http://schemas.openxmlformats.org/officeDocument/2006/relationships" xmlns:p="http://schemas.openxmlformats.org/presentationml/2006/main">
-        <p:nvPicPr>
-          <p:cNvPr id="2" name=""/>
-          <p:cNvPicPr>
-            <a:picLocks noGrp="1"/>
-          </p:cNvPicPr>
-          <p:nvPr>
-            <p:ph/>
-          </p:nvPr>
-        </p:nvPicPr>
-        <p:blipFill>
-          <a:blip cstate="print" r:embed="rId2"/>
-          <a:stretch>
-            <a:fillRect/>
-          </a:stretch>
-        </p:blipFill>
-        <p:spPr>
-          <a:xfrm>
-            <a:off x="0" y="0"/>
-            <a:ext cx="9144000" cy="6858000"/>
-          </a:xfrm>
-          <a:prstGeom prst="rect">
-            <a:avLst/>
-          </a:prstGeom>
-        </p:spPr>
-      </p:pic>
-    </p:spTree>
-  </p:cSld>
-  <p:clrMapOvr>
-    <a:masterClrMapping/>
-  </p:clrMapOvr>
-</p:sld>
-</file>
-
-<file path=ppt/slides/slide34.xml><?xml version="1.0" encoding="utf-8"?>
-<p:sld xmlns:a="http://schemas.openxmlformats.org/drawingml/2006/main" xmlns:r="http://schemas.openxmlformats.org/officeDocument/2006/relationships" xmlns:p="http://schemas.openxmlformats.org/presentationml/2006/main">
-  <p:cSld>
-    <p:spTree>
-      <p:nvGrpSpPr>
-        <p:cNvPr id="1" name=""/>
-        <p:cNvGrpSpPr/>
-        <p:nvPr/>
-      </p:nvGrpSpPr>
-      <p:grpSpPr>
-        <a:xfrm>
-          <a:off x="0" y="0"/>
-          <a:ext cx="0" cy="0"/>
-          <a:chOff x="0" y="0"/>
-          <a:chExt cx="0" cy="0"/>
-        </a:xfrm>
-      </p:grpSpPr>
-      <p:pic xmlns:a="http://schemas.openxmlformats.org/drawingml/2006/main" xmlns:r="http://schemas.openxmlformats.org/officeDocument/2006/relationships" xmlns:p="http://schemas.openxmlformats.org/presentationml/2006/main">
-        <p:nvPicPr>
-          <p:cNvPr id="2" name=""/>
-          <p:cNvPicPr>
-            <a:picLocks noGrp="1"/>
-          </p:cNvPicPr>
-          <p:nvPr>
-            <p:ph/>
-          </p:nvPr>
-        </p:nvPicPr>
-        <p:blipFill>
-          <a:blip cstate="print" r:embed="rId2"/>
-          <a:stretch>
-            <a:fillRect/>
-          </a:stretch>
-        </p:blipFill>
-        <p:spPr>
-          <a:xfrm>
-            <a:off x="0" y="0"/>
-            <a:ext cx="9144000" cy="6858000"/>
-          </a:xfrm>
-          <a:prstGeom prst="rect">
-            <a:avLst/>
-          </a:prstGeom>
-        </p:spPr>
-      </p:pic>
-    </p:spTree>
-  </p:cSld>
-  <p:clrMapOvr>
-    <a:masterClrMapping/>
-  </p:clrMapOvr>
-</p:sld>
-</file>
-
-<file path=ppt/slides/slide35.xml><?xml version="1.0" encoding="utf-8"?>
-<p:sld xmlns:a="http://schemas.openxmlformats.org/drawingml/2006/main" xmlns:r="http://schemas.openxmlformats.org/officeDocument/2006/relationships" xmlns:p="http://schemas.openxmlformats.org/presentationml/2006/main">
-  <p:cSld>
-    <p:spTree>
-      <p:nvGrpSpPr>
-        <p:cNvPr id="1" name=""/>
-        <p:cNvGrpSpPr/>
-        <p:nvPr/>
-      </p:nvGrpSpPr>
-      <p:grpSpPr>
-        <a:xfrm>
-          <a:off x="0" y="0"/>
-          <a:ext cx="0" cy="0"/>
-          <a:chOff x="0" y="0"/>
-          <a:chExt cx="0" cy="0"/>
-        </a:xfrm>
-      </p:grpSpPr>
-      <p:pic xmlns:a="http://schemas.openxmlformats.org/drawingml/2006/main" xmlns:r="http://schemas.openxmlformats.org/officeDocument/2006/relationships" xmlns:p="http://schemas.openxmlformats.org/presentationml/2006/main">
-        <p:nvPicPr>
-          <p:cNvPr id="2" name=""/>
-          <p:cNvPicPr>
-            <a:picLocks noGrp="1"/>
-          </p:cNvPicPr>
-          <p:nvPr>
-            <p:ph/>
-          </p:nvPr>
-        </p:nvPicPr>
-        <p:blipFill>
-          <a:blip cstate="print" r:embed="rId2"/>
-          <a:stretch>
-            <a:fillRect/>
-          </a:stretch>
-        </p:blipFill>
-        <p:spPr>
-          <a:xfrm>
-            <a:off x="0" y="0"/>
-            <a:ext cx="9144000" cy="6858000"/>
-          </a:xfrm>
-          <a:prstGeom prst="rect">
-            <a:avLst/>
-          </a:prstGeom>
-        </p:spPr>
-      </p:pic>
-    </p:spTree>
-  </p:cSld>
-  <p:clrMapOvr>
-    <a:masterClrMapping/>
-  </p:clrMapOvr>
-</p:sld>
-</file>
-
-<file path=ppt/slides/slide36.xml><?xml version="1.0" encoding="utf-8"?>
-<p:sld xmlns:a="http://schemas.openxmlformats.org/drawingml/2006/main" xmlns:r="http://schemas.openxmlformats.org/officeDocument/2006/relationships" xmlns:p="http://schemas.openxmlformats.org/presentationml/2006/main">
-  <p:cSld>
-    <p:spTree>
-      <p:nvGrpSpPr>
-        <p:cNvPr id="1" name=""/>
-        <p:cNvGrpSpPr/>
-        <p:nvPr/>
-      </p:nvGrpSpPr>
-      <p:grpSpPr>
-        <a:xfrm>
-          <a:off x="0" y="0"/>
-          <a:ext cx="0" cy="0"/>
-          <a:chOff x="0" y="0"/>
-          <a:chExt cx="0" cy="0"/>
-        </a:xfrm>
-      </p:grpSpPr>
-      <p:pic xmlns:a="http://schemas.openxmlformats.org/drawingml/2006/main" xmlns:r="http://schemas.openxmlformats.org/officeDocument/2006/relationships" xmlns:p="http://schemas.openxmlformats.org/presentationml/2006/main">
-        <p:nvPicPr>
-          <p:cNvPr id="2" name=""/>
-          <p:cNvPicPr>
-            <a:picLocks noGrp="1"/>
-          </p:cNvPicPr>
-          <p:nvPr>
-            <p:ph/>
-          </p:nvPr>
-        </p:nvPicPr>
-        <p:blipFill>
-          <a:blip cstate="print" r:embed="rId2"/>
-          <a:stretch>
-            <a:fillRect/>
-          </a:stretch>
-        </p:blipFill>
-        <p:spPr>
-          <a:xfrm>
-            <a:off x="0" y="0"/>
-            <a:ext cx="9144000" cy="6858000"/>
-          </a:xfrm>
-          <a:prstGeom prst="rect">
-            <a:avLst/>
-          </a:prstGeom>
-        </p:spPr>
-      </p:pic>
-    </p:spTree>
-  </p:cSld>
-  <p:clrMapOvr>
-    <a:masterClrMapping/>
-  </p:clrMapOvr>
-</p:sld>
-</file>
-
-<file path=ppt/slides/slide37.xml><?xml version="1.0" encoding="utf-8"?>
-<p:sld xmlns:a="http://schemas.openxmlformats.org/drawingml/2006/main" xmlns:r="http://schemas.openxmlformats.org/officeDocument/2006/relationships" xmlns:p="http://schemas.openxmlformats.org/presentationml/2006/main">
-  <p:cSld>
-    <p:spTree>
-      <p:nvGrpSpPr>
-        <p:cNvPr id="1" name=""/>
-        <p:cNvGrpSpPr/>
-        <p:nvPr/>
-      </p:nvGrpSpPr>
-      <p:grpSpPr>
-        <a:xfrm>
-          <a:off x="0" y="0"/>
-          <a:ext cx="0" cy="0"/>
-          <a:chOff x="0" y="0"/>
-          <a:chExt cx="0" cy="0"/>
-        </a:xfrm>
-      </p:grpSpPr>
-      <p:pic xmlns:a="http://schemas.openxmlformats.org/drawingml/2006/main" xmlns:r="http://schemas.openxmlformats.org/officeDocument/2006/relationships" xmlns:p="http://schemas.openxmlformats.org/presentationml/2006/main">
-        <p:nvPicPr>
-          <p:cNvPr id="2" name=""/>
+          <p:cNvPr id="2" name="" descr=""/>
           <p:cNvPicPr>
             <a:picLocks noGrp="1"/>
           </p:cNvPicPr>
@@ -3833,7 +2373,7 @@
       </p:grpSpPr>
       <p:pic xmlns:a="http://schemas.openxmlformats.org/drawingml/2006/main" xmlns:r="http://schemas.openxmlformats.org/officeDocument/2006/relationships" xmlns:p="http://schemas.openxmlformats.org/presentationml/2006/main">
         <p:nvPicPr>
-          <p:cNvPr id="2" name=""/>
+          <p:cNvPr id="2" name="" descr=""/>
           <p:cNvPicPr>
             <a:picLocks noGrp="1"/>
           </p:cNvPicPr>
@@ -3884,211 +2424,7 @@
       </p:grpSpPr>
       <p:pic xmlns:a="http://schemas.openxmlformats.org/drawingml/2006/main" xmlns:r="http://schemas.openxmlformats.org/officeDocument/2006/relationships" xmlns:p="http://schemas.openxmlformats.org/presentationml/2006/main">
         <p:nvPicPr>
-          <p:cNvPr id="2" name=""/>
-          <p:cNvPicPr>
-            <a:picLocks noGrp="1"/>
-          </p:cNvPicPr>
-          <p:nvPr>
-            <p:ph/>
-          </p:nvPr>
-        </p:nvPicPr>
-        <p:blipFill>
-          <a:blip cstate="print" r:embed="rId2"/>
-          <a:stretch>
-            <a:fillRect/>
-          </a:stretch>
-        </p:blipFill>
-        <p:spPr>
-          <a:xfrm>
-            <a:off x="0" y="0"/>
-            <a:ext cx="9144000" cy="6858000"/>
-          </a:xfrm>
-          <a:prstGeom prst="rect">
-            <a:avLst/>
-          </a:prstGeom>
-        </p:spPr>
-      </p:pic>
-    </p:spTree>
-  </p:cSld>
-  <p:clrMapOvr>
-    <a:masterClrMapping/>
-  </p:clrMapOvr>
-</p:sld>
-</file>
-
-<file path=ppt/slides/slide6.xml><?xml version="1.0" encoding="utf-8"?>
-<p:sld xmlns:a="http://schemas.openxmlformats.org/drawingml/2006/main" xmlns:r="http://schemas.openxmlformats.org/officeDocument/2006/relationships" xmlns:p="http://schemas.openxmlformats.org/presentationml/2006/main">
-  <p:cSld>
-    <p:spTree>
-      <p:nvGrpSpPr>
-        <p:cNvPr id="1" name=""/>
-        <p:cNvGrpSpPr/>
-        <p:nvPr/>
-      </p:nvGrpSpPr>
-      <p:grpSpPr>
-        <a:xfrm>
-          <a:off x="0" y="0"/>
-          <a:ext cx="0" cy="0"/>
-          <a:chOff x="0" y="0"/>
-          <a:chExt cx="0" cy="0"/>
-        </a:xfrm>
-      </p:grpSpPr>
-      <p:pic xmlns:a="http://schemas.openxmlformats.org/drawingml/2006/main" xmlns:r="http://schemas.openxmlformats.org/officeDocument/2006/relationships" xmlns:p="http://schemas.openxmlformats.org/presentationml/2006/main">
-        <p:nvPicPr>
-          <p:cNvPr id="2" name=""/>
-          <p:cNvPicPr>
-            <a:picLocks noGrp="1"/>
-          </p:cNvPicPr>
-          <p:nvPr>
-            <p:ph/>
-          </p:nvPr>
-        </p:nvPicPr>
-        <p:blipFill>
-          <a:blip cstate="print" r:embed="rId2"/>
-          <a:stretch>
-            <a:fillRect/>
-          </a:stretch>
-        </p:blipFill>
-        <p:spPr>
-          <a:xfrm>
-            <a:off x="0" y="0"/>
-            <a:ext cx="9144000" cy="6858000"/>
-          </a:xfrm>
-          <a:prstGeom prst="rect">
-            <a:avLst/>
-          </a:prstGeom>
-        </p:spPr>
-      </p:pic>
-    </p:spTree>
-  </p:cSld>
-  <p:clrMapOvr>
-    <a:masterClrMapping/>
-  </p:clrMapOvr>
-</p:sld>
-</file>
-
-<file path=ppt/slides/slide7.xml><?xml version="1.0" encoding="utf-8"?>
-<p:sld xmlns:a="http://schemas.openxmlformats.org/drawingml/2006/main" xmlns:r="http://schemas.openxmlformats.org/officeDocument/2006/relationships" xmlns:p="http://schemas.openxmlformats.org/presentationml/2006/main">
-  <p:cSld>
-    <p:spTree>
-      <p:nvGrpSpPr>
-        <p:cNvPr id="1" name=""/>
-        <p:cNvGrpSpPr/>
-        <p:nvPr/>
-      </p:nvGrpSpPr>
-      <p:grpSpPr>
-        <a:xfrm>
-          <a:off x="0" y="0"/>
-          <a:ext cx="0" cy="0"/>
-          <a:chOff x="0" y="0"/>
-          <a:chExt cx="0" cy="0"/>
-        </a:xfrm>
-      </p:grpSpPr>
-      <p:pic xmlns:a="http://schemas.openxmlformats.org/drawingml/2006/main" xmlns:r="http://schemas.openxmlformats.org/officeDocument/2006/relationships" xmlns:p="http://schemas.openxmlformats.org/presentationml/2006/main">
-        <p:nvPicPr>
-          <p:cNvPr id="2" name=""/>
-          <p:cNvPicPr>
-            <a:picLocks noGrp="1"/>
-          </p:cNvPicPr>
-          <p:nvPr>
-            <p:ph/>
-          </p:nvPr>
-        </p:nvPicPr>
-        <p:blipFill>
-          <a:blip cstate="print" r:embed="rId2"/>
-          <a:stretch>
-            <a:fillRect/>
-          </a:stretch>
-        </p:blipFill>
-        <p:spPr>
-          <a:xfrm>
-            <a:off x="0" y="0"/>
-            <a:ext cx="9144000" cy="6858000"/>
-          </a:xfrm>
-          <a:prstGeom prst="rect">
-            <a:avLst/>
-          </a:prstGeom>
-        </p:spPr>
-      </p:pic>
-    </p:spTree>
-  </p:cSld>
-  <p:clrMapOvr>
-    <a:masterClrMapping/>
-  </p:clrMapOvr>
-</p:sld>
-</file>
-
-<file path=ppt/slides/slide8.xml><?xml version="1.0" encoding="utf-8"?>
-<p:sld xmlns:a="http://schemas.openxmlformats.org/drawingml/2006/main" xmlns:r="http://schemas.openxmlformats.org/officeDocument/2006/relationships" xmlns:p="http://schemas.openxmlformats.org/presentationml/2006/main">
-  <p:cSld>
-    <p:spTree>
-      <p:nvGrpSpPr>
-        <p:cNvPr id="1" name=""/>
-        <p:cNvGrpSpPr/>
-        <p:nvPr/>
-      </p:nvGrpSpPr>
-      <p:grpSpPr>
-        <a:xfrm>
-          <a:off x="0" y="0"/>
-          <a:ext cx="0" cy="0"/>
-          <a:chOff x="0" y="0"/>
-          <a:chExt cx="0" cy="0"/>
-        </a:xfrm>
-      </p:grpSpPr>
-      <p:pic xmlns:a="http://schemas.openxmlformats.org/drawingml/2006/main" xmlns:r="http://schemas.openxmlformats.org/officeDocument/2006/relationships" xmlns:p="http://schemas.openxmlformats.org/presentationml/2006/main">
-        <p:nvPicPr>
-          <p:cNvPr id="2" name=""/>
-          <p:cNvPicPr>
-            <a:picLocks noGrp="1"/>
-          </p:cNvPicPr>
-          <p:nvPr>
-            <p:ph/>
-          </p:nvPr>
-        </p:nvPicPr>
-        <p:blipFill>
-          <a:blip cstate="print" r:embed="rId2"/>
-          <a:stretch>
-            <a:fillRect/>
-          </a:stretch>
-        </p:blipFill>
-        <p:spPr>
-          <a:xfrm>
-            <a:off x="0" y="0"/>
-            <a:ext cx="9144000" cy="6858000"/>
-          </a:xfrm>
-          <a:prstGeom prst="rect">
-            <a:avLst/>
-          </a:prstGeom>
-        </p:spPr>
-      </p:pic>
-    </p:spTree>
-  </p:cSld>
-  <p:clrMapOvr>
-    <a:masterClrMapping/>
-  </p:clrMapOvr>
-</p:sld>
-</file>
-
-<file path=ppt/slides/slide9.xml><?xml version="1.0" encoding="utf-8"?>
-<p:sld xmlns:a="http://schemas.openxmlformats.org/drawingml/2006/main" xmlns:r="http://schemas.openxmlformats.org/officeDocument/2006/relationships" xmlns:p="http://schemas.openxmlformats.org/presentationml/2006/main">
-  <p:cSld>
-    <p:spTree>
-      <p:nvGrpSpPr>
-        <p:cNvPr id="1" name=""/>
-        <p:cNvGrpSpPr/>
-        <p:nvPr/>
-      </p:nvGrpSpPr>
-      <p:grpSpPr>
-        <a:xfrm>
-          <a:off x="0" y="0"/>
-          <a:ext cx="0" cy="0"/>
-          <a:chOff x="0" y="0"/>
-          <a:chExt cx="0" cy="0"/>
-        </a:xfrm>
-      </p:grpSpPr>
-      <p:pic xmlns:a="http://schemas.openxmlformats.org/drawingml/2006/main" xmlns:r="http://schemas.openxmlformats.org/officeDocument/2006/relationships" xmlns:p="http://schemas.openxmlformats.org/presentationml/2006/main">
-        <p:nvPicPr>
-          <p:cNvPr id="2" name=""/>
+          <p:cNvPr id="2" name="" descr=""/>
           <p:cNvPicPr>
             <a:picLocks noGrp="1"/>
           </p:cNvPicPr>

</xml_diff>

<commit_message>
added build_png to replace build_thumbnail() to fix part of #15
</commit_message>
<xml_diff>
--- a/inst/example/slides.pptx
+++ b/inst/example/slides.pptx
@@ -10,6 +10,7 @@
     <p:sldId id="258" r:id="rId10"/>
     <p:sldId id="259" r:id="rId11"/>
     <p:sldId id="260" r:id="rId12"/>
+    <p:sldId id="261" r:id="rId13"/>
   </p:sldIdLst>
   <p:sldSz cx="9144000" cy="6858000" type="screen4x3"/>
   <p:notesSz cx="6858000" cy="9144000"/>
@@ -2406,6 +2407,57 @@
 </file>
 
 <file path=ppt/slides/slide5.xml><?xml version="1.0" encoding="utf-8"?>
+<p:sld xmlns:a="http://schemas.openxmlformats.org/drawingml/2006/main" xmlns:r="http://schemas.openxmlformats.org/officeDocument/2006/relationships" xmlns:p="http://schemas.openxmlformats.org/presentationml/2006/main">
+  <p:cSld>
+    <p:spTree>
+      <p:nvGrpSpPr>
+        <p:cNvPr id="1" name=""/>
+        <p:cNvGrpSpPr/>
+        <p:nvPr/>
+      </p:nvGrpSpPr>
+      <p:grpSpPr>
+        <a:xfrm>
+          <a:off x="0" y="0"/>
+          <a:ext cx="0" cy="0"/>
+          <a:chOff x="0" y="0"/>
+          <a:chExt cx="0" cy="0"/>
+        </a:xfrm>
+      </p:grpSpPr>
+      <p:pic xmlns:a="http://schemas.openxmlformats.org/drawingml/2006/main" xmlns:r="http://schemas.openxmlformats.org/officeDocument/2006/relationships" xmlns:p="http://schemas.openxmlformats.org/presentationml/2006/main">
+        <p:nvPicPr>
+          <p:cNvPr id="2" name="" descr=""/>
+          <p:cNvPicPr>
+            <a:picLocks noGrp="1"/>
+          </p:cNvPicPr>
+          <p:nvPr>
+            <p:ph/>
+          </p:nvPr>
+        </p:nvPicPr>
+        <p:blipFill>
+          <a:blip cstate="print" r:embed="rId2"/>
+          <a:stretch>
+            <a:fillRect/>
+          </a:stretch>
+        </p:blipFill>
+        <p:spPr>
+          <a:xfrm>
+            <a:off x="0" y="0"/>
+            <a:ext cx="9144000" cy="6858000"/>
+          </a:xfrm>
+          <a:prstGeom prst="rect">
+            <a:avLst/>
+          </a:prstGeom>
+        </p:spPr>
+      </p:pic>
+    </p:spTree>
+  </p:cSld>
+  <p:clrMapOvr>
+    <a:masterClrMapping/>
+  </p:clrMapOvr>
+</p:sld>
+</file>
+
+<file path=ppt/slides/slide6.xml><?xml version="1.0" encoding="utf-8"?>
 <p:sld xmlns:a="http://schemas.openxmlformats.org/drawingml/2006/main" xmlns:r="http://schemas.openxmlformats.org/officeDocument/2006/relationships" xmlns:p="http://schemas.openxmlformats.org/presentationml/2006/main">
   <p:cSld>
     <p:spTree>

</xml_diff>

<commit_message>
updated examples to include mp4
</commit_message>
<xml_diff>
--- a/inst/example/slides.pptx
+++ b/inst/example/slides.pptx
@@ -1,27 +1,24 @@
 
 <file path=ppt/presentation.xml><?xml version="1.0" encoding="utf-8"?>
-<p:presentation xmlns:a="http://schemas.openxmlformats.org/drawingml/2006/main" xmlns:r="http://schemas.openxmlformats.org/officeDocument/2006/relationships" xmlns:p="http://schemas.openxmlformats.org/presentationml/2006/main" saveSubsetFonts="1">
+<p:presentation xmlns:a="http://schemas.openxmlformats.org/drawingml/2006/main" xmlns:r="http://schemas.openxmlformats.org/officeDocument/2006/relationships" xmlns:p="http://schemas.openxmlformats.org/presentationml/2006/main" saveSubsetFonts="1" autoCompressPictures="0">
   <p:sldMasterIdLst>
-    <p:sldMasterId id="2147483648" r:id="rId1"/>
+    <p:sldMasterId id="2147483672" r:id="rId1"/>
   </p:sldMasterIdLst>
   <p:sldIdLst xmlns:a="http://schemas.openxmlformats.org/drawingml/2006/main" xmlns:r="http://schemas.openxmlformats.org/officeDocument/2006/relationships" xmlns:p="http://schemas.openxmlformats.org/presentationml/2006/main">
-    <p:sldId id="256" r:id="rId8"/>
-    <p:sldId id="257" r:id="rId9"/>
-    <p:sldId id="258" r:id="rId10"/>
-    <p:sldId id="259" r:id="rId11"/>
-    <p:sldId id="260" r:id="rId12"/>
-    <p:sldId id="261" r:id="rId13"/>
+    <p:sldId id="256" r:id="rId6"/>
+    <p:sldId id="257" r:id="rId7"/>
+    <p:sldId id="258" r:id="rId8"/>
+    <p:sldId id="259" r:id="rId9"/>
+    <p:sldId id="260" r:id="rId10"/>
+    <p:sldId id="261" r:id="rId11"/>
   </p:sldIdLst>
   <p:sldSz cx="9144000" cy="6858000" type="screen4x3"/>
   <p:notesSz cx="6858000" cy="9144000"/>
-  <p:custDataLst>
-    <p:tags r:id="rId3"/>
-  </p:custDataLst>
   <p:defaultTextStyle>
     <a:defPPr>
       <a:defRPr lang="en-US"/>
     </a:defPPr>
-    <a:lvl1pPr marL="0" algn="l" defTabSz="914400" rtl="0" eaLnBrk="1" latinLnBrk="0" hangingPunct="1">
+    <a:lvl1pPr marL="0" algn="l" defTabSz="457200" rtl="0" eaLnBrk="1" latinLnBrk="0" hangingPunct="1">
       <a:defRPr sz="1800" kern="1200">
         <a:solidFill>
           <a:schemeClr val="tx1"/>
@@ -31,7 +28,7 @@
         <a:cs typeface="+mn-cs"/>
       </a:defRPr>
     </a:lvl1pPr>
-    <a:lvl2pPr marL="457200" algn="l" defTabSz="914400" rtl="0" eaLnBrk="1" latinLnBrk="0" hangingPunct="1">
+    <a:lvl2pPr marL="457200" algn="l" defTabSz="457200" rtl="0" eaLnBrk="1" latinLnBrk="0" hangingPunct="1">
       <a:defRPr sz="1800" kern="1200">
         <a:solidFill>
           <a:schemeClr val="tx1"/>
@@ -41,7 +38,7 @@
         <a:cs typeface="+mn-cs"/>
       </a:defRPr>
     </a:lvl2pPr>
-    <a:lvl3pPr marL="914400" algn="l" defTabSz="914400" rtl="0" eaLnBrk="1" latinLnBrk="0" hangingPunct="1">
+    <a:lvl3pPr marL="914400" algn="l" defTabSz="457200" rtl="0" eaLnBrk="1" latinLnBrk="0" hangingPunct="1">
       <a:defRPr sz="1800" kern="1200">
         <a:solidFill>
           <a:schemeClr val="tx1"/>
@@ -51,7 +48,7 @@
         <a:cs typeface="+mn-cs"/>
       </a:defRPr>
     </a:lvl3pPr>
-    <a:lvl4pPr marL="1371600" algn="l" defTabSz="914400" rtl="0" eaLnBrk="1" latinLnBrk="0" hangingPunct="1">
+    <a:lvl4pPr marL="1371600" algn="l" defTabSz="457200" rtl="0" eaLnBrk="1" latinLnBrk="0" hangingPunct="1">
       <a:defRPr sz="1800" kern="1200">
         <a:solidFill>
           <a:schemeClr val="tx1"/>
@@ -61,7 +58,7 @@
         <a:cs typeface="+mn-cs"/>
       </a:defRPr>
     </a:lvl4pPr>
-    <a:lvl5pPr marL="1828800" algn="l" defTabSz="914400" rtl="0" eaLnBrk="1" latinLnBrk="0" hangingPunct="1">
+    <a:lvl5pPr marL="1828800" algn="l" defTabSz="457200" rtl="0" eaLnBrk="1" latinLnBrk="0" hangingPunct="1">
       <a:defRPr sz="1800" kern="1200">
         <a:solidFill>
           <a:schemeClr val="tx1"/>
@@ -71,7 +68,7 @@
         <a:cs typeface="+mn-cs"/>
       </a:defRPr>
     </a:lvl5pPr>
-    <a:lvl6pPr marL="2286000" algn="l" defTabSz="914400" rtl="0" eaLnBrk="1" latinLnBrk="0" hangingPunct="1">
+    <a:lvl6pPr marL="2286000" algn="l" defTabSz="457200" rtl="0" eaLnBrk="1" latinLnBrk="0" hangingPunct="1">
       <a:defRPr sz="1800" kern="1200">
         <a:solidFill>
           <a:schemeClr val="tx1"/>
@@ -81,7 +78,7 @@
         <a:cs typeface="+mn-cs"/>
       </a:defRPr>
     </a:lvl6pPr>
-    <a:lvl7pPr marL="2743200" algn="l" defTabSz="914400" rtl="0" eaLnBrk="1" latinLnBrk="0" hangingPunct="1">
+    <a:lvl7pPr marL="2743200" algn="l" defTabSz="457200" rtl="0" eaLnBrk="1" latinLnBrk="0" hangingPunct="1">
       <a:defRPr sz="1800" kern="1200">
         <a:solidFill>
           <a:schemeClr val="tx1"/>
@@ -91,7 +88,7 @@
         <a:cs typeface="+mn-cs"/>
       </a:defRPr>
     </a:lvl7pPr>
-    <a:lvl8pPr marL="3200400" algn="l" defTabSz="914400" rtl="0" eaLnBrk="1" latinLnBrk="0" hangingPunct="1">
+    <a:lvl8pPr marL="3200400" algn="l" defTabSz="457200" rtl="0" eaLnBrk="1" latinLnBrk="0" hangingPunct="1">
       <a:defRPr sz="1800" kern="1200">
         <a:solidFill>
           <a:schemeClr val="tx1"/>
@@ -101,7 +98,7 @@
         <a:cs typeface="+mn-cs"/>
       </a:defRPr>
     </a:lvl8pPr>
-    <a:lvl9pPr marL="3657600" algn="l" defTabSz="914400" rtl="0" eaLnBrk="1" latinLnBrk="0" hangingPunct="1">
+    <a:lvl9pPr marL="3657600" algn="l" defTabSz="457200" rtl="0" eaLnBrk="1" latinLnBrk="0" hangingPunct="1">
       <a:defRPr sz="1800" kern="1200">
         <a:solidFill>
           <a:schemeClr val="tx1"/>
@@ -112,6 +109,11 @@
       </a:defRPr>
     </a:lvl9pPr>
   </p:defaultTextStyle>
+  <p:extLst>
+    <p:ext uri="{EFAFB233-063F-42B5-8137-9DF3F51BA10A}">
+      <p15:sldGuideLst xmlns:p15="http://schemas.microsoft.com/office/powerpoint/2012/main"/>
+    </p:ext>
+  </p:extLst>
 </p:presentation>
 </file>
 
@@ -144,19 +146,23 @@
         </p:nvSpPr>
         <p:spPr>
           <a:xfrm>
-            <a:off x="685800" y="2130425"/>
-            <a:ext cx="7772400" cy="1470025"/>
+            <a:off x="685800" y="1122363"/>
+            <a:ext cx="7772400" cy="2387600"/>
           </a:xfrm>
         </p:spPr>
         <p:txBody>
-          <a:bodyPr/>
-          <a:lstStyle/>
-          <a:p>
-            <a:r>
-              <a:rPr lang="en-US" smtClean="0"/>
+          <a:bodyPr anchor="b"/>
+          <a:lstStyle>
+            <a:lvl1pPr algn="ctr">
+              <a:defRPr sz="6000"/>
+            </a:lvl1pPr>
+          </a:lstStyle>
+          <a:p>
+            <a:r>
+              <a:rPr lang="en-US"/>
               <a:t>Click to edit Master title style</a:t>
             </a:r>
-            <a:endParaRPr lang="en-GB"/>
+            <a:endParaRPr lang="en-US" dirty="0"/>
           </a:p>
         </p:txBody>
       </p:sp>
@@ -172,8 +178,8 @@
         </p:nvSpPr>
         <p:spPr>
           <a:xfrm>
-            <a:off x="1371600" y="3886200"/>
-            <a:ext cx="6400800" cy="1752600"/>
+            <a:off x="1143000" y="3602038"/>
+            <a:ext cx="6858000" cy="1655762"/>
           </a:xfrm>
         </p:spPr>
         <p:txBody>
@@ -181,124 +187,70 @@
           <a:lstStyle>
             <a:lvl1pPr marL="0" indent="0" algn="ctr">
               <a:buNone/>
-              <a:defRPr>
-                <a:solidFill>
-                  <a:schemeClr val="tx1">
-                    <a:tint val="75000"/>
-                  </a:schemeClr>
-                </a:solidFill>
-              </a:defRPr>
+              <a:defRPr sz="2400"/>
             </a:lvl1pPr>
             <a:lvl2pPr marL="457200" indent="0" algn="ctr">
               <a:buNone/>
-              <a:defRPr>
-                <a:solidFill>
-                  <a:schemeClr val="tx1">
-                    <a:tint val="75000"/>
-                  </a:schemeClr>
-                </a:solidFill>
-              </a:defRPr>
+              <a:defRPr sz="2000"/>
             </a:lvl2pPr>
             <a:lvl3pPr marL="914400" indent="0" algn="ctr">
               <a:buNone/>
-              <a:defRPr>
-                <a:solidFill>
-                  <a:schemeClr val="tx1">
-                    <a:tint val="75000"/>
-                  </a:schemeClr>
-                </a:solidFill>
-              </a:defRPr>
+              <a:defRPr sz="1800"/>
             </a:lvl3pPr>
             <a:lvl4pPr marL="1371600" indent="0" algn="ctr">
               <a:buNone/>
-              <a:defRPr>
-                <a:solidFill>
-                  <a:schemeClr val="tx1">
-                    <a:tint val="75000"/>
-                  </a:schemeClr>
-                </a:solidFill>
-              </a:defRPr>
+              <a:defRPr sz="1600"/>
             </a:lvl4pPr>
             <a:lvl5pPr marL="1828800" indent="0" algn="ctr">
               <a:buNone/>
-              <a:defRPr>
-                <a:solidFill>
-                  <a:schemeClr val="tx1">
-                    <a:tint val="75000"/>
-                  </a:schemeClr>
-                </a:solidFill>
-              </a:defRPr>
+              <a:defRPr sz="1600"/>
             </a:lvl5pPr>
             <a:lvl6pPr marL="2286000" indent="0" algn="ctr">
               <a:buNone/>
-              <a:defRPr>
-                <a:solidFill>
-                  <a:schemeClr val="tx1">
-                    <a:tint val="75000"/>
-                  </a:schemeClr>
-                </a:solidFill>
-              </a:defRPr>
+              <a:defRPr sz="1600"/>
             </a:lvl6pPr>
             <a:lvl7pPr marL="2743200" indent="0" algn="ctr">
               <a:buNone/>
-              <a:defRPr>
-                <a:solidFill>
-                  <a:schemeClr val="tx1">
-                    <a:tint val="75000"/>
-                  </a:schemeClr>
-                </a:solidFill>
-              </a:defRPr>
+              <a:defRPr sz="1600"/>
             </a:lvl7pPr>
             <a:lvl8pPr marL="3200400" indent="0" algn="ctr">
               <a:buNone/>
-              <a:defRPr>
-                <a:solidFill>
-                  <a:schemeClr val="tx1">
-                    <a:tint val="75000"/>
-                  </a:schemeClr>
-                </a:solidFill>
-              </a:defRPr>
+              <a:defRPr sz="1600"/>
             </a:lvl8pPr>
             <a:lvl9pPr marL="3657600" indent="0" algn="ctr">
               <a:buNone/>
-              <a:defRPr>
-                <a:solidFill>
-                  <a:schemeClr val="tx1">
-                    <a:tint val="75000"/>
-                  </a:schemeClr>
-                </a:solidFill>
-              </a:defRPr>
+              <a:defRPr sz="1600"/>
             </a:lvl9pPr>
           </a:lstStyle>
           <a:p>
             <a:r>
+              <a:rPr lang="en-US"/>
+              <a:t>Click to edit Master subtitle style</a:t>
+            </a:r>
+            <a:endParaRPr lang="en-US" dirty="0"/>
+          </a:p>
+        </p:txBody>
+      </p:sp>
+      <p:sp>
+        <p:nvSpPr>
+          <p:cNvPr id="4" name="Date Placeholder 3"/>
+          <p:cNvSpPr>
+            <a:spLocks noGrp="1"/>
+          </p:cNvSpPr>
+          <p:nvPr>
+            <p:ph type="dt" sz="half" idx="10"/>
+          </p:nvPr>
+        </p:nvSpPr>
+        <p:spPr/>
+        <p:txBody>
+          <a:bodyPr/>
+          <a:lstStyle/>
+          <a:p>
+            <a:fld id="{628FD48A-0636-1247-B254-6B36D700B17E}" type="datetimeFigureOut">
               <a:rPr lang="en-US" smtClean="0"/>
-              <a:t>Click to edit Master subtitle style</a:t>
-            </a:r>
-            <a:endParaRPr lang="en-GB"/>
-          </a:p>
-        </p:txBody>
-      </p:sp>
-      <p:sp>
-        <p:nvSpPr>
-          <p:cNvPr id="4" name="Date Placeholder 3"/>
-          <p:cNvSpPr>
-            <a:spLocks noGrp="1"/>
-          </p:cNvSpPr>
-          <p:nvPr>
-            <p:ph type="dt" sz="half" idx="10"/>
-          </p:nvPr>
-        </p:nvSpPr>
-        <p:spPr/>
-        <p:txBody>
-          <a:bodyPr/>
-          <a:lstStyle/>
-          <a:p>
-            <a:fld id="{E6744CE3-0875-4B69-89C0-6F72D8139561}" type="datetimeFigureOut">
-              <a:rPr lang="en-GB" smtClean="0"/>
-              <a:t>26/05/17</a:t>
+              <a:t>2/25/21</a:t>
             </a:fld>
-            <a:endParaRPr lang="en-GB"/>
+            <a:endParaRPr lang="en-US"/>
           </a:p>
         </p:txBody>
       </p:sp>
@@ -317,7 +269,7 @@
           <a:bodyPr/>
           <a:lstStyle/>
           <a:p>
-            <a:endParaRPr lang="en-GB"/>
+            <a:endParaRPr lang="en-US"/>
           </a:p>
         </p:txBody>
       </p:sp>
@@ -336,18 +288,368 @@
           <a:bodyPr/>
           <a:lstStyle/>
           <a:p>
-            <a:fld id="{8DADB20D-508E-4C6D-A9E4-257D5607B0F6}" type="slidenum">
-              <a:rPr lang="en-GB" smtClean="0"/>
+            <a:fld id="{C2C793BC-253B-5E4F-A3C5-757C57983B90}" type="slidenum">
+              <a:rPr lang="en-US" smtClean="0"/>
               <a:t>‹#›</a:t>
             </a:fld>
-            <a:endParaRPr lang="en-GB"/>
+            <a:endParaRPr lang="en-US"/>
           </a:p>
         </p:txBody>
       </p:sp>
     </p:spTree>
     <p:extLst>
       <p:ext uri="{BB962C8B-B14F-4D97-AF65-F5344CB8AC3E}">
-        <p14:creationId xmlns:p14="http://schemas.microsoft.com/office/powerpoint/2010/main" val="4214881138"/>
+        <p14:creationId xmlns:p14="http://schemas.microsoft.com/office/powerpoint/2010/main" val="3856106969"/>
+      </p:ext>
+    </p:extLst>
+  </p:cSld>
+  <p:clrMapOvr>
+    <a:masterClrMapping/>
+  </p:clrMapOvr>
+</p:sldLayout>
+</file>
+
+<file path=ppt/slideLayouts/slideLayout10.xml><?xml version="1.0" encoding="utf-8"?>
+<p:sldLayout xmlns:a="http://schemas.openxmlformats.org/drawingml/2006/main" xmlns:r="http://schemas.openxmlformats.org/officeDocument/2006/relationships" xmlns:p="http://schemas.openxmlformats.org/presentationml/2006/main" type="vertTx" preserve="1">
+  <p:cSld name="Title and Vertical Text">
+    <p:spTree>
+      <p:nvGrpSpPr>
+        <p:cNvPr id="1" name=""/>
+        <p:cNvGrpSpPr/>
+        <p:nvPr/>
+      </p:nvGrpSpPr>
+      <p:grpSpPr>
+        <a:xfrm>
+          <a:off x="0" y="0"/>
+          <a:ext cx="0" cy="0"/>
+          <a:chOff x="0" y="0"/>
+          <a:chExt cx="0" cy="0"/>
+        </a:xfrm>
+      </p:grpSpPr>
+      <p:sp>
+        <p:nvSpPr>
+          <p:cNvPr id="2" name="Title 1"/>
+          <p:cNvSpPr>
+            <a:spLocks noGrp="1"/>
+          </p:cNvSpPr>
+          <p:nvPr>
+            <p:ph type="title"/>
+          </p:nvPr>
+        </p:nvSpPr>
+        <p:spPr/>
+        <p:txBody>
+          <a:bodyPr/>
+          <a:lstStyle/>
+          <a:p>
+            <a:r>
+              <a:rPr lang="en-US"/>
+              <a:t>Click to edit Master title style</a:t>
+            </a:r>
+            <a:endParaRPr lang="en-US" dirty="0"/>
+          </a:p>
+        </p:txBody>
+      </p:sp>
+      <p:sp>
+        <p:nvSpPr>
+          <p:cNvPr id="3" name="Vertical Text Placeholder 2"/>
+          <p:cNvSpPr>
+            <a:spLocks noGrp="1"/>
+          </p:cNvSpPr>
+          <p:nvPr>
+            <p:ph type="body" orient="vert" idx="1"/>
+          </p:nvPr>
+        </p:nvSpPr>
+        <p:spPr/>
+        <p:txBody>
+          <a:bodyPr vert="eaVert"/>
+          <a:lstStyle/>
+          <a:p>
+            <a:pPr lvl="0"/>
+            <a:r>
+              <a:rPr lang="en-US"/>
+              <a:t>Click to edit Master text styles</a:t>
+            </a:r>
+          </a:p>
+          <a:p>
+            <a:pPr lvl="1"/>
+            <a:r>
+              <a:rPr lang="en-US"/>
+              <a:t>Second level</a:t>
+            </a:r>
+          </a:p>
+          <a:p>
+            <a:pPr lvl="2"/>
+            <a:r>
+              <a:rPr lang="en-US"/>
+              <a:t>Third level</a:t>
+            </a:r>
+          </a:p>
+          <a:p>
+            <a:pPr lvl="3"/>
+            <a:r>
+              <a:rPr lang="en-US"/>
+              <a:t>Fourth level</a:t>
+            </a:r>
+          </a:p>
+          <a:p>
+            <a:pPr lvl="4"/>
+            <a:r>
+              <a:rPr lang="en-US"/>
+              <a:t>Fifth level</a:t>
+            </a:r>
+            <a:endParaRPr lang="en-US" dirty="0"/>
+          </a:p>
+        </p:txBody>
+      </p:sp>
+      <p:sp>
+        <p:nvSpPr>
+          <p:cNvPr id="4" name="Date Placeholder 3"/>
+          <p:cNvSpPr>
+            <a:spLocks noGrp="1"/>
+          </p:cNvSpPr>
+          <p:nvPr>
+            <p:ph type="dt" sz="half" idx="10"/>
+          </p:nvPr>
+        </p:nvSpPr>
+        <p:spPr/>
+        <p:txBody>
+          <a:bodyPr/>
+          <a:lstStyle/>
+          <a:p>
+            <a:fld id="{628FD48A-0636-1247-B254-6B36D700B17E}" type="datetimeFigureOut">
+              <a:rPr lang="en-US" smtClean="0"/>
+              <a:t>2/25/21</a:t>
+            </a:fld>
+            <a:endParaRPr lang="en-US"/>
+          </a:p>
+        </p:txBody>
+      </p:sp>
+      <p:sp>
+        <p:nvSpPr>
+          <p:cNvPr id="5" name="Footer Placeholder 4"/>
+          <p:cNvSpPr>
+            <a:spLocks noGrp="1"/>
+          </p:cNvSpPr>
+          <p:nvPr>
+            <p:ph type="ftr" sz="quarter" idx="11"/>
+          </p:nvPr>
+        </p:nvSpPr>
+        <p:spPr/>
+        <p:txBody>
+          <a:bodyPr/>
+          <a:lstStyle/>
+          <a:p>
+            <a:endParaRPr lang="en-US"/>
+          </a:p>
+        </p:txBody>
+      </p:sp>
+      <p:sp>
+        <p:nvSpPr>
+          <p:cNvPr id="6" name="Slide Number Placeholder 5"/>
+          <p:cNvSpPr>
+            <a:spLocks noGrp="1"/>
+          </p:cNvSpPr>
+          <p:nvPr>
+            <p:ph type="sldNum" sz="quarter" idx="12"/>
+          </p:nvPr>
+        </p:nvSpPr>
+        <p:spPr/>
+        <p:txBody>
+          <a:bodyPr/>
+          <a:lstStyle/>
+          <a:p>
+            <a:fld id="{C2C793BC-253B-5E4F-A3C5-757C57983B90}" type="slidenum">
+              <a:rPr lang="en-US" smtClean="0"/>
+              <a:t>‹#›</a:t>
+            </a:fld>
+            <a:endParaRPr lang="en-US"/>
+          </a:p>
+        </p:txBody>
+      </p:sp>
+    </p:spTree>
+    <p:extLst>
+      <p:ext uri="{BB962C8B-B14F-4D97-AF65-F5344CB8AC3E}">
+        <p14:creationId xmlns:p14="http://schemas.microsoft.com/office/powerpoint/2010/main" val="3358117407"/>
+      </p:ext>
+    </p:extLst>
+  </p:cSld>
+  <p:clrMapOvr>
+    <a:masterClrMapping/>
+  </p:clrMapOvr>
+</p:sldLayout>
+</file>
+
+<file path=ppt/slideLayouts/slideLayout11.xml><?xml version="1.0" encoding="utf-8"?>
+<p:sldLayout xmlns:a="http://schemas.openxmlformats.org/drawingml/2006/main" xmlns:r="http://schemas.openxmlformats.org/officeDocument/2006/relationships" xmlns:p="http://schemas.openxmlformats.org/presentationml/2006/main" type="vertTitleAndTx" preserve="1">
+  <p:cSld name="Vertical Title and Text">
+    <p:spTree>
+      <p:nvGrpSpPr>
+        <p:cNvPr id="1" name=""/>
+        <p:cNvGrpSpPr/>
+        <p:nvPr/>
+      </p:nvGrpSpPr>
+      <p:grpSpPr>
+        <a:xfrm>
+          <a:off x="0" y="0"/>
+          <a:ext cx="0" cy="0"/>
+          <a:chOff x="0" y="0"/>
+          <a:chExt cx="0" cy="0"/>
+        </a:xfrm>
+      </p:grpSpPr>
+      <p:sp>
+        <p:nvSpPr>
+          <p:cNvPr id="2" name="Vertical Title 1"/>
+          <p:cNvSpPr>
+            <a:spLocks noGrp="1"/>
+          </p:cNvSpPr>
+          <p:nvPr>
+            <p:ph type="title" orient="vert"/>
+          </p:nvPr>
+        </p:nvSpPr>
+        <p:spPr>
+          <a:xfrm>
+            <a:off x="6543675" y="365125"/>
+            <a:ext cx="1971675" cy="5811838"/>
+          </a:xfrm>
+        </p:spPr>
+        <p:txBody>
+          <a:bodyPr vert="eaVert"/>
+          <a:lstStyle/>
+          <a:p>
+            <a:r>
+              <a:rPr lang="en-US"/>
+              <a:t>Click to edit Master title style</a:t>
+            </a:r>
+            <a:endParaRPr lang="en-US" dirty="0"/>
+          </a:p>
+        </p:txBody>
+      </p:sp>
+      <p:sp>
+        <p:nvSpPr>
+          <p:cNvPr id="3" name="Vertical Text Placeholder 2"/>
+          <p:cNvSpPr>
+            <a:spLocks noGrp="1"/>
+          </p:cNvSpPr>
+          <p:nvPr>
+            <p:ph type="body" orient="vert" idx="1"/>
+          </p:nvPr>
+        </p:nvSpPr>
+        <p:spPr>
+          <a:xfrm>
+            <a:off x="628650" y="365125"/>
+            <a:ext cx="5800725" cy="5811838"/>
+          </a:xfrm>
+        </p:spPr>
+        <p:txBody>
+          <a:bodyPr vert="eaVert"/>
+          <a:lstStyle/>
+          <a:p>
+            <a:pPr lvl="0"/>
+            <a:r>
+              <a:rPr lang="en-US"/>
+              <a:t>Click to edit Master text styles</a:t>
+            </a:r>
+          </a:p>
+          <a:p>
+            <a:pPr lvl="1"/>
+            <a:r>
+              <a:rPr lang="en-US"/>
+              <a:t>Second level</a:t>
+            </a:r>
+          </a:p>
+          <a:p>
+            <a:pPr lvl="2"/>
+            <a:r>
+              <a:rPr lang="en-US"/>
+              <a:t>Third level</a:t>
+            </a:r>
+          </a:p>
+          <a:p>
+            <a:pPr lvl="3"/>
+            <a:r>
+              <a:rPr lang="en-US"/>
+              <a:t>Fourth level</a:t>
+            </a:r>
+          </a:p>
+          <a:p>
+            <a:pPr lvl="4"/>
+            <a:r>
+              <a:rPr lang="en-US"/>
+              <a:t>Fifth level</a:t>
+            </a:r>
+            <a:endParaRPr lang="en-US" dirty="0"/>
+          </a:p>
+        </p:txBody>
+      </p:sp>
+      <p:sp>
+        <p:nvSpPr>
+          <p:cNvPr id="4" name="Date Placeholder 3"/>
+          <p:cNvSpPr>
+            <a:spLocks noGrp="1"/>
+          </p:cNvSpPr>
+          <p:nvPr>
+            <p:ph type="dt" sz="half" idx="10"/>
+          </p:nvPr>
+        </p:nvSpPr>
+        <p:spPr/>
+        <p:txBody>
+          <a:bodyPr/>
+          <a:lstStyle/>
+          <a:p>
+            <a:fld id="{628FD48A-0636-1247-B254-6B36D700B17E}" type="datetimeFigureOut">
+              <a:rPr lang="en-US" smtClean="0"/>
+              <a:t>2/25/21</a:t>
+            </a:fld>
+            <a:endParaRPr lang="en-US"/>
+          </a:p>
+        </p:txBody>
+      </p:sp>
+      <p:sp>
+        <p:nvSpPr>
+          <p:cNvPr id="5" name="Footer Placeholder 4"/>
+          <p:cNvSpPr>
+            <a:spLocks noGrp="1"/>
+          </p:cNvSpPr>
+          <p:nvPr>
+            <p:ph type="ftr" sz="quarter" idx="11"/>
+          </p:nvPr>
+        </p:nvSpPr>
+        <p:spPr/>
+        <p:txBody>
+          <a:bodyPr/>
+          <a:lstStyle/>
+          <a:p>
+            <a:endParaRPr lang="en-US"/>
+          </a:p>
+        </p:txBody>
+      </p:sp>
+      <p:sp>
+        <p:nvSpPr>
+          <p:cNvPr id="6" name="Slide Number Placeholder 5"/>
+          <p:cNvSpPr>
+            <a:spLocks noGrp="1"/>
+          </p:cNvSpPr>
+          <p:nvPr>
+            <p:ph type="sldNum" sz="quarter" idx="12"/>
+          </p:nvPr>
+        </p:nvSpPr>
+        <p:spPr/>
+        <p:txBody>
+          <a:bodyPr/>
+          <a:lstStyle/>
+          <a:p>
+            <a:fld id="{C2C793BC-253B-5E4F-A3C5-757C57983B90}" type="slidenum">
+              <a:rPr lang="en-US" smtClean="0"/>
+              <a:t>‹#›</a:t>
+            </a:fld>
+            <a:endParaRPr lang="en-US"/>
+          </a:p>
+        </p:txBody>
+      </p:sp>
+    </p:spTree>
+    <p:extLst>
+      <p:ext uri="{BB962C8B-B14F-4D97-AF65-F5344CB8AC3E}">
+        <p14:creationId xmlns:p14="http://schemas.microsoft.com/office/powerpoint/2010/main" val="824231052"/>
       </p:ext>
     </p:extLst>
   </p:cSld>
@@ -390,134 +692,134 @@
           <a:lstStyle/>
           <a:p>
             <a:r>
+              <a:rPr lang="en-US"/>
+              <a:t>Click to edit Master title style</a:t>
+            </a:r>
+            <a:endParaRPr lang="en-US" dirty="0"/>
+          </a:p>
+        </p:txBody>
+      </p:sp>
+      <p:sp>
+        <p:nvSpPr>
+          <p:cNvPr id="3" name="Content Placeholder 2"/>
+          <p:cNvSpPr>
+            <a:spLocks noGrp="1"/>
+          </p:cNvSpPr>
+          <p:nvPr>
+            <p:ph idx="1"/>
+          </p:nvPr>
+        </p:nvSpPr>
+        <p:spPr/>
+        <p:txBody>
+          <a:bodyPr/>
+          <a:lstStyle/>
+          <a:p>
+            <a:pPr lvl="0"/>
+            <a:r>
+              <a:rPr lang="en-US"/>
+              <a:t>Click to edit Master text styles</a:t>
+            </a:r>
+          </a:p>
+          <a:p>
+            <a:pPr lvl="1"/>
+            <a:r>
+              <a:rPr lang="en-US"/>
+              <a:t>Second level</a:t>
+            </a:r>
+          </a:p>
+          <a:p>
+            <a:pPr lvl="2"/>
+            <a:r>
+              <a:rPr lang="en-US"/>
+              <a:t>Third level</a:t>
+            </a:r>
+          </a:p>
+          <a:p>
+            <a:pPr lvl="3"/>
+            <a:r>
+              <a:rPr lang="en-US"/>
+              <a:t>Fourth level</a:t>
+            </a:r>
+          </a:p>
+          <a:p>
+            <a:pPr lvl="4"/>
+            <a:r>
+              <a:rPr lang="en-US"/>
+              <a:t>Fifth level</a:t>
+            </a:r>
+            <a:endParaRPr lang="en-US" dirty="0"/>
+          </a:p>
+        </p:txBody>
+      </p:sp>
+      <p:sp>
+        <p:nvSpPr>
+          <p:cNvPr id="4" name="Date Placeholder 3"/>
+          <p:cNvSpPr>
+            <a:spLocks noGrp="1"/>
+          </p:cNvSpPr>
+          <p:nvPr>
+            <p:ph type="dt" sz="half" idx="10"/>
+          </p:nvPr>
+        </p:nvSpPr>
+        <p:spPr/>
+        <p:txBody>
+          <a:bodyPr/>
+          <a:lstStyle/>
+          <a:p>
+            <a:fld id="{628FD48A-0636-1247-B254-6B36D700B17E}" type="datetimeFigureOut">
               <a:rPr lang="en-US" smtClean="0"/>
-              <a:t>Click to edit Master title style</a:t>
-            </a:r>
-            <a:endParaRPr lang="en-GB"/>
-          </a:p>
-        </p:txBody>
-      </p:sp>
-      <p:sp>
-        <p:nvSpPr>
-          <p:cNvPr id="3" name="Content Placeholder 2"/>
-          <p:cNvSpPr>
-            <a:spLocks noGrp="1"/>
-          </p:cNvSpPr>
-          <p:nvPr>
-            <p:ph idx="1"/>
-          </p:nvPr>
-        </p:nvSpPr>
-        <p:spPr/>
-        <p:txBody>
-          <a:bodyPr/>
-          <a:lstStyle/>
-          <a:p>
-            <a:pPr lvl="0"/>
-            <a:r>
+              <a:t>2/25/21</a:t>
+            </a:fld>
+            <a:endParaRPr lang="en-US"/>
+          </a:p>
+        </p:txBody>
+      </p:sp>
+      <p:sp>
+        <p:nvSpPr>
+          <p:cNvPr id="5" name="Footer Placeholder 4"/>
+          <p:cNvSpPr>
+            <a:spLocks noGrp="1"/>
+          </p:cNvSpPr>
+          <p:nvPr>
+            <p:ph type="ftr" sz="quarter" idx="11"/>
+          </p:nvPr>
+        </p:nvSpPr>
+        <p:spPr/>
+        <p:txBody>
+          <a:bodyPr/>
+          <a:lstStyle/>
+          <a:p>
+            <a:endParaRPr lang="en-US"/>
+          </a:p>
+        </p:txBody>
+      </p:sp>
+      <p:sp>
+        <p:nvSpPr>
+          <p:cNvPr id="6" name="Slide Number Placeholder 5"/>
+          <p:cNvSpPr>
+            <a:spLocks noGrp="1"/>
+          </p:cNvSpPr>
+          <p:nvPr>
+            <p:ph type="sldNum" sz="quarter" idx="12"/>
+          </p:nvPr>
+        </p:nvSpPr>
+        <p:spPr/>
+        <p:txBody>
+          <a:bodyPr/>
+          <a:lstStyle/>
+          <a:p>
+            <a:fld id="{C2C793BC-253B-5E4F-A3C5-757C57983B90}" type="slidenum">
               <a:rPr lang="en-US" smtClean="0"/>
-              <a:t>Click to edit Master text styles</a:t>
-            </a:r>
-          </a:p>
-          <a:p>
-            <a:pPr lvl="1"/>
-            <a:r>
-              <a:rPr lang="en-US" smtClean="0"/>
-              <a:t>Second level</a:t>
-            </a:r>
-          </a:p>
-          <a:p>
-            <a:pPr lvl="2"/>
-            <a:r>
-              <a:rPr lang="en-US" smtClean="0"/>
-              <a:t>Third level</a:t>
-            </a:r>
-          </a:p>
-          <a:p>
-            <a:pPr lvl="3"/>
-            <a:r>
-              <a:rPr lang="en-US" smtClean="0"/>
-              <a:t>Fourth level</a:t>
-            </a:r>
-          </a:p>
-          <a:p>
-            <a:pPr lvl="4"/>
-            <a:r>
-              <a:rPr lang="en-US" smtClean="0"/>
-              <a:t>Fifth level</a:t>
-            </a:r>
-            <a:endParaRPr lang="en-GB"/>
-          </a:p>
-        </p:txBody>
-      </p:sp>
-      <p:sp>
-        <p:nvSpPr>
-          <p:cNvPr id="4" name="Date Placeholder 3"/>
-          <p:cNvSpPr>
-            <a:spLocks noGrp="1"/>
-          </p:cNvSpPr>
-          <p:nvPr>
-            <p:ph type="dt" sz="half" idx="10"/>
-          </p:nvPr>
-        </p:nvSpPr>
-        <p:spPr/>
-        <p:txBody>
-          <a:bodyPr/>
-          <a:lstStyle/>
-          <a:p>
-            <a:fld id="{E6744CE3-0875-4B69-89C0-6F72D8139561}" type="datetimeFigureOut">
-              <a:rPr lang="en-GB" smtClean="0"/>
-              <a:t>26/05/17</a:t>
-            </a:fld>
-            <a:endParaRPr lang="en-GB"/>
-          </a:p>
-        </p:txBody>
-      </p:sp>
-      <p:sp>
-        <p:nvSpPr>
-          <p:cNvPr id="5" name="Footer Placeholder 4"/>
-          <p:cNvSpPr>
-            <a:spLocks noGrp="1"/>
-          </p:cNvSpPr>
-          <p:nvPr>
-            <p:ph type="ftr" sz="quarter" idx="11"/>
-          </p:nvPr>
-        </p:nvSpPr>
-        <p:spPr/>
-        <p:txBody>
-          <a:bodyPr/>
-          <a:lstStyle/>
-          <a:p>
-            <a:endParaRPr lang="en-GB"/>
-          </a:p>
-        </p:txBody>
-      </p:sp>
-      <p:sp>
-        <p:nvSpPr>
-          <p:cNvPr id="6" name="Slide Number Placeholder 5"/>
-          <p:cNvSpPr>
-            <a:spLocks noGrp="1"/>
-          </p:cNvSpPr>
-          <p:nvPr>
-            <p:ph type="sldNum" sz="quarter" idx="12"/>
-          </p:nvPr>
-        </p:nvSpPr>
-        <p:spPr/>
-        <p:txBody>
-          <a:bodyPr/>
-          <a:lstStyle/>
-          <a:p>
-            <a:fld id="{8DADB20D-508E-4C6D-A9E4-257D5607B0F6}" type="slidenum">
-              <a:rPr lang="en-GB" smtClean="0"/>
               <a:t>‹#›</a:t>
             </a:fld>
-            <a:endParaRPr lang="en-GB"/>
+            <a:endParaRPr lang="en-US"/>
           </a:p>
         </p:txBody>
       </p:sp>
     </p:spTree>
     <p:extLst>
       <p:ext uri="{BB962C8B-B14F-4D97-AF65-F5344CB8AC3E}">
-        <p14:creationId xmlns:p14="http://schemas.microsoft.com/office/powerpoint/2010/main" val="271576982"/>
+        <p14:creationId xmlns:p14="http://schemas.microsoft.com/office/powerpoint/2010/main" val="3430648693"/>
       </p:ext>
     </p:extLst>
   </p:cSld>
@@ -556,23 +858,23 @@
         </p:nvSpPr>
         <p:spPr>
           <a:xfrm>
-            <a:off x="722313" y="4406900"/>
-            <a:ext cx="7772400" cy="1362075"/>
+            <a:off x="623888" y="1709739"/>
+            <a:ext cx="7886700" cy="2852737"/>
           </a:xfrm>
         </p:spPr>
         <p:txBody>
-          <a:bodyPr anchor="t"/>
+          <a:bodyPr anchor="b"/>
           <a:lstStyle>
-            <a:lvl1pPr algn="l">
-              <a:defRPr sz="4000" b="1" cap="all"/>
+            <a:lvl1pPr>
+              <a:defRPr sz="6000"/>
             </a:lvl1pPr>
           </a:lstStyle>
           <a:p>
             <a:r>
-              <a:rPr lang="en-US" smtClean="0"/>
+              <a:rPr lang="en-US"/>
               <a:t>Click to edit Master title style</a:t>
             </a:r>
-            <a:endParaRPr lang="en-GB"/>
+            <a:endParaRPr lang="en-US" dirty="0"/>
           </a:p>
         </p:txBody>
       </p:sp>
@@ -588,26 +890,24 @@
         </p:nvSpPr>
         <p:spPr>
           <a:xfrm>
-            <a:off x="722313" y="2906713"/>
-            <a:ext cx="7772400" cy="1500187"/>
+            <a:off x="623888" y="4589464"/>
+            <a:ext cx="7886700" cy="1500187"/>
           </a:xfrm>
         </p:spPr>
         <p:txBody>
-          <a:bodyPr anchor="b"/>
+          <a:bodyPr/>
           <a:lstStyle>
             <a:lvl1pPr marL="0" indent="0">
               <a:buNone/>
-              <a:defRPr sz="2000">
+              <a:defRPr sz="2400">
                 <a:solidFill>
-                  <a:schemeClr val="tx1">
-                    <a:tint val="75000"/>
-                  </a:schemeClr>
+                  <a:schemeClr val="tx1"/>
                 </a:solidFill>
               </a:defRPr>
             </a:lvl1pPr>
             <a:lvl2pPr marL="457200" indent="0">
               <a:buNone/>
-              <a:defRPr sz="1800">
+              <a:defRPr sz="2000">
                 <a:solidFill>
                   <a:schemeClr val="tx1">
                     <a:tint val="75000"/>
@@ -617,7 +917,7 @@
             </a:lvl2pPr>
             <a:lvl3pPr marL="914400" indent="0">
               <a:buNone/>
-              <a:defRPr sz="1600">
+              <a:defRPr sz="1800">
                 <a:solidFill>
                   <a:schemeClr val="tx1">
                     <a:tint val="75000"/>
@@ -627,7 +927,7 @@
             </a:lvl3pPr>
             <a:lvl4pPr marL="1371600" indent="0">
               <a:buNone/>
-              <a:defRPr sz="1400">
+              <a:defRPr sz="1600">
                 <a:solidFill>
                   <a:schemeClr val="tx1">
                     <a:tint val="75000"/>
@@ -637,7 +937,7 @@
             </a:lvl4pPr>
             <a:lvl5pPr marL="1828800" indent="0">
               <a:buNone/>
-              <a:defRPr sz="1400">
+              <a:defRPr sz="1600">
                 <a:solidFill>
                   <a:schemeClr val="tx1">
                     <a:tint val="75000"/>
@@ -647,7 +947,7 @@
             </a:lvl5pPr>
             <a:lvl6pPr marL="2286000" indent="0">
               <a:buNone/>
-              <a:defRPr sz="1400">
+              <a:defRPr sz="1600">
                 <a:solidFill>
                   <a:schemeClr val="tx1">
                     <a:tint val="75000"/>
@@ -657,7 +957,7 @@
             </a:lvl6pPr>
             <a:lvl7pPr marL="2743200" indent="0">
               <a:buNone/>
-              <a:defRPr sz="1400">
+              <a:defRPr sz="1600">
                 <a:solidFill>
                   <a:schemeClr val="tx1">
                     <a:tint val="75000"/>
@@ -667,7 +967,7 @@
             </a:lvl7pPr>
             <a:lvl8pPr marL="3200400" indent="0">
               <a:buNone/>
-              <a:defRPr sz="1400">
+              <a:defRPr sz="1600">
                 <a:solidFill>
                   <a:schemeClr val="tx1">
                     <a:tint val="75000"/>
@@ -677,7 +977,7 @@
             </a:lvl8pPr>
             <a:lvl9pPr marL="3657600" indent="0">
               <a:buNone/>
-              <a:defRPr sz="1400">
+              <a:defRPr sz="1600">
                 <a:solidFill>
                   <a:schemeClr val="tx1">
                     <a:tint val="75000"/>
@@ -689,32 +989,32 @@
           <a:p>
             <a:pPr lvl="0"/>
             <a:r>
+              <a:rPr lang="en-US"/>
+              <a:t>Click to edit Master text styles</a:t>
+            </a:r>
+          </a:p>
+        </p:txBody>
+      </p:sp>
+      <p:sp>
+        <p:nvSpPr>
+          <p:cNvPr id="4" name="Date Placeholder 3"/>
+          <p:cNvSpPr>
+            <a:spLocks noGrp="1"/>
+          </p:cNvSpPr>
+          <p:nvPr>
+            <p:ph type="dt" sz="half" idx="10"/>
+          </p:nvPr>
+        </p:nvSpPr>
+        <p:spPr/>
+        <p:txBody>
+          <a:bodyPr/>
+          <a:lstStyle/>
+          <a:p>
+            <a:fld id="{628FD48A-0636-1247-B254-6B36D700B17E}" type="datetimeFigureOut">
               <a:rPr lang="en-US" smtClean="0"/>
-              <a:t>Click to edit Master text styles</a:t>
-            </a:r>
-          </a:p>
-        </p:txBody>
-      </p:sp>
-      <p:sp>
-        <p:nvSpPr>
-          <p:cNvPr id="4" name="Date Placeholder 3"/>
-          <p:cNvSpPr>
-            <a:spLocks noGrp="1"/>
-          </p:cNvSpPr>
-          <p:nvPr>
-            <p:ph type="dt" sz="half" idx="10"/>
-          </p:nvPr>
-        </p:nvSpPr>
-        <p:spPr/>
-        <p:txBody>
-          <a:bodyPr/>
-          <a:lstStyle/>
-          <a:p>
-            <a:fld id="{E6744CE3-0875-4B69-89C0-6F72D8139561}" type="datetimeFigureOut">
-              <a:rPr lang="en-GB" smtClean="0"/>
-              <a:t>26/05/17</a:t>
+              <a:t>2/25/21</a:t>
             </a:fld>
-            <a:endParaRPr lang="en-GB"/>
+            <a:endParaRPr lang="en-US"/>
           </a:p>
         </p:txBody>
       </p:sp>
@@ -733,7 +1033,7 @@
           <a:bodyPr/>
           <a:lstStyle/>
           <a:p>
-            <a:endParaRPr lang="en-GB"/>
+            <a:endParaRPr lang="en-US"/>
           </a:p>
         </p:txBody>
       </p:sp>
@@ -752,18 +1052,18 @@
           <a:bodyPr/>
           <a:lstStyle/>
           <a:p>
-            <a:fld id="{8DADB20D-508E-4C6D-A9E4-257D5607B0F6}" type="slidenum">
-              <a:rPr lang="en-GB" smtClean="0"/>
+            <a:fld id="{C2C793BC-253B-5E4F-A3C5-757C57983B90}" type="slidenum">
+              <a:rPr lang="en-US" smtClean="0"/>
               <a:t>‹#›</a:t>
             </a:fld>
-            <a:endParaRPr lang="en-GB"/>
+            <a:endParaRPr lang="en-US"/>
           </a:p>
         </p:txBody>
       </p:sp>
     </p:spTree>
     <p:extLst>
       <p:ext uri="{BB962C8B-B14F-4D97-AF65-F5344CB8AC3E}">
-        <p14:creationId xmlns:p14="http://schemas.microsoft.com/office/powerpoint/2010/main" val="1431545585"/>
+        <p14:creationId xmlns:p14="http://schemas.microsoft.com/office/powerpoint/2010/main" val="657426158"/>
       </p:ext>
     </p:extLst>
   </p:cSld>
@@ -806,10 +1106,10 @@
           <a:lstStyle/>
           <a:p>
             <a:r>
-              <a:rPr lang="en-US" smtClean="0"/>
+              <a:rPr lang="en-US"/>
               <a:t>Click to edit Master title style</a:t>
             </a:r>
-            <a:endParaRPr lang="en-GB"/>
+            <a:endParaRPr lang="en-US" dirty="0"/>
           </a:p>
         </p:txBody>
       </p:sp>
@@ -825,76 +1125,48 @@
         </p:nvSpPr>
         <p:spPr>
           <a:xfrm>
-            <a:off x="457200" y="1600200"/>
-            <a:ext cx="4038600" cy="4525963"/>
+            <a:off x="628650" y="1825625"/>
+            <a:ext cx="3886200" cy="4351338"/>
           </a:xfrm>
         </p:spPr>
         <p:txBody>
           <a:bodyPr/>
-          <a:lstStyle>
-            <a:lvl1pPr>
-              <a:defRPr sz="2800"/>
-            </a:lvl1pPr>
-            <a:lvl2pPr>
-              <a:defRPr sz="2400"/>
-            </a:lvl2pPr>
-            <a:lvl3pPr>
-              <a:defRPr sz="2000"/>
-            </a:lvl3pPr>
-            <a:lvl4pPr>
-              <a:defRPr sz="1800"/>
-            </a:lvl4pPr>
-            <a:lvl5pPr>
-              <a:defRPr sz="1800"/>
-            </a:lvl5pPr>
-            <a:lvl6pPr>
-              <a:defRPr sz="1800"/>
-            </a:lvl6pPr>
-            <a:lvl7pPr>
-              <a:defRPr sz="1800"/>
-            </a:lvl7pPr>
-            <a:lvl8pPr>
-              <a:defRPr sz="1800"/>
-            </a:lvl8pPr>
-            <a:lvl9pPr>
-              <a:defRPr sz="1800"/>
-            </a:lvl9pPr>
-          </a:lstStyle>
+          <a:lstStyle/>
           <a:p>
             <a:pPr lvl="0"/>
             <a:r>
-              <a:rPr lang="en-US" smtClean="0"/>
+              <a:rPr lang="en-US"/>
               <a:t>Click to edit Master text styles</a:t>
             </a:r>
           </a:p>
           <a:p>
             <a:pPr lvl="1"/>
             <a:r>
-              <a:rPr lang="en-US" smtClean="0"/>
+              <a:rPr lang="en-US"/>
               <a:t>Second level</a:t>
             </a:r>
           </a:p>
           <a:p>
             <a:pPr lvl="2"/>
             <a:r>
-              <a:rPr lang="en-US" smtClean="0"/>
+              <a:rPr lang="en-US"/>
               <a:t>Third level</a:t>
             </a:r>
           </a:p>
           <a:p>
             <a:pPr lvl="3"/>
             <a:r>
-              <a:rPr lang="en-US" smtClean="0"/>
+              <a:rPr lang="en-US"/>
               <a:t>Fourth level</a:t>
             </a:r>
           </a:p>
           <a:p>
             <a:pPr lvl="4"/>
             <a:r>
-              <a:rPr lang="en-US" smtClean="0"/>
+              <a:rPr lang="en-US"/>
               <a:t>Fifth level</a:t>
             </a:r>
-            <a:endParaRPr lang="en-GB"/>
+            <a:endParaRPr lang="en-US" dirty="0"/>
           </a:p>
         </p:txBody>
       </p:sp>
@@ -910,148 +1182,120 @@
         </p:nvSpPr>
         <p:spPr>
           <a:xfrm>
-            <a:off x="4648200" y="1600200"/>
-            <a:ext cx="4038600" cy="4525963"/>
+            <a:off x="4629150" y="1825625"/>
+            <a:ext cx="3886200" cy="4351338"/>
           </a:xfrm>
         </p:spPr>
         <p:txBody>
           <a:bodyPr/>
-          <a:lstStyle>
-            <a:lvl1pPr>
-              <a:defRPr sz="2800"/>
-            </a:lvl1pPr>
-            <a:lvl2pPr>
-              <a:defRPr sz="2400"/>
-            </a:lvl2pPr>
-            <a:lvl3pPr>
-              <a:defRPr sz="2000"/>
-            </a:lvl3pPr>
-            <a:lvl4pPr>
-              <a:defRPr sz="1800"/>
-            </a:lvl4pPr>
-            <a:lvl5pPr>
-              <a:defRPr sz="1800"/>
-            </a:lvl5pPr>
-            <a:lvl6pPr>
-              <a:defRPr sz="1800"/>
-            </a:lvl6pPr>
-            <a:lvl7pPr>
-              <a:defRPr sz="1800"/>
-            </a:lvl7pPr>
-            <a:lvl8pPr>
-              <a:defRPr sz="1800"/>
-            </a:lvl8pPr>
-            <a:lvl9pPr>
-              <a:defRPr sz="1800"/>
-            </a:lvl9pPr>
-          </a:lstStyle>
+          <a:lstStyle/>
           <a:p>
             <a:pPr lvl="0"/>
             <a:r>
+              <a:rPr lang="en-US"/>
+              <a:t>Click to edit Master text styles</a:t>
+            </a:r>
+          </a:p>
+          <a:p>
+            <a:pPr lvl="1"/>
+            <a:r>
+              <a:rPr lang="en-US"/>
+              <a:t>Second level</a:t>
+            </a:r>
+          </a:p>
+          <a:p>
+            <a:pPr lvl="2"/>
+            <a:r>
+              <a:rPr lang="en-US"/>
+              <a:t>Third level</a:t>
+            </a:r>
+          </a:p>
+          <a:p>
+            <a:pPr lvl="3"/>
+            <a:r>
+              <a:rPr lang="en-US"/>
+              <a:t>Fourth level</a:t>
+            </a:r>
+          </a:p>
+          <a:p>
+            <a:pPr lvl="4"/>
+            <a:r>
+              <a:rPr lang="en-US"/>
+              <a:t>Fifth level</a:t>
+            </a:r>
+            <a:endParaRPr lang="en-US" dirty="0"/>
+          </a:p>
+        </p:txBody>
+      </p:sp>
+      <p:sp>
+        <p:nvSpPr>
+          <p:cNvPr id="5" name="Date Placeholder 4"/>
+          <p:cNvSpPr>
+            <a:spLocks noGrp="1"/>
+          </p:cNvSpPr>
+          <p:nvPr>
+            <p:ph type="dt" sz="half" idx="10"/>
+          </p:nvPr>
+        </p:nvSpPr>
+        <p:spPr/>
+        <p:txBody>
+          <a:bodyPr/>
+          <a:lstStyle/>
+          <a:p>
+            <a:fld id="{628FD48A-0636-1247-B254-6B36D700B17E}" type="datetimeFigureOut">
               <a:rPr lang="en-US" smtClean="0"/>
-              <a:t>Click to edit Master text styles</a:t>
-            </a:r>
-          </a:p>
-          <a:p>
-            <a:pPr lvl="1"/>
-            <a:r>
+              <a:t>2/25/21</a:t>
+            </a:fld>
+            <a:endParaRPr lang="en-US"/>
+          </a:p>
+        </p:txBody>
+      </p:sp>
+      <p:sp>
+        <p:nvSpPr>
+          <p:cNvPr id="6" name="Footer Placeholder 5"/>
+          <p:cNvSpPr>
+            <a:spLocks noGrp="1"/>
+          </p:cNvSpPr>
+          <p:nvPr>
+            <p:ph type="ftr" sz="quarter" idx="11"/>
+          </p:nvPr>
+        </p:nvSpPr>
+        <p:spPr/>
+        <p:txBody>
+          <a:bodyPr/>
+          <a:lstStyle/>
+          <a:p>
+            <a:endParaRPr lang="en-US"/>
+          </a:p>
+        </p:txBody>
+      </p:sp>
+      <p:sp>
+        <p:nvSpPr>
+          <p:cNvPr id="7" name="Slide Number Placeholder 6"/>
+          <p:cNvSpPr>
+            <a:spLocks noGrp="1"/>
+          </p:cNvSpPr>
+          <p:nvPr>
+            <p:ph type="sldNum" sz="quarter" idx="12"/>
+          </p:nvPr>
+        </p:nvSpPr>
+        <p:spPr/>
+        <p:txBody>
+          <a:bodyPr/>
+          <a:lstStyle/>
+          <a:p>
+            <a:fld id="{C2C793BC-253B-5E4F-A3C5-757C57983B90}" type="slidenum">
               <a:rPr lang="en-US" smtClean="0"/>
-              <a:t>Second level</a:t>
-            </a:r>
-          </a:p>
-          <a:p>
-            <a:pPr lvl="2"/>
-            <a:r>
-              <a:rPr lang="en-US" smtClean="0"/>
-              <a:t>Third level</a:t>
-            </a:r>
-          </a:p>
-          <a:p>
-            <a:pPr lvl="3"/>
-            <a:r>
-              <a:rPr lang="en-US" smtClean="0"/>
-              <a:t>Fourth level</a:t>
-            </a:r>
-          </a:p>
-          <a:p>
-            <a:pPr lvl="4"/>
-            <a:r>
-              <a:rPr lang="en-US" smtClean="0"/>
-              <a:t>Fifth level</a:t>
-            </a:r>
-            <a:endParaRPr lang="en-GB"/>
-          </a:p>
-        </p:txBody>
-      </p:sp>
-      <p:sp>
-        <p:nvSpPr>
-          <p:cNvPr id="5" name="Date Placeholder 4"/>
-          <p:cNvSpPr>
-            <a:spLocks noGrp="1"/>
-          </p:cNvSpPr>
-          <p:nvPr>
-            <p:ph type="dt" sz="half" idx="10"/>
-          </p:nvPr>
-        </p:nvSpPr>
-        <p:spPr/>
-        <p:txBody>
-          <a:bodyPr/>
-          <a:lstStyle/>
-          <a:p>
-            <a:fld id="{E6744CE3-0875-4B69-89C0-6F72D8139561}" type="datetimeFigureOut">
-              <a:rPr lang="en-GB" smtClean="0"/>
-              <a:t>26/05/17</a:t>
-            </a:fld>
-            <a:endParaRPr lang="en-GB"/>
-          </a:p>
-        </p:txBody>
-      </p:sp>
-      <p:sp>
-        <p:nvSpPr>
-          <p:cNvPr id="6" name="Footer Placeholder 5"/>
-          <p:cNvSpPr>
-            <a:spLocks noGrp="1"/>
-          </p:cNvSpPr>
-          <p:nvPr>
-            <p:ph type="ftr" sz="quarter" idx="11"/>
-          </p:nvPr>
-        </p:nvSpPr>
-        <p:spPr/>
-        <p:txBody>
-          <a:bodyPr/>
-          <a:lstStyle/>
-          <a:p>
-            <a:endParaRPr lang="en-GB"/>
-          </a:p>
-        </p:txBody>
-      </p:sp>
-      <p:sp>
-        <p:nvSpPr>
-          <p:cNvPr id="7" name="Slide Number Placeholder 6"/>
-          <p:cNvSpPr>
-            <a:spLocks noGrp="1"/>
-          </p:cNvSpPr>
-          <p:nvPr>
-            <p:ph type="sldNum" sz="quarter" idx="12"/>
-          </p:nvPr>
-        </p:nvSpPr>
-        <p:spPr/>
-        <p:txBody>
-          <a:bodyPr/>
-          <a:lstStyle/>
-          <a:p>
-            <a:fld id="{8DADB20D-508E-4C6D-A9E4-257D5607B0F6}" type="slidenum">
-              <a:rPr lang="en-GB" smtClean="0"/>
               <a:t>‹#›</a:t>
             </a:fld>
-            <a:endParaRPr lang="en-GB"/>
+            <a:endParaRPr lang="en-US"/>
           </a:p>
         </p:txBody>
       </p:sp>
     </p:spTree>
     <p:extLst>
       <p:ext uri="{BB962C8B-B14F-4D97-AF65-F5344CB8AC3E}">
-        <p14:creationId xmlns:p14="http://schemas.microsoft.com/office/powerpoint/2010/main" val="468392282"/>
+        <p14:creationId xmlns:p14="http://schemas.microsoft.com/office/powerpoint/2010/main" val="1553004783"/>
       </p:ext>
     </p:extLst>
   </p:cSld>
@@ -1088,37 +1332,38 @@
             <p:ph type="title"/>
           </p:nvPr>
         </p:nvSpPr>
-        <p:spPr/>
-        <p:txBody>
-          <a:bodyPr/>
-          <a:lstStyle>
-            <a:lvl1pPr>
-              <a:defRPr/>
-            </a:lvl1pPr>
-          </a:lstStyle>
-          <a:p>
-            <a:r>
-              <a:rPr lang="en-US" smtClean="0"/>
-              <a:t>Click to edit Master title style</a:t>
-            </a:r>
-            <a:endParaRPr lang="en-GB"/>
-          </a:p>
-        </p:txBody>
-      </p:sp>
-      <p:sp>
-        <p:nvSpPr>
-          <p:cNvPr id="3" name="Text Placeholder 2"/>
-          <p:cNvSpPr>
-            <a:spLocks noGrp="1"/>
-          </p:cNvSpPr>
-          <p:nvPr>
-            <p:ph type="body" idx="1"/>
-          </p:nvPr>
-        </p:nvSpPr>
         <p:spPr>
           <a:xfrm>
-            <a:off x="457200" y="1535113"/>
-            <a:ext cx="4040188" cy="639762"/>
+            <a:off x="629841" y="365126"/>
+            <a:ext cx="7886700" cy="1325563"/>
+          </a:xfrm>
+        </p:spPr>
+        <p:txBody>
+          <a:bodyPr/>
+          <a:lstStyle/>
+          <a:p>
+            <a:r>
+              <a:rPr lang="en-US"/>
+              <a:t>Click to edit Master title style</a:t>
+            </a:r>
+            <a:endParaRPr lang="en-US" dirty="0"/>
+          </a:p>
+        </p:txBody>
+      </p:sp>
+      <p:sp>
+        <p:nvSpPr>
+          <p:cNvPr id="3" name="Text Placeholder 2"/>
+          <p:cNvSpPr>
+            <a:spLocks noGrp="1"/>
+          </p:cNvSpPr>
+          <p:nvPr>
+            <p:ph type="body" idx="1"/>
+          </p:nvPr>
+        </p:nvSpPr>
+        <p:spPr>
+          <a:xfrm>
+            <a:off x="629842" y="1681163"/>
+            <a:ext cx="3868340" cy="823912"/>
           </a:xfrm>
         </p:spPr>
         <p:txBody>
@@ -1164,7 +1409,7 @@
           <a:p>
             <a:pPr lvl="0"/>
             <a:r>
-              <a:rPr lang="en-US" smtClean="0"/>
+              <a:rPr lang="en-US"/>
               <a:t>Click to edit Master text styles</a:t>
             </a:r>
           </a:p>
@@ -1182,76 +1427,48 @@
         </p:nvSpPr>
         <p:spPr>
           <a:xfrm>
-            <a:off x="457200" y="2174875"/>
-            <a:ext cx="4040188" cy="3951288"/>
+            <a:off x="629842" y="2505075"/>
+            <a:ext cx="3868340" cy="3684588"/>
           </a:xfrm>
         </p:spPr>
         <p:txBody>
           <a:bodyPr/>
-          <a:lstStyle>
-            <a:lvl1pPr>
-              <a:defRPr sz="2400"/>
-            </a:lvl1pPr>
-            <a:lvl2pPr>
-              <a:defRPr sz="2000"/>
-            </a:lvl2pPr>
-            <a:lvl3pPr>
-              <a:defRPr sz="1800"/>
-            </a:lvl3pPr>
-            <a:lvl4pPr>
-              <a:defRPr sz="1600"/>
-            </a:lvl4pPr>
-            <a:lvl5pPr>
-              <a:defRPr sz="1600"/>
-            </a:lvl5pPr>
-            <a:lvl6pPr>
-              <a:defRPr sz="1600"/>
-            </a:lvl6pPr>
-            <a:lvl7pPr>
-              <a:defRPr sz="1600"/>
-            </a:lvl7pPr>
-            <a:lvl8pPr>
-              <a:defRPr sz="1600"/>
-            </a:lvl8pPr>
-            <a:lvl9pPr>
-              <a:defRPr sz="1600"/>
-            </a:lvl9pPr>
-          </a:lstStyle>
+          <a:lstStyle/>
           <a:p>
             <a:pPr lvl="0"/>
             <a:r>
-              <a:rPr lang="en-US" smtClean="0"/>
+              <a:rPr lang="en-US"/>
               <a:t>Click to edit Master text styles</a:t>
             </a:r>
           </a:p>
           <a:p>
             <a:pPr lvl="1"/>
             <a:r>
-              <a:rPr lang="en-US" smtClean="0"/>
+              <a:rPr lang="en-US"/>
               <a:t>Second level</a:t>
             </a:r>
           </a:p>
           <a:p>
             <a:pPr lvl="2"/>
             <a:r>
-              <a:rPr lang="en-US" smtClean="0"/>
+              <a:rPr lang="en-US"/>
               <a:t>Third level</a:t>
             </a:r>
           </a:p>
           <a:p>
             <a:pPr lvl="3"/>
             <a:r>
-              <a:rPr lang="en-US" smtClean="0"/>
+              <a:rPr lang="en-US"/>
               <a:t>Fourth level</a:t>
             </a:r>
           </a:p>
           <a:p>
             <a:pPr lvl="4"/>
             <a:r>
-              <a:rPr lang="en-US" smtClean="0"/>
+              <a:rPr lang="en-US"/>
               <a:t>Fifth level</a:t>
             </a:r>
-            <a:endParaRPr lang="en-GB"/>
+            <a:endParaRPr lang="en-US" dirty="0"/>
           </a:p>
         </p:txBody>
       </p:sp>
@@ -1267,8 +1484,8 @@
         </p:nvSpPr>
         <p:spPr>
           <a:xfrm>
-            <a:off x="4645025" y="1535113"/>
-            <a:ext cx="4041775" cy="639762"/>
+            <a:off x="4629150" y="1681163"/>
+            <a:ext cx="3887391" cy="823912"/>
           </a:xfrm>
         </p:spPr>
         <p:txBody>
@@ -1314,7 +1531,7 @@
           <a:p>
             <a:pPr lvl="0"/>
             <a:r>
-              <a:rPr lang="en-US" smtClean="0"/>
+              <a:rPr lang="en-US"/>
               <a:t>Click to edit Master text styles</a:t>
             </a:r>
           </a:p>
@@ -1332,148 +1549,120 @@
         </p:nvSpPr>
         <p:spPr>
           <a:xfrm>
-            <a:off x="4645025" y="2174875"/>
-            <a:ext cx="4041775" cy="3951288"/>
+            <a:off x="4629150" y="2505075"/>
+            <a:ext cx="3887391" cy="3684588"/>
           </a:xfrm>
         </p:spPr>
         <p:txBody>
           <a:bodyPr/>
-          <a:lstStyle>
-            <a:lvl1pPr>
-              <a:defRPr sz="2400"/>
-            </a:lvl1pPr>
-            <a:lvl2pPr>
-              <a:defRPr sz="2000"/>
-            </a:lvl2pPr>
-            <a:lvl3pPr>
-              <a:defRPr sz="1800"/>
-            </a:lvl3pPr>
-            <a:lvl4pPr>
-              <a:defRPr sz="1600"/>
-            </a:lvl4pPr>
-            <a:lvl5pPr>
-              <a:defRPr sz="1600"/>
-            </a:lvl5pPr>
-            <a:lvl6pPr>
-              <a:defRPr sz="1600"/>
-            </a:lvl6pPr>
-            <a:lvl7pPr>
-              <a:defRPr sz="1600"/>
-            </a:lvl7pPr>
-            <a:lvl8pPr>
-              <a:defRPr sz="1600"/>
-            </a:lvl8pPr>
-            <a:lvl9pPr>
-              <a:defRPr sz="1600"/>
-            </a:lvl9pPr>
-          </a:lstStyle>
+          <a:lstStyle/>
           <a:p>
             <a:pPr lvl="0"/>
             <a:r>
+              <a:rPr lang="en-US"/>
+              <a:t>Click to edit Master text styles</a:t>
+            </a:r>
+          </a:p>
+          <a:p>
+            <a:pPr lvl="1"/>
+            <a:r>
+              <a:rPr lang="en-US"/>
+              <a:t>Second level</a:t>
+            </a:r>
+          </a:p>
+          <a:p>
+            <a:pPr lvl="2"/>
+            <a:r>
+              <a:rPr lang="en-US"/>
+              <a:t>Third level</a:t>
+            </a:r>
+          </a:p>
+          <a:p>
+            <a:pPr lvl="3"/>
+            <a:r>
+              <a:rPr lang="en-US"/>
+              <a:t>Fourth level</a:t>
+            </a:r>
+          </a:p>
+          <a:p>
+            <a:pPr lvl="4"/>
+            <a:r>
+              <a:rPr lang="en-US"/>
+              <a:t>Fifth level</a:t>
+            </a:r>
+            <a:endParaRPr lang="en-US" dirty="0"/>
+          </a:p>
+        </p:txBody>
+      </p:sp>
+      <p:sp>
+        <p:nvSpPr>
+          <p:cNvPr id="7" name="Date Placeholder 6"/>
+          <p:cNvSpPr>
+            <a:spLocks noGrp="1"/>
+          </p:cNvSpPr>
+          <p:nvPr>
+            <p:ph type="dt" sz="half" idx="10"/>
+          </p:nvPr>
+        </p:nvSpPr>
+        <p:spPr/>
+        <p:txBody>
+          <a:bodyPr/>
+          <a:lstStyle/>
+          <a:p>
+            <a:fld id="{628FD48A-0636-1247-B254-6B36D700B17E}" type="datetimeFigureOut">
               <a:rPr lang="en-US" smtClean="0"/>
-              <a:t>Click to edit Master text styles</a:t>
-            </a:r>
-          </a:p>
-          <a:p>
-            <a:pPr lvl="1"/>
-            <a:r>
+              <a:t>2/25/21</a:t>
+            </a:fld>
+            <a:endParaRPr lang="en-US"/>
+          </a:p>
+        </p:txBody>
+      </p:sp>
+      <p:sp>
+        <p:nvSpPr>
+          <p:cNvPr id="8" name="Footer Placeholder 7"/>
+          <p:cNvSpPr>
+            <a:spLocks noGrp="1"/>
+          </p:cNvSpPr>
+          <p:nvPr>
+            <p:ph type="ftr" sz="quarter" idx="11"/>
+          </p:nvPr>
+        </p:nvSpPr>
+        <p:spPr/>
+        <p:txBody>
+          <a:bodyPr/>
+          <a:lstStyle/>
+          <a:p>
+            <a:endParaRPr lang="en-US"/>
+          </a:p>
+        </p:txBody>
+      </p:sp>
+      <p:sp>
+        <p:nvSpPr>
+          <p:cNvPr id="9" name="Slide Number Placeholder 8"/>
+          <p:cNvSpPr>
+            <a:spLocks noGrp="1"/>
+          </p:cNvSpPr>
+          <p:nvPr>
+            <p:ph type="sldNum" sz="quarter" idx="12"/>
+          </p:nvPr>
+        </p:nvSpPr>
+        <p:spPr/>
+        <p:txBody>
+          <a:bodyPr/>
+          <a:lstStyle/>
+          <a:p>
+            <a:fld id="{C2C793BC-253B-5E4F-A3C5-757C57983B90}" type="slidenum">
               <a:rPr lang="en-US" smtClean="0"/>
-              <a:t>Second level</a:t>
-            </a:r>
-          </a:p>
-          <a:p>
-            <a:pPr lvl="2"/>
-            <a:r>
-              <a:rPr lang="en-US" smtClean="0"/>
-              <a:t>Third level</a:t>
-            </a:r>
-          </a:p>
-          <a:p>
-            <a:pPr lvl="3"/>
-            <a:r>
-              <a:rPr lang="en-US" smtClean="0"/>
-              <a:t>Fourth level</a:t>
-            </a:r>
-          </a:p>
-          <a:p>
-            <a:pPr lvl="4"/>
-            <a:r>
-              <a:rPr lang="en-US" smtClean="0"/>
-              <a:t>Fifth level</a:t>
-            </a:r>
-            <a:endParaRPr lang="en-GB"/>
-          </a:p>
-        </p:txBody>
-      </p:sp>
-      <p:sp>
-        <p:nvSpPr>
-          <p:cNvPr id="7" name="Date Placeholder 6"/>
-          <p:cNvSpPr>
-            <a:spLocks noGrp="1"/>
-          </p:cNvSpPr>
-          <p:nvPr>
-            <p:ph type="dt" sz="half" idx="10"/>
-          </p:nvPr>
-        </p:nvSpPr>
-        <p:spPr/>
-        <p:txBody>
-          <a:bodyPr/>
-          <a:lstStyle/>
-          <a:p>
-            <a:fld id="{E6744CE3-0875-4B69-89C0-6F72D8139561}" type="datetimeFigureOut">
-              <a:rPr lang="en-GB" smtClean="0"/>
-              <a:t>26/05/17</a:t>
-            </a:fld>
-            <a:endParaRPr lang="en-GB"/>
-          </a:p>
-        </p:txBody>
-      </p:sp>
-      <p:sp>
-        <p:nvSpPr>
-          <p:cNvPr id="8" name="Footer Placeholder 7"/>
-          <p:cNvSpPr>
-            <a:spLocks noGrp="1"/>
-          </p:cNvSpPr>
-          <p:nvPr>
-            <p:ph type="ftr" sz="quarter" idx="11"/>
-          </p:nvPr>
-        </p:nvSpPr>
-        <p:spPr/>
-        <p:txBody>
-          <a:bodyPr/>
-          <a:lstStyle/>
-          <a:p>
-            <a:endParaRPr lang="en-GB"/>
-          </a:p>
-        </p:txBody>
-      </p:sp>
-      <p:sp>
-        <p:nvSpPr>
-          <p:cNvPr id="9" name="Slide Number Placeholder 8"/>
-          <p:cNvSpPr>
-            <a:spLocks noGrp="1"/>
-          </p:cNvSpPr>
-          <p:nvPr>
-            <p:ph type="sldNum" sz="quarter" idx="12"/>
-          </p:nvPr>
-        </p:nvSpPr>
-        <p:spPr/>
-        <p:txBody>
-          <a:bodyPr/>
-          <a:lstStyle/>
-          <a:p>
-            <a:fld id="{8DADB20D-508E-4C6D-A9E4-257D5607B0F6}" type="slidenum">
-              <a:rPr lang="en-GB" smtClean="0"/>
               <a:t>‹#›</a:t>
             </a:fld>
-            <a:endParaRPr lang="en-GB"/>
+            <a:endParaRPr lang="en-US"/>
           </a:p>
         </p:txBody>
       </p:sp>
     </p:spTree>
     <p:extLst>
       <p:ext uri="{BB962C8B-B14F-4D97-AF65-F5344CB8AC3E}">
-        <p14:creationId xmlns:p14="http://schemas.microsoft.com/office/powerpoint/2010/main" val="2120349123"/>
+        <p14:creationId xmlns:p14="http://schemas.microsoft.com/office/powerpoint/2010/main" val="493886496"/>
       </p:ext>
     </p:extLst>
   </p:cSld>
@@ -1516,33 +1705,33 @@
           <a:lstStyle/>
           <a:p>
             <a:r>
+              <a:rPr lang="en-US"/>
+              <a:t>Click to edit Master title style</a:t>
+            </a:r>
+            <a:endParaRPr lang="en-US" dirty="0"/>
+          </a:p>
+        </p:txBody>
+      </p:sp>
+      <p:sp>
+        <p:nvSpPr>
+          <p:cNvPr id="3" name="Date Placeholder 2"/>
+          <p:cNvSpPr>
+            <a:spLocks noGrp="1"/>
+          </p:cNvSpPr>
+          <p:nvPr>
+            <p:ph type="dt" sz="half" idx="10"/>
+          </p:nvPr>
+        </p:nvSpPr>
+        <p:spPr/>
+        <p:txBody>
+          <a:bodyPr/>
+          <a:lstStyle/>
+          <a:p>
+            <a:fld id="{628FD48A-0636-1247-B254-6B36D700B17E}" type="datetimeFigureOut">
               <a:rPr lang="en-US" smtClean="0"/>
-              <a:t>Click to edit Master title style</a:t>
-            </a:r>
-            <a:endParaRPr lang="en-GB"/>
-          </a:p>
-        </p:txBody>
-      </p:sp>
-      <p:sp>
-        <p:nvSpPr>
-          <p:cNvPr id="3" name="Date Placeholder 2"/>
-          <p:cNvSpPr>
-            <a:spLocks noGrp="1"/>
-          </p:cNvSpPr>
-          <p:nvPr>
-            <p:ph type="dt" sz="half" idx="10"/>
-          </p:nvPr>
-        </p:nvSpPr>
-        <p:spPr/>
-        <p:txBody>
-          <a:bodyPr/>
-          <a:lstStyle/>
-          <a:p>
-            <a:fld id="{E6744CE3-0875-4B69-89C0-6F72D8139561}" type="datetimeFigureOut">
-              <a:rPr lang="en-GB" smtClean="0"/>
-              <a:t>26/05/17</a:t>
+              <a:t>2/25/21</a:t>
             </a:fld>
-            <a:endParaRPr lang="en-GB"/>
+            <a:endParaRPr lang="en-US"/>
           </a:p>
         </p:txBody>
       </p:sp>
@@ -1561,7 +1750,7 @@
           <a:bodyPr/>
           <a:lstStyle/>
           <a:p>
-            <a:endParaRPr lang="en-GB"/>
+            <a:endParaRPr lang="en-US"/>
           </a:p>
         </p:txBody>
       </p:sp>
@@ -1580,18 +1769,18 @@
           <a:bodyPr/>
           <a:lstStyle/>
           <a:p>
-            <a:fld id="{8DADB20D-508E-4C6D-A9E4-257D5607B0F6}" type="slidenum">
-              <a:rPr lang="en-GB" smtClean="0"/>
+            <a:fld id="{C2C793BC-253B-5E4F-A3C5-757C57983B90}" type="slidenum">
+              <a:rPr lang="en-US" smtClean="0"/>
               <a:t>‹#›</a:t>
             </a:fld>
-            <a:endParaRPr lang="en-GB"/>
+            <a:endParaRPr lang="en-US"/>
           </a:p>
         </p:txBody>
       </p:sp>
     </p:spTree>
     <p:extLst>
       <p:ext uri="{BB962C8B-B14F-4D97-AF65-F5344CB8AC3E}">
-        <p14:creationId xmlns:p14="http://schemas.microsoft.com/office/powerpoint/2010/main" val="1385807973"/>
+        <p14:creationId xmlns:p14="http://schemas.microsoft.com/office/powerpoint/2010/main" val="2945183823"/>
       </p:ext>
     </p:extLst>
   </p:cSld>
@@ -1633,11 +1822,11 @@
           <a:bodyPr/>
           <a:lstStyle/>
           <a:p>
-            <a:fld id="{E6744CE3-0875-4B69-89C0-6F72D8139561}" type="datetimeFigureOut">
-              <a:rPr lang="en-GB" smtClean="0"/>
-              <a:t>26/05/17</a:t>
+            <a:fld id="{628FD48A-0636-1247-B254-6B36D700B17E}" type="datetimeFigureOut">
+              <a:rPr lang="en-US" smtClean="0"/>
+              <a:t>2/25/21</a:t>
             </a:fld>
-            <a:endParaRPr lang="en-GB"/>
+            <a:endParaRPr lang="en-US"/>
           </a:p>
         </p:txBody>
       </p:sp>
@@ -1656,7 +1845,7 @@
           <a:bodyPr/>
           <a:lstStyle/>
           <a:p>
-            <a:endParaRPr lang="en-GB"/>
+            <a:endParaRPr lang="en-US"/>
           </a:p>
         </p:txBody>
       </p:sp>
@@ -1675,18 +1864,552 @@
           <a:bodyPr/>
           <a:lstStyle/>
           <a:p>
-            <a:fld id="{8DADB20D-508E-4C6D-A9E4-257D5607B0F6}" type="slidenum">
-              <a:rPr lang="en-GB" smtClean="0"/>
+            <a:fld id="{C2C793BC-253B-5E4F-A3C5-757C57983B90}" type="slidenum">
+              <a:rPr lang="en-US" smtClean="0"/>
               <a:t>‹#›</a:t>
             </a:fld>
-            <a:endParaRPr lang="en-GB"/>
+            <a:endParaRPr lang="en-US"/>
           </a:p>
         </p:txBody>
       </p:sp>
     </p:spTree>
     <p:extLst>
       <p:ext uri="{BB962C8B-B14F-4D97-AF65-F5344CB8AC3E}">
-        <p14:creationId xmlns:p14="http://schemas.microsoft.com/office/powerpoint/2010/main" val="2755996059"/>
+        <p14:creationId xmlns:p14="http://schemas.microsoft.com/office/powerpoint/2010/main" val="3444497900"/>
+      </p:ext>
+    </p:extLst>
+  </p:cSld>
+  <p:clrMapOvr>
+    <a:masterClrMapping/>
+  </p:clrMapOvr>
+</p:sldLayout>
+</file>
+
+<file path=ppt/slideLayouts/slideLayout8.xml><?xml version="1.0" encoding="utf-8"?>
+<p:sldLayout xmlns:a="http://schemas.openxmlformats.org/drawingml/2006/main" xmlns:r="http://schemas.openxmlformats.org/officeDocument/2006/relationships" xmlns:p="http://schemas.openxmlformats.org/presentationml/2006/main" type="objTx" preserve="1">
+  <p:cSld name="Content with Caption">
+    <p:spTree>
+      <p:nvGrpSpPr>
+        <p:cNvPr id="1" name=""/>
+        <p:cNvGrpSpPr/>
+        <p:nvPr/>
+      </p:nvGrpSpPr>
+      <p:grpSpPr>
+        <a:xfrm>
+          <a:off x="0" y="0"/>
+          <a:ext cx="0" cy="0"/>
+          <a:chOff x="0" y="0"/>
+          <a:chExt cx="0" cy="0"/>
+        </a:xfrm>
+      </p:grpSpPr>
+      <p:sp>
+        <p:nvSpPr>
+          <p:cNvPr id="2" name="Title 1"/>
+          <p:cNvSpPr>
+            <a:spLocks noGrp="1"/>
+          </p:cNvSpPr>
+          <p:nvPr>
+            <p:ph type="title"/>
+          </p:nvPr>
+        </p:nvSpPr>
+        <p:spPr>
+          <a:xfrm>
+            <a:off x="629841" y="457200"/>
+            <a:ext cx="2949178" cy="1600200"/>
+          </a:xfrm>
+        </p:spPr>
+        <p:txBody>
+          <a:bodyPr anchor="b"/>
+          <a:lstStyle>
+            <a:lvl1pPr>
+              <a:defRPr sz="3200"/>
+            </a:lvl1pPr>
+          </a:lstStyle>
+          <a:p>
+            <a:r>
+              <a:rPr lang="en-US"/>
+              <a:t>Click to edit Master title style</a:t>
+            </a:r>
+            <a:endParaRPr lang="en-US" dirty="0"/>
+          </a:p>
+        </p:txBody>
+      </p:sp>
+      <p:sp>
+        <p:nvSpPr>
+          <p:cNvPr id="3" name="Content Placeholder 2"/>
+          <p:cNvSpPr>
+            <a:spLocks noGrp="1"/>
+          </p:cNvSpPr>
+          <p:nvPr>
+            <p:ph idx="1"/>
+          </p:nvPr>
+        </p:nvSpPr>
+        <p:spPr>
+          <a:xfrm>
+            <a:off x="3887391" y="987426"/>
+            <a:ext cx="4629150" cy="4873625"/>
+          </a:xfrm>
+        </p:spPr>
+        <p:txBody>
+          <a:bodyPr/>
+          <a:lstStyle>
+            <a:lvl1pPr>
+              <a:defRPr sz="3200"/>
+            </a:lvl1pPr>
+            <a:lvl2pPr>
+              <a:defRPr sz="2800"/>
+            </a:lvl2pPr>
+            <a:lvl3pPr>
+              <a:defRPr sz="2400"/>
+            </a:lvl3pPr>
+            <a:lvl4pPr>
+              <a:defRPr sz="2000"/>
+            </a:lvl4pPr>
+            <a:lvl5pPr>
+              <a:defRPr sz="2000"/>
+            </a:lvl5pPr>
+            <a:lvl6pPr>
+              <a:defRPr sz="2000"/>
+            </a:lvl6pPr>
+            <a:lvl7pPr>
+              <a:defRPr sz="2000"/>
+            </a:lvl7pPr>
+            <a:lvl8pPr>
+              <a:defRPr sz="2000"/>
+            </a:lvl8pPr>
+            <a:lvl9pPr>
+              <a:defRPr sz="2000"/>
+            </a:lvl9pPr>
+          </a:lstStyle>
+          <a:p>
+            <a:pPr lvl="0"/>
+            <a:r>
+              <a:rPr lang="en-US"/>
+              <a:t>Click to edit Master text styles</a:t>
+            </a:r>
+          </a:p>
+          <a:p>
+            <a:pPr lvl="1"/>
+            <a:r>
+              <a:rPr lang="en-US"/>
+              <a:t>Second level</a:t>
+            </a:r>
+          </a:p>
+          <a:p>
+            <a:pPr lvl="2"/>
+            <a:r>
+              <a:rPr lang="en-US"/>
+              <a:t>Third level</a:t>
+            </a:r>
+          </a:p>
+          <a:p>
+            <a:pPr lvl="3"/>
+            <a:r>
+              <a:rPr lang="en-US"/>
+              <a:t>Fourth level</a:t>
+            </a:r>
+          </a:p>
+          <a:p>
+            <a:pPr lvl="4"/>
+            <a:r>
+              <a:rPr lang="en-US"/>
+              <a:t>Fifth level</a:t>
+            </a:r>
+            <a:endParaRPr lang="en-US" dirty="0"/>
+          </a:p>
+        </p:txBody>
+      </p:sp>
+      <p:sp>
+        <p:nvSpPr>
+          <p:cNvPr id="4" name="Text Placeholder 3"/>
+          <p:cNvSpPr>
+            <a:spLocks noGrp="1"/>
+          </p:cNvSpPr>
+          <p:nvPr>
+            <p:ph type="body" sz="half" idx="2"/>
+          </p:nvPr>
+        </p:nvSpPr>
+        <p:spPr>
+          <a:xfrm>
+            <a:off x="629841" y="2057400"/>
+            <a:ext cx="2949178" cy="3811588"/>
+          </a:xfrm>
+        </p:spPr>
+        <p:txBody>
+          <a:bodyPr/>
+          <a:lstStyle>
+            <a:lvl1pPr marL="0" indent="0">
+              <a:buNone/>
+              <a:defRPr sz="1600"/>
+            </a:lvl1pPr>
+            <a:lvl2pPr marL="457200" indent="0">
+              <a:buNone/>
+              <a:defRPr sz="1400"/>
+            </a:lvl2pPr>
+            <a:lvl3pPr marL="914400" indent="0">
+              <a:buNone/>
+              <a:defRPr sz="1200"/>
+            </a:lvl3pPr>
+            <a:lvl4pPr marL="1371600" indent="0">
+              <a:buNone/>
+              <a:defRPr sz="1000"/>
+            </a:lvl4pPr>
+            <a:lvl5pPr marL="1828800" indent="0">
+              <a:buNone/>
+              <a:defRPr sz="1000"/>
+            </a:lvl5pPr>
+            <a:lvl6pPr marL="2286000" indent="0">
+              <a:buNone/>
+              <a:defRPr sz="1000"/>
+            </a:lvl6pPr>
+            <a:lvl7pPr marL="2743200" indent="0">
+              <a:buNone/>
+              <a:defRPr sz="1000"/>
+            </a:lvl7pPr>
+            <a:lvl8pPr marL="3200400" indent="0">
+              <a:buNone/>
+              <a:defRPr sz="1000"/>
+            </a:lvl8pPr>
+            <a:lvl9pPr marL="3657600" indent="0">
+              <a:buNone/>
+              <a:defRPr sz="1000"/>
+            </a:lvl9pPr>
+          </a:lstStyle>
+          <a:p>
+            <a:pPr lvl="0"/>
+            <a:r>
+              <a:rPr lang="en-US"/>
+              <a:t>Click to edit Master text styles</a:t>
+            </a:r>
+          </a:p>
+        </p:txBody>
+      </p:sp>
+      <p:sp>
+        <p:nvSpPr>
+          <p:cNvPr id="5" name="Date Placeholder 4"/>
+          <p:cNvSpPr>
+            <a:spLocks noGrp="1"/>
+          </p:cNvSpPr>
+          <p:nvPr>
+            <p:ph type="dt" sz="half" idx="10"/>
+          </p:nvPr>
+        </p:nvSpPr>
+        <p:spPr/>
+        <p:txBody>
+          <a:bodyPr/>
+          <a:lstStyle/>
+          <a:p>
+            <a:fld id="{628FD48A-0636-1247-B254-6B36D700B17E}" type="datetimeFigureOut">
+              <a:rPr lang="en-US" smtClean="0"/>
+              <a:t>2/25/21</a:t>
+            </a:fld>
+            <a:endParaRPr lang="en-US"/>
+          </a:p>
+        </p:txBody>
+      </p:sp>
+      <p:sp>
+        <p:nvSpPr>
+          <p:cNvPr id="6" name="Footer Placeholder 5"/>
+          <p:cNvSpPr>
+            <a:spLocks noGrp="1"/>
+          </p:cNvSpPr>
+          <p:nvPr>
+            <p:ph type="ftr" sz="quarter" idx="11"/>
+          </p:nvPr>
+        </p:nvSpPr>
+        <p:spPr/>
+        <p:txBody>
+          <a:bodyPr/>
+          <a:lstStyle/>
+          <a:p>
+            <a:endParaRPr lang="en-US"/>
+          </a:p>
+        </p:txBody>
+      </p:sp>
+      <p:sp>
+        <p:nvSpPr>
+          <p:cNvPr id="7" name="Slide Number Placeholder 6"/>
+          <p:cNvSpPr>
+            <a:spLocks noGrp="1"/>
+          </p:cNvSpPr>
+          <p:nvPr>
+            <p:ph type="sldNum" sz="quarter" idx="12"/>
+          </p:nvPr>
+        </p:nvSpPr>
+        <p:spPr/>
+        <p:txBody>
+          <a:bodyPr/>
+          <a:lstStyle/>
+          <a:p>
+            <a:fld id="{C2C793BC-253B-5E4F-A3C5-757C57983B90}" type="slidenum">
+              <a:rPr lang="en-US" smtClean="0"/>
+              <a:t>‹#›</a:t>
+            </a:fld>
+            <a:endParaRPr lang="en-US"/>
+          </a:p>
+        </p:txBody>
+      </p:sp>
+    </p:spTree>
+    <p:extLst>
+      <p:ext uri="{BB962C8B-B14F-4D97-AF65-F5344CB8AC3E}">
+        <p14:creationId xmlns:p14="http://schemas.microsoft.com/office/powerpoint/2010/main" val="2256684677"/>
+      </p:ext>
+    </p:extLst>
+  </p:cSld>
+  <p:clrMapOvr>
+    <a:masterClrMapping/>
+  </p:clrMapOvr>
+</p:sldLayout>
+</file>
+
+<file path=ppt/slideLayouts/slideLayout9.xml><?xml version="1.0" encoding="utf-8"?>
+<p:sldLayout xmlns:a="http://schemas.openxmlformats.org/drawingml/2006/main" xmlns:r="http://schemas.openxmlformats.org/officeDocument/2006/relationships" xmlns:p="http://schemas.openxmlformats.org/presentationml/2006/main" type="picTx" preserve="1">
+  <p:cSld name="Picture with Caption">
+    <p:spTree>
+      <p:nvGrpSpPr>
+        <p:cNvPr id="1" name=""/>
+        <p:cNvGrpSpPr/>
+        <p:nvPr/>
+      </p:nvGrpSpPr>
+      <p:grpSpPr>
+        <a:xfrm>
+          <a:off x="0" y="0"/>
+          <a:ext cx="0" cy="0"/>
+          <a:chOff x="0" y="0"/>
+          <a:chExt cx="0" cy="0"/>
+        </a:xfrm>
+      </p:grpSpPr>
+      <p:sp>
+        <p:nvSpPr>
+          <p:cNvPr id="2" name="Title 1"/>
+          <p:cNvSpPr>
+            <a:spLocks noGrp="1"/>
+          </p:cNvSpPr>
+          <p:nvPr>
+            <p:ph type="title"/>
+          </p:nvPr>
+        </p:nvSpPr>
+        <p:spPr>
+          <a:xfrm>
+            <a:off x="629841" y="457200"/>
+            <a:ext cx="2949178" cy="1600200"/>
+          </a:xfrm>
+        </p:spPr>
+        <p:txBody>
+          <a:bodyPr anchor="b"/>
+          <a:lstStyle>
+            <a:lvl1pPr>
+              <a:defRPr sz="3200"/>
+            </a:lvl1pPr>
+          </a:lstStyle>
+          <a:p>
+            <a:r>
+              <a:rPr lang="en-US"/>
+              <a:t>Click to edit Master title style</a:t>
+            </a:r>
+            <a:endParaRPr lang="en-US" dirty="0"/>
+          </a:p>
+        </p:txBody>
+      </p:sp>
+      <p:sp>
+        <p:nvSpPr>
+          <p:cNvPr id="3" name="Picture Placeholder 2"/>
+          <p:cNvSpPr>
+            <a:spLocks noGrp="1" noChangeAspect="1"/>
+          </p:cNvSpPr>
+          <p:nvPr>
+            <p:ph type="pic" idx="1"/>
+          </p:nvPr>
+        </p:nvSpPr>
+        <p:spPr>
+          <a:xfrm>
+            <a:off x="3887391" y="987426"/>
+            <a:ext cx="4629150" cy="4873625"/>
+          </a:xfrm>
+        </p:spPr>
+        <p:txBody>
+          <a:bodyPr anchor="t"/>
+          <a:lstStyle>
+            <a:lvl1pPr marL="0" indent="0">
+              <a:buNone/>
+              <a:defRPr sz="3200"/>
+            </a:lvl1pPr>
+            <a:lvl2pPr marL="457200" indent="0">
+              <a:buNone/>
+              <a:defRPr sz="2800"/>
+            </a:lvl2pPr>
+            <a:lvl3pPr marL="914400" indent="0">
+              <a:buNone/>
+              <a:defRPr sz="2400"/>
+            </a:lvl3pPr>
+            <a:lvl4pPr marL="1371600" indent="0">
+              <a:buNone/>
+              <a:defRPr sz="2000"/>
+            </a:lvl4pPr>
+            <a:lvl5pPr marL="1828800" indent="0">
+              <a:buNone/>
+              <a:defRPr sz="2000"/>
+            </a:lvl5pPr>
+            <a:lvl6pPr marL="2286000" indent="0">
+              <a:buNone/>
+              <a:defRPr sz="2000"/>
+            </a:lvl6pPr>
+            <a:lvl7pPr marL="2743200" indent="0">
+              <a:buNone/>
+              <a:defRPr sz="2000"/>
+            </a:lvl7pPr>
+            <a:lvl8pPr marL="3200400" indent="0">
+              <a:buNone/>
+              <a:defRPr sz="2000"/>
+            </a:lvl8pPr>
+            <a:lvl9pPr marL="3657600" indent="0">
+              <a:buNone/>
+              <a:defRPr sz="2000"/>
+            </a:lvl9pPr>
+          </a:lstStyle>
+          <a:p>
+            <a:r>
+              <a:rPr lang="en-US"/>
+              <a:t>Click icon to add picture</a:t>
+            </a:r>
+            <a:endParaRPr lang="en-US" dirty="0"/>
+          </a:p>
+        </p:txBody>
+      </p:sp>
+      <p:sp>
+        <p:nvSpPr>
+          <p:cNvPr id="4" name="Text Placeholder 3"/>
+          <p:cNvSpPr>
+            <a:spLocks noGrp="1"/>
+          </p:cNvSpPr>
+          <p:nvPr>
+            <p:ph type="body" sz="half" idx="2"/>
+          </p:nvPr>
+        </p:nvSpPr>
+        <p:spPr>
+          <a:xfrm>
+            <a:off x="629841" y="2057400"/>
+            <a:ext cx="2949178" cy="3811588"/>
+          </a:xfrm>
+        </p:spPr>
+        <p:txBody>
+          <a:bodyPr/>
+          <a:lstStyle>
+            <a:lvl1pPr marL="0" indent="0">
+              <a:buNone/>
+              <a:defRPr sz="1600"/>
+            </a:lvl1pPr>
+            <a:lvl2pPr marL="457200" indent="0">
+              <a:buNone/>
+              <a:defRPr sz="1400"/>
+            </a:lvl2pPr>
+            <a:lvl3pPr marL="914400" indent="0">
+              <a:buNone/>
+              <a:defRPr sz="1200"/>
+            </a:lvl3pPr>
+            <a:lvl4pPr marL="1371600" indent="0">
+              <a:buNone/>
+              <a:defRPr sz="1000"/>
+            </a:lvl4pPr>
+            <a:lvl5pPr marL="1828800" indent="0">
+              <a:buNone/>
+              <a:defRPr sz="1000"/>
+            </a:lvl5pPr>
+            <a:lvl6pPr marL="2286000" indent="0">
+              <a:buNone/>
+              <a:defRPr sz="1000"/>
+            </a:lvl6pPr>
+            <a:lvl7pPr marL="2743200" indent="0">
+              <a:buNone/>
+              <a:defRPr sz="1000"/>
+            </a:lvl7pPr>
+            <a:lvl8pPr marL="3200400" indent="0">
+              <a:buNone/>
+              <a:defRPr sz="1000"/>
+            </a:lvl8pPr>
+            <a:lvl9pPr marL="3657600" indent="0">
+              <a:buNone/>
+              <a:defRPr sz="1000"/>
+            </a:lvl9pPr>
+          </a:lstStyle>
+          <a:p>
+            <a:pPr lvl="0"/>
+            <a:r>
+              <a:rPr lang="en-US"/>
+              <a:t>Click to edit Master text styles</a:t>
+            </a:r>
+          </a:p>
+        </p:txBody>
+      </p:sp>
+      <p:sp>
+        <p:nvSpPr>
+          <p:cNvPr id="5" name="Date Placeholder 4"/>
+          <p:cNvSpPr>
+            <a:spLocks noGrp="1"/>
+          </p:cNvSpPr>
+          <p:nvPr>
+            <p:ph type="dt" sz="half" idx="10"/>
+          </p:nvPr>
+        </p:nvSpPr>
+        <p:spPr/>
+        <p:txBody>
+          <a:bodyPr/>
+          <a:lstStyle/>
+          <a:p>
+            <a:fld id="{628FD48A-0636-1247-B254-6B36D700B17E}" type="datetimeFigureOut">
+              <a:rPr lang="en-US" smtClean="0"/>
+              <a:t>2/25/21</a:t>
+            </a:fld>
+            <a:endParaRPr lang="en-US"/>
+          </a:p>
+        </p:txBody>
+      </p:sp>
+      <p:sp>
+        <p:nvSpPr>
+          <p:cNvPr id="6" name="Footer Placeholder 5"/>
+          <p:cNvSpPr>
+            <a:spLocks noGrp="1"/>
+          </p:cNvSpPr>
+          <p:nvPr>
+            <p:ph type="ftr" sz="quarter" idx="11"/>
+          </p:nvPr>
+        </p:nvSpPr>
+        <p:spPr/>
+        <p:txBody>
+          <a:bodyPr/>
+          <a:lstStyle/>
+          <a:p>
+            <a:endParaRPr lang="en-US"/>
+          </a:p>
+        </p:txBody>
+      </p:sp>
+      <p:sp>
+        <p:nvSpPr>
+          <p:cNvPr id="7" name="Slide Number Placeholder 6"/>
+          <p:cNvSpPr>
+            <a:spLocks noGrp="1"/>
+          </p:cNvSpPr>
+          <p:nvPr>
+            <p:ph type="sldNum" sz="quarter" idx="12"/>
+          </p:nvPr>
+        </p:nvSpPr>
+        <p:spPr/>
+        <p:txBody>
+          <a:bodyPr/>
+          <a:lstStyle/>
+          <a:p>
+            <a:fld id="{C2C793BC-253B-5E4F-A3C5-757C57983B90}" type="slidenum">
+              <a:rPr lang="en-US" smtClean="0"/>
+              <a:t>‹#›</a:t>
+            </a:fld>
+            <a:endParaRPr lang="en-US"/>
+          </a:p>
+        </p:txBody>
+      </p:sp>
+    </p:spTree>
+    <p:extLst>
+      <p:ext uri="{BB962C8B-B14F-4D97-AF65-F5344CB8AC3E}">
+        <p14:creationId xmlns:p14="http://schemas.microsoft.com/office/powerpoint/2010/main" val="2467318434"/>
       </p:ext>
     </p:extLst>
   </p:cSld>
@@ -1730,8 +2453,8 @@
         </p:nvSpPr>
         <p:spPr>
           <a:xfrm>
-            <a:off x="457200" y="274638"/>
-            <a:ext cx="8229600" cy="1143000"/>
+            <a:off x="628650" y="365126"/>
+            <a:ext cx="7886700" cy="1325563"/>
           </a:xfrm>
           <a:prstGeom prst="rect">
             <a:avLst/>
@@ -1744,10 +2467,10 @@
           <a:lstStyle/>
           <a:p>
             <a:r>
-              <a:rPr lang="en-US" smtClean="0"/>
+              <a:rPr lang="en-US"/>
               <a:t>Click to edit Master title style</a:t>
             </a:r>
-            <a:endParaRPr lang="en-GB"/>
+            <a:endParaRPr lang="en-US" dirty="0"/>
           </a:p>
         </p:txBody>
       </p:sp>
@@ -1763,8 +2486,8 @@
         </p:nvSpPr>
         <p:spPr>
           <a:xfrm>
-            <a:off x="457200" y="1600200"/>
-            <a:ext cx="8229600" cy="4525963"/>
+            <a:off x="628650" y="1825625"/>
+            <a:ext cx="7886700" cy="4351338"/>
           </a:xfrm>
           <a:prstGeom prst="rect">
             <a:avLst/>
@@ -1778,38 +2501,38 @@
           <a:p>
             <a:pPr lvl="0"/>
             <a:r>
-              <a:rPr lang="en-US" smtClean="0"/>
+              <a:rPr lang="en-US"/>
               <a:t>Click to edit Master text styles</a:t>
             </a:r>
           </a:p>
           <a:p>
             <a:pPr lvl="1"/>
             <a:r>
-              <a:rPr lang="en-US" smtClean="0"/>
+              <a:rPr lang="en-US"/>
               <a:t>Second level</a:t>
             </a:r>
           </a:p>
           <a:p>
             <a:pPr lvl="2"/>
             <a:r>
-              <a:rPr lang="en-US" smtClean="0"/>
+              <a:rPr lang="en-US"/>
               <a:t>Third level</a:t>
             </a:r>
           </a:p>
           <a:p>
             <a:pPr lvl="3"/>
             <a:r>
-              <a:rPr lang="en-US" smtClean="0"/>
+              <a:rPr lang="en-US"/>
               <a:t>Fourth level</a:t>
             </a:r>
           </a:p>
           <a:p>
             <a:pPr lvl="4"/>
             <a:r>
-              <a:rPr lang="en-US" smtClean="0"/>
+              <a:rPr lang="en-US"/>
               <a:t>Fifth level</a:t>
             </a:r>
-            <a:endParaRPr lang="en-GB"/>
+            <a:endParaRPr lang="en-US" dirty="0"/>
           </a:p>
         </p:txBody>
       </p:sp>
@@ -1825,8 +2548,8 @@
         </p:nvSpPr>
         <p:spPr>
           <a:xfrm>
-            <a:off x="457200" y="6356350"/>
-            <a:ext cx="2133600" cy="365125"/>
+            <a:off x="628650" y="6356351"/>
+            <a:ext cx="2057400" cy="365125"/>
           </a:xfrm>
           <a:prstGeom prst="rect">
             <a:avLst/>
@@ -1846,11 +2569,11 @@
             </a:lvl1pPr>
           </a:lstStyle>
           <a:p>
-            <a:fld id="{E6744CE3-0875-4B69-89C0-6F72D8139561}" type="datetimeFigureOut">
-              <a:rPr lang="en-GB" smtClean="0"/>
-              <a:t>26/05/17</a:t>
+            <a:fld id="{628FD48A-0636-1247-B254-6B36D700B17E}" type="datetimeFigureOut">
+              <a:rPr lang="en-US" smtClean="0"/>
+              <a:t>2/25/21</a:t>
             </a:fld>
-            <a:endParaRPr lang="en-GB"/>
+            <a:endParaRPr lang="en-US"/>
           </a:p>
         </p:txBody>
       </p:sp>
@@ -1866,8 +2589,8 @@
         </p:nvSpPr>
         <p:spPr>
           <a:xfrm>
-            <a:off x="3124200" y="6356350"/>
-            <a:ext cx="2895600" cy="365125"/>
+            <a:off x="3028950" y="6356351"/>
+            <a:ext cx="3086100" cy="365125"/>
           </a:xfrm>
           <a:prstGeom prst="rect">
             <a:avLst/>
@@ -1887,7 +2610,7 @@
             </a:lvl1pPr>
           </a:lstStyle>
           <a:p>
-            <a:endParaRPr lang="en-GB"/>
+            <a:endParaRPr lang="en-US"/>
           </a:p>
         </p:txBody>
       </p:sp>
@@ -1903,8 +2626,8 @@
         </p:nvSpPr>
         <p:spPr>
           <a:xfrm>
-            <a:off x="6553200" y="6356350"/>
-            <a:ext cx="2133600" cy="365125"/>
+            <a:off x="6457950" y="6356351"/>
+            <a:ext cx="2057400" cy="365125"/>
           </a:xfrm>
           <a:prstGeom prst="rect">
             <a:avLst/>
@@ -1924,34 +2647,41 @@
             </a:lvl1pPr>
           </a:lstStyle>
           <a:p>
-            <a:fld id="{8DADB20D-508E-4C6D-A9E4-257D5607B0F6}" type="slidenum">
-              <a:rPr lang="en-GB" smtClean="0"/>
+            <a:fld id="{C2C793BC-253B-5E4F-A3C5-757C57983B90}" type="slidenum">
+              <a:rPr lang="en-US" smtClean="0"/>
               <a:t>‹#›</a:t>
             </a:fld>
-            <a:endParaRPr lang="en-GB"/>
+            <a:endParaRPr lang="en-US"/>
           </a:p>
         </p:txBody>
       </p:sp>
     </p:spTree>
     <p:extLst>
       <p:ext uri="{BB962C8B-B14F-4D97-AF65-F5344CB8AC3E}">
-        <p14:creationId xmlns:p14="http://schemas.microsoft.com/office/powerpoint/2010/main" val="307823620"/>
+        <p14:creationId xmlns:p14="http://schemas.microsoft.com/office/powerpoint/2010/main" val="3114271593"/>
       </p:ext>
     </p:extLst>
   </p:cSld>
   <p:clrMap bg1="lt1" tx1="dk1" bg2="lt2" tx2="dk2" accent1="accent1" accent2="accent2" accent3="accent3" accent4="accent4" accent5="accent5" accent6="accent6" hlink="hlink" folHlink="folHlink"/>
   <p:sldLayoutIdLst>
-    <p:sldLayoutId id="2147483649" r:id="rId1"/>
-    <p:sldLayoutId id="2147483650" r:id="rId2"/>
-    <p:sldLayoutId id="2147483651" r:id="rId3"/>
-    <p:sldLayoutId id="2147483652" r:id="rId4"/>
-    <p:sldLayoutId id="2147483653" r:id="rId5"/>
-    <p:sldLayoutId id="2147483654" r:id="rId6"/>
-    <p:sldLayoutId id="2147483655" r:id="rId7"/>
+    <p:sldLayoutId id="2147483673" r:id="rId1"/>
+    <p:sldLayoutId id="2147483674" r:id="rId2"/>
+    <p:sldLayoutId id="2147483675" r:id="rId3"/>
+    <p:sldLayoutId id="2147483676" r:id="rId4"/>
+    <p:sldLayoutId id="2147483677" r:id="rId5"/>
+    <p:sldLayoutId id="2147483678" r:id="rId6"/>
+    <p:sldLayoutId id="2147483679" r:id="rId7"/>
+    <p:sldLayoutId id="2147483680" r:id="rId8"/>
+    <p:sldLayoutId id="2147483681" r:id="rId9"/>
+    <p:sldLayoutId id="2147483682" r:id="rId10"/>
+    <p:sldLayoutId id="2147483683" r:id="rId11"/>
   </p:sldLayoutIdLst>
   <p:txStyles>
     <p:titleStyle>
-      <a:lvl1pPr algn="ctr" defTabSz="914400" rtl="0" eaLnBrk="1" latinLnBrk="0" hangingPunct="1">
+      <a:lvl1pPr algn="l" defTabSz="914400" rtl="0" eaLnBrk="1" latinLnBrk="0" hangingPunct="1">
+        <a:lnSpc>
+          <a:spcPct val="90000"/>
+        </a:lnSpc>
         <a:spcBef>
           <a:spcPct val="0"/>
         </a:spcBef>
@@ -1967,13 +2697,16 @@
       </a:lvl1pPr>
     </p:titleStyle>
     <p:bodyStyle>
-      <a:lvl1pPr marL="342900" indent="-342900" algn="l" defTabSz="914400" rtl="0" eaLnBrk="1" latinLnBrk="0" hangingPunct="1">
+      <a:lvl1pPr marL="228600" indent="-228600" algn="l" defTabSz="914400" rtl="0" eaLnBrk="1" latinLnBrk="0" hangingPunct="1">
+        <a:lnSpc>
+          <a:spcPct val="90000"/>
+        </a:lnSpc>
         <a:spcBef>
-          <a:spcPct val="20000"/>
+          <a:spcPts val="1000"/>
         </a:spcBef>
         <a:buFont typeface="Arial" panose="020B0604020202020204" pitchFamily="34" charset="0"/>
         <a:buChar char="•"/>
-        <a:defRPr sz="3200" kern="1200">
+        <a:defRPr sz="2800" kern="1200">
           <a:solidFill>
             <a:schemeClr val="tx1"/>
           </a:solidFill>
@@ -1982,24 +2715,12 @@
           <a:cs typeface="+mn-cs"/>
         </a:defRPr>
       </a:lvl1pPr>
-      <a:lvl2pPr marL="742950" indent="-285750" algn="l" defTabSz="914400" rtl="0" eaLnBrk="1" latinLnBrk="0" hangingPunct="1">
+      <a:lvl2pPr marL="685800" indent="-228600" algn="l" defTabSz="914400" rtl="0" eaLnBrk="1" latinLnBrk="0" hangingPunct="1">
+        <a:lnSpc>
+          <a:spcPct val="90000"/>
+        </a:lnSpc>
         <a:spcBef>
-          <a:spcPct val="20000"/>
-        </a:spcBef>
-        <a:buFont typeface="Arial" panose="020B0604020202020204" pitchFamily="34" charset="0"/>
-        <a:buChar char="–"/>
-        <a:defRPr sz="2800" kern="1200">
-          <a:solidFill>
-            <a:schemeClr val="tx1"/>
-          </a:solidFill>
-          <a:latin typeface="+mn-lt"/>
-          <a:ea typeface="+mn-ea"/>
-          <a:cs typeface="+mn-cs"/>
-        </a:defRPr>
-      </a:lvl2pPr>
-      <a:lvl3pPr marL="1143000" indent="-228600" algn="l" defTabSz="914400" rtl="0" eaLnBrk="1" latinLnBrk="0" hangingPunct="1">
-        <a:spcBef>
-          <a:spcPct val="20000"/>
+          <a:spcPts val="500"/>
         </a:spcBef>
         <a:buFont typeface="Arial" panose="020B0604020202020204" pitchFamily="34" charset="0"/>
         <a:buChar char="•"/>
@@ -2011,40 +2732,13 @@
           <a:ea typeface="+mn-ea"/>
           <a:cs typeface="+mn-cs"/>
         </a:defRPr>
-      </a:lvl3pPr>
-      <a:lvl4pPr marL="1600200" indent="-228600" algn="l" defTabSz="914400" rtl="0" eaLnBrk="1" latinLnBrk="0" hangingPunct="1">
+      </a:lvl2pPr>
+      <a:lvl3pPr marL="1143000" indent="-228600" algn="l" defTabSz="914400" rtl="0" eaLnBrk="1" latinLnBrk="0" hangingPunct="1">
+        <a:lnSpc>
+          <a:spcPct val="90000"/>
+        </a:lnSpc>
         <a:spcBef>
-          <a:spcPct val="20000"/>
-        </a:spcBef>
-        <a:buFont typeface="Arial" panose="020B0604020202020204" pitchFamily="34" charset="0"/>
-        <a:buChar char="–"/>
-        <a:defRPr sz="2000" kern="1200">
-          <a:solidFill>
-            <a:schemeClr val="tx1"/>
-          </a:solidFill>
-          <a:latin typeface="+mn-lt"/>
-          <a:ea typeface="+mn-ea"/>
-          <a:cs typeface="+mn-cs"/>
-        </a:defRPr>
-      </a:lvl4pPr>
-      <a:lvl5pPr marL="2057400" indent="-228600" algn="l" defTabSz="914400" rtl="0" eaLnBrk="1" latinLnBrk="0" hangingPunct="1">
-        <a:spcBef>
-          <a:spcPct val="20000"/>
-        </a:spcBef>
-        <a:buFont typeface="Arial" panose="020B0604020202020204" pitchFamily="34" charset="0"/>
-        <a:buChar char="»"/>
-        <a:defRPr sz="2000" kern="1200">
-          <a:solidFill>
-            <a:schemeClr val="tx1"/>
-          </a:solidFill>
-          <a:latin typeface="+mn-lt"/>
-          <a:ea typeface="+mn-ea"/>
-          <a:cs typeface="+mn-cs"/>
-        </a:defRPr>
-      </a:lvl5pPr>
-      <a:lvl6pPr marL="2514600" indent="-228600" algn="l" defTabSz="914400" rtl="0" eaLnBrk="1" latinLnBrk="0" hangingPunct="1">
-        <a:spcBef>
-          <a:spcPct val="20000"/>
+          <a:spcPts val="500"/>
         </a:spcBef>
         <a:buFont typeface="Arial" panose="020B0604020202020204" pitchFamily="34" charset="0"/>
         <a:buChar char="•"/>
@@ -2056,14 +2750,71 @@
           <a:ea typeface="+mn-ea"/>
           <a:cs typeface="+mn-cs"/>
         </a:defRPr>
-      </a:lvl6pPr>
-      <a:lvl7pPr marL="2971800" indent="-228600" algn="l" defTabSz="914400" rtl="0" eaLnBrk="1" latinLnBrk="0" hangingPunct="1">
+      </a:lvl3pPr>
+      <a:lvl4pPr marL="1600200" indent="-228600" algn="l" defTabSz="914400" rtl="0" eaLnBrk="1" latinLnBrk="0" hangingPunct="1">
+        <a:lnSpc>
+          <a:spcPct val="90000"/>
+        </a:lnSpc>
         <a:spcBef>
-          <a:spcPct val="20000"/>
+          <a:spcPts val="500"/>
         </a:spcBef>
         <a:buFont typeface="Arial" panose="020B0604020202020204" pitchFamily="34" charset="0"/>
         <a:buChar char="•"/>
-        <a:defRPr sz="2000" kern="1200">
+        <a:defRPr sz="1800" kern="1200">
+          <a:solidFill>
+            <a:schemeClr val="tx1"/>
+          </a:solidFill>
+          <a:latin typeface="+mn-lt"/>
+          <a:ea typeface="+mn-ea"/>
+          <a:cs typeface="+mn-cs"/>
+        </a:defRPr>
+      </a:lvl4pPr>
+      <a:lvl5pPr marL="2057400" indent="-228600" algn="l" defTabSz="914400" rtl="0" eaLnBrk="1" latinLnBrk="0" hangingPunct="1">
+        <a:lnSpc>
+          <a:spcPct val="90000"/>
+        </a:lnSpc>
+        <a:spcBef>
+          <a:spcPts val="500"/>
+        </a:spcBef>
+        <a:buFont typeface="Arial" panose="020B0604020202020204" pitchFamily="34" charset="0"/>
+        <a:buChar char="•"/>
+        <a:defRPr sz="1800" kern="1200">
+          <a:solidFill>
+            <a:schemeClr val="tx1"/>
+          </a:solidFill>
+          <a:latin typeface="+mn-lt"/>
+          <a:ea typeface="+mn-ea"/>
+          <a:cs typeface="+mn-cs"/>
+        </a:defRPr>
+      </a:lvl5pPr>
+      <a:lvl6pPr marL="2514600" indent="-228600" algn="l" defTabSz="914400" rtl="0" eaLnBrk="1" latinLnBrk="0" hangingPunct="1">
+        <a:lnSpc>
+          <a:spcPct val="90000"/>
+        </a:lnSpc>
+        <a:spcBef>
+          <a:spcPts val="500"/>
+        </a:spcBef>
+        <a:buFont typeface="Arial" panose="020B0604020202020204" pitchFamily="34" charset="0"/>
+        <a:buChar char="•"/>
+        <a:defRPr sz="1800" kern="1200">
+          <a:solidFill>
+            <a:schemeClr val="tx1"/>
+          </a:solidFill>
+          <a:latin typeface="+mn-lt"/>
+          <a:ea typeface="+mn-ea"/>
+          <a:cs typeface="+mn-cs"/>
+        </a:defRPr>
+      </a:lvl6pPr>
+      <a:lvl7pPr marL="2971800" indent="-228600" algn="l" defTabSz="914400" rtl="0" eaLnBrk="1" latinLnBrk="0" hangingPunct="1">
+        <a:lnSpc>
+          <a:spcPct val="90000"/>
+        </a:lnSpc>
+        <a:spcBef>
+          <a:spcPts val="500"/>
+        </a:spcBef>
+        <a:buFont typeface="Arial" panose="020B0604020202020204" pitchFamily="34" charset="0"/>
+        <a:buChar char="•"/>
+        <a:defRPr sz="1800" kern="1200">
           <a:solidFill>
             <a:schemeClr val="tx1"/>
           </a:solidFill>
@@ -2073,12 +2824,15 @@
         </a:defRPr>
       </a:lvl7pPr>
       <a:lvl8pPr marL="3429000" indent="-228600" algn="l" defTabSz="914400" rtl="0" eaLnBrk="1" latinLnBrk="0" hangingPunct="1">
+        <a:lnSpc>
+          <a:spcPct val="90000"/>
+        </a:lnSpc>
         <a:spcBef>
-          <a:spcPct val="20000"/>
+          <a:spcPts val="500"/>
         </a:spcBef>
         <a:buFont typeface="Arial" panose="020B0604020202020204" pitchFamily="34" charset="0"/>
         <a:buChar char="•"/>
-        <a:defRPr sz="2000" kern="1200">
+        <a:defRPr sz="1800" kern="1200">
           <a:solidFill>
             <a:schemeClr val="tx1"/>
           </a:solidFill>
@@ -2088,12 +2842,15 @@
         </a:defRPr>
       </a:lvl8pPr>
       <a:lvl9pPr marL="3886200" indent="-228600" algn="l" defTabSz="914400" rtl="0" eaLnBrk="1" latinLnBrk="0" hangingPunct="1">
+        <a:lnSpc>
+          <a:spcPct val="90000"/>
+        </a:lnSpc>
         <a:spcBef>
-          <a:spcPct val="20000"/>
+          <a:spcPts val="500"/>
         </a:spcBef>
         <a:buFont typeface="Arial" panose="020B0604020202020204" pitchFamily="34" charset="0"/>
         <a:buChar char="•"/>
-        <a:defRPr sz="2000" kern="1200">
+        <a:defRPr sz="1800" kern="1200">
           <a:solidFill>
             <a:schemeClr val="tx1"/>
           </a:solidFill>
@@ -2508,16 +3265,10 @@
 </p:sld>
 </file>
 
-<file path=ppt/tags/tag1.xml><?xml version="1.0" encoding="utf-8"?>
-<p:tagLst xmlns:a="http://schemas.openxmlformats.org/drawingml/2006/main" xmlns:r="http://schemas.openxmlformats.org/officeDocument/2006/relationships" xmlns:p="http://schemas.openxmlformats.org/presentationml/2006/main">
-  <p:tag name="_AMO_UNIQUEIDENTIFIER" val="Empty"/>
-</p:tagLst>
-</file>
-
 <file path=ppt/theme/theme1.xml><?xml version="1.0" encoding="utf-8"?>
 <a:theme xmlns:a="http://schemas.openxmlformats.org/drawingml/2006/main" name="Office Theme">
   <a:themeElements>
-    <a:clrScheme name="Office">
+    <a:clrScheme name="Office Theme">
       <a:dk1>
         <a:sysClr val="windowText" lastClr="000000"/>
       </a:dk1>
@@ -2525,44 +3276,44 @@
         <a:sysClr val="window" lastClr="FFFFFF"/>
       </a:lt1>
       <a:dk2>
-        <a:srgbClr val="1F497D"/>
+        <a:srgbClr val="44546A"/>
       </a:dk2>
       <a:lt2>
-        <a:srgbClr val="EEECE1"/>
+        <a:srgbClr val="E7E6E6"/>
       </a:lt2>
       <a:accent1>
-        <a:srgbClr val="4F81BD"/>
+        <a:srgbClr val="4472C4"/>
       </a:accent1>
       <a:accent2>
-        <a:srgbClr val="C0504D"/>
+        <a:srgbClr val="ED7D31"/>
       </a:accent2>
       <a:accent3>
-        <a:srgbClr val="9BBB59"/>
+        <a:srgbClr val="A5A5A5"/>
       </a:accent3>
       <a:accent4>
-        <a:srgbClr val="8064A2"/>
+        <a:srgbClr val="FFC000"/>
       </a:accent4>
       <a:accent5>
-        <a:srgbClr val="4BACC6"/>
+        <a:srgbClr val="5B9BD5"/>
       </a:accent5>
       <a:accent6>
-        <a:srgbClr val="F79646"/>
+        <a:srgbClr val="70AD47"/>
       </a:accent6>
       <a:hlink>
-        <a:srgbClr val="0000FF"/>
+        <a:srgbClr val="0563C1"/>
       </a:hlink>
       <a:folHlink>
-        <a:srgbClr val="800080"/>
+        <a:srgbClr val="954F72"/>
       </a:folHlink>
     </a:clrScheme>
-    <a:fontScheme name="Office">
+    <a:fontScheme name="Office Theme">
       <a:majorFont>
-        <a:latin typeface="Calibri"/>
+        <a:latin typeface="Calibri Light" panose="020F0302020204030204"/>
         <a:ea typeface=""/>
         <a:cs typeface=""/>
-        <a:font script="Jpan" typeface="ＭＳ Ｐゴシック"/>
+        <a:font script="Jpan" typeface="游ゴシック Light"/>
         <a:font script="Hang" typeface="맑은 고딕"/>
-        <a:font script="Hans" typeface="宋体"/>
+        <a:font script="Hans" typeface="等线 Light"/>
         <a:font script="Hant" typeface="新細明體"/>
         <a:font script="Arab" typeface="Times New Roman"/>
         <a:font script="Hebr" typeface="Times New Roman"/>
@@ -2592,12 +3343,12 @@
         <a:font script="Geor" typeface="Sylfaen"/>
       </a:majorFont>
       <a:minorFont>
-        <a:latin typeface="Calibri"/>
+        <a:latin typeface="Calibri" panose="020F0502020204030204"/>
         <a:ea typeface=""/>
         <a:cs typeface=""/>
-        <a:font script="Jpan" typeface="ＭＳ Ｐゴシック"/>
+        <a:font script="Jpan" typeface="游ゴシック"/>
         <a:font script="Hang" typeface="맑은 고딕"/>
-        <a:font script="Hans" typeface="宋体"/>
+        <a:font script="Hans" typeface="等线"/>
         <a:font script="Hant" typeface="新細明體"/>
         <a:font script="Arab" typeface="Arial"/>
         <a:font script="Hebr" typeface="Arial"/>
@@ -2627,7 +3378,7 @@
         <a:font script="Geor" typeface="Sylfaen"/>
       </a:minorFont>
     </a:fontScheme>
-    <a:fmtScheme name="Office">
+    <a:fmtScheme name="Office Theme">
       <a:fillStyleLst>
         <a:solidFill>
           <a:schemeClr val="phClr"/>
@@ -2636,165 +3387,141 @@
           <a:gsLst>
             <a:gs pos="0">
               <a:schemeClr val="phClr">
-                <a:tint val="50000"/>
-                <a:satMod val="300000"/>
+                <a:lumMod val="110000"/>
+                <a:satMod val="105000"/>
+                <a:tint val="67000"/>
               </a:schemeClr>
             </a:gs>
-            <a:gs pos="35000">
+            <a:gs pos="50000">
               <a:schemeClr val="phClr">
-                <a:tint val="37000"/>
-                <a:satMod val="300000"/>
+                <a:lumMod val="105000"/>
+                <a:satMod val="103000"/>
+                <a:tint val="73000"/>
               </a:schemeClr>
             </a:gs>
             <a:gs pos="100000">
               <a:schemeClr val="phClr">
-                <a:tint val="15000"/>
-                <a:satMod val="350000"/>
+                <a:lumMod val="105000"/>
+                <a:satMod val="109000"/>
+                <a:tint val="81000"/>
               </a:schemeClr>
             </a:gs>
           </a:gsLst>
-          <a:lin ang="16200000" scaled="1"/>
+          <a:lin ang="5400000" scaled="0"/>
         </a:gradFill>
         <a:gradFill rotWithShape="1">
           <a:gsLst>
             <a:gs pos="0">
               <a:schemeClr val="phClr">
-                <a:shade val="51000"/>
-                <a:satMod val="130000"/>
+                <a:satMod val="103000"/>
+                <a:lumMod val="102000"/>
+                <a:tint val="94000"/>
               </a:schemeClr>
             </a:gs>
-            <a:gs pos="80000">
+            <a:gs pos="50000">
               <a:schemeClr val="phClr">
-                <a:shade val="93000"/>
-                <a:satMod val="130000"/>
+                <a:satMod val="110000"/>
+                <a:lumMod val="100000"/>
+                <a:shade val="100000"/>
               </a:schemeClr>
             </a:gs>
             <a:gs pos="100000">
               <a:schemeClr val="phClr">
-                <a:shade val="94000"/>
-                <a:satMod val="135000"/>
+                <a:lumMod val="99000"/>
+                <a:satMod val="120000"/>
+                <a:shade val="78000"/>
               </a:schemeClr>
             </a:gs>
           </a:gsLst>
-          <a:lin ang="16200000" scaled="0"/>
+          <a:lin ang="5400000" scaled="0"/>
         </a:gradFill>
       </a:fillStyleLst>
       <a:lnStyleLst>
-        <a:ln w="9525" cap="flat" cmpd="sng" algn="ctr">
-          <a:solidFill>
-            <a:schemeClr val="phClr">
-              <a:shade val="95000"/>
-              <a:satMod val="105000"/>
-            </a:schemeClr>
-          </a:solidFill>
-          <a:prstDash val="solid"/>
-        </a:ln>
-        <a:ln w="25400" cap="flat" cmpd="sng" algn="ctr">
+        <a:ln w="6350" cap="flat" cmpd="sng" algn="ctr">
           <a:solidFill>
             <a:schemeClr val="phClr"/>
           </a:solidFill>
           <a:prstDash val="solid"/>
+          <a:miter lim="800000"/>
         </a:ln>
-        <a:ln w="38100" cap="flat" cmpd="sng" algn="ctr">
+        <a:ln w="12700" cap="flat" cmpd="sng" algn="ctr">
           <a:solidFill>
             <a:schemeClr val="phClr"/>
           </a:solidFill>
           <a:prstDash val="solid"/>
+          <a:miter lim="800000"/>
+        </a:ln>
+        <a:ln w="19050" cap="flat" cmpd="sng" algn="ctr">
+          <a:solidFill>
+            <a:schemeClr val="phClr"/>
+          </a:solidFill>
+          <a:prstDash val="solid"/>
+          <a:miter lim="800000"/>
         </a:ln>
       </a:lnStyleLst>
       <a:effectStyleLst>
         <a:effectStyle>
+          <a:effectLst/>
+        </a:effectStyle>
+        <a:effectStyle>
+          <a:effectLst/>
+        </a:effectStyle>
+        <a:effectStyle>
           <a:effectLst>
-            <a:outerShdw blurRad="40000" dist="20000" dir="5400000" rotWithShape="0">
+            <a:outerShdw blurRad="57150" dist="19050" dir="5400000" algn="ctr" rotWithShape="0">
               <a:srgbClr val="000000">
-                <a:alpha val="38000"/>
+                <a:alpha val="63000"/>
               </a:srgbClr>
             </a:outerShdw>
           </a:effectLst>
-        </a:effectStyle>
-        <a:effectStyle>
-          <a:effectLst>
-            <a:outerShdw blurRad="40000" dist="23000" dir="5400000" rotWithShape="0">
-              <a:srgbClr val="000000">
-                <a:alpha val="35000"/>
-              </a:srgbClr>
-            </a:outerShdw>
-          </a:effectLst>
-        </a:effectStyle>
-        <a:effectStyle>
-          <a:effectLst>
-            <a:outerShdw blurRad="40000" dist="23000" dir="5400000" rotWithShape="0">
-              <a:srgbClr val="000000">
-                <a:alpha val="35000"/>
-              </a:srgbClr>
-            </a:outerShdw>
-          </a:effectLst>
-          <a:scene3d>
-            <a:camera prst="orthographicFront">
-              <a:rot lat="0" lon="0" rev="0"/>
-            </a:camera>
-            <a:lightRig rig="threePt" dir="t">
-              <a:rot lat="0" lon="0" rev="1200000"/>
-            </a:lightRig>
-          </a:scene3d>
-          <a:sp3d>
-            <a:bevelT w="63500" h="25400"/>
-          </a:sp3d>
         </a:effectStyle>
       </a:effectStyleLst>
       <a:bgFillStyleLst>
         <a:solidFill>
           <a:schemeClr val="phClr"/>
         </a:solidFill>
+        <a:solidFill>
+          <a:schemeClr val="phClr">
+            <a:tint val="95000"/>
+            <a:satMod val="170000"/>
+          </a:schemeClr>
+        </a:solidFill>
         <a:gradFill rotWithShape="1">
           <a:gsLst>
             <a:gs pos="0">
               <a:schemeClr val="phClr">
-                <a:tint val="40000"/>
-                <a:satMod val="350000"/>
+                <a:tint val="93000"/>
+                <a:satMod val="150000"/>
+                <a:shade val="98000"/>
+                <a:lumMod val="102000"/>
               </a:schemeClr>
             </a:gs>
-            <a:gs pos="40000">
+            <a:gs pos="50000">
               <a:schemeClr val="phClr">
-                <a:tint val="45000"/>
-                <a:shade val="99000"/>
-                <a:satMod val="350000"/>
+                <a:tint val="98000"/>
+                <a:satMod val="130000"/>
+                <a:shade val="90000"/>
+                <a:lumMod val="103000"/>
               </a:schemeClr>
             </a:gs>
             <a:gs pos="100000">
               <a:schemeClr val="phClr">
-                <a:shade val="20000"/>
-                <a:satMod val="255000"/>
+                <a:shade val="63000"/>
+                <a:satMod val="120000"/>
               </a:schemeClr>
             </a:gs>
           </a:gsLst>
-          <a:path path="circle">
-            <a:fillToRect l="50000" t="-80000" r="50000" b="180000"/>
-          </a:path>
-        </a:gradFill>
-        <a:gradFill rotWithShape="1">
-          <a:gsLst>
-            <a:gs pos="0">
-              <a:schemeClr val="phClr">
-                <a:tint val="80000"/>
-                <a:satMod val="300000"/>
-              </a:schemeClr>
-            </a:gs>
-            <a:gs pos="100000">
-              <a:schemeClr val="phClr">
-                <a:shade val="30000"/>
-                <a:satMod val="200000"/>
-              </a:schemeClr>
-            </a:gs>
-          </a:gsLst>
-          <a:path path="circle">
-            <a:fillToRect l="50000" t="50000" r="50000" b="50000"/>
-          </a:path>
+          <a:lin ang="5400000" scaled="0"/>
         </a:gradFill>
       </a:bgFillStyleLst>
     </a:fmtScheme>
   </a:themeElements>
   <a:objectDefaults/>
   <a:extraClrSchemeLst/>
+  <a:extLst>
+    <a:ext uri="{05A4C25C-085E-4340-85A3-A5531E510DB2}">
+      <thm15:themeFamily xmlns:thm15="http://schemas.microsoft.com/office/thememl/2012/main" name="Office Theme" id="{62F939B6-93AF-4DB8-9C6B-D6C7DFDC589F}" vid="{4A3C46E8-61CC-4603-A589-7422A47A8E4A}"/>
+    </a:ext>
+  </a:extLst>
 </a:theme>
 </file>
</xml_diff>

<commit_message>
updated example slides with new features
</commit_message>
<xml_diff>
--- a/inst/example/slides.pptx
+++ b/inst/example/slides.pptx
@@ -11,6 +11,7 @@
     <p:sldId id="259" r:id="rId9"/>
     <p:sldId id="260" r:id="rId10"/>
     <p:sldId id="261" r:id="rId11"/>
+    <p:sldId id="262" r:id="rId12"/>
   </p:sldIdLst>
   <p:sldSz cx="9144000" cy="6858000" type="screen4x3"/>
   <p:notesSz cx="6858000" cy="9144000"/>
@@ -3265,6 +3266,57 @@
 </p:sld>
 </file>
 
+<file path=ppt/slides/slide7.xml><?xml version="1.0" encoding="utf-8"?>
+<p:sld xmlns:a="http://schemas.openxmlformats.org/drawingml/2006/main" xmlns:r="http://schemas.openxmlformats.org/officeDocument/2006/relationships" xmlns:p="http://schemas.openxmlformats.org/presentationml/2006/main">
+  <p:cSld>
+    <p:spTree>
+      <p:nvGrpSpPr>
+        <p:cNvPr id="1" name=""/>
+        <p:cNvGrpSpPr/>
+        <p:nvPr/>
+      </p:nvGrpSpPr>
+      <p:grpSpPr>
+        <a:xfrm>
+          <a:off x="0" y="0"/>
+          <a:ext cx="0" cy="0"/>
+          <a:chOff x="0" y="0"/>
+          <a:chExt cx="0" cy="0"/>
+        </a:xfrm>
+      </p:grpSpPr>
+      <p:pic xmlns:a="http://schemas.openxmlformats.org/drawingml/2006/main" xmlns:r="http://schemas.openxmlformats.org/officeDocument/2006/relationships" xmlns:p="http://schemas.openxmlformats.org/presentationml/2006/main">
+        <p:nvPicPr>
+          <p:cNvPr id="2" name="" descr=""/>
+          <p:cNvPicPr>
+            <a:picLocks noGrp="1"/>
+          </p:cNvPicPr>
+          <p:nvPr>
+            <p:ph/>
+          </p:nvPr>
+        </p:nvPicPr>
+        <p:blipFill>
+          <a:blip cstate="print" r:embed="rId2"/>
+          <a:stretch>
+            <a:fillRect/>
+          </a:stretch>
+        </p:blipFill>
+        <p:spPr>
+          <a:xfrm>
+            <a:off x="0" y="0"/>
+            <a:ext cx="9144000" cy="6858000"/>
+          </a:xfrm>
+          <a:prstGeom prst="rect">
+            <a:avLst/>
+          </a:prstGeom>
+        </p:spPr>
+      </p:pic>
+    </p:spTree>
+  </p:cSld>
+  <p:clrMapOvr>
+    <a:masterClrMapping/>
+  </p:clrMapOvr>
+</p:sld>
+</file>
+
 <file path=ppt/theme/theme1.xml><?xml version="1.0" encoding="utf-8"?>
 <a:theme xmlns:a="http://schemas.openxmlformats.org/drawingml/2006/main" name="Office Theme">
   <a:themeElements>

</xml_diff>